<commit_message>
Updated Garbage collection in .NET presentation
</commit_message>
<xml_diff>
--- a/ppt/Garbage collection in dotnet.pptx
+++ b/ppt/Garbage collection in dotnet.pptx
@@ -9,7 +9,8 @@
     <p:sldId id="257" r:id="rId3"/>
     <p:sldId id="259" r:id="rId4"/>
     <p:sldId id="258" r:id="rId5"/>
-    <p:sldId id="260" r:id="rId6"/>
+    <p:sldId id="261" r:id="rId6"/>
+    <p:sldId id="260" r:id="rId7"/>
   </p:sldIdLst>
   <p:sldSz cx="9144000" cy="6858000" type="screen4x3"/>
   <p:notesSz cx="6858000" cy="9144000"/>
@@ -108,6 +109,11 @@
       </a:defRPr>
     </a:lvl9pPr>
   </p:defaultTextStyle>
+  <p:extLst>
+    <p:ext uri="{EFAFB233-063F-42B5-8137-9DF3F51BA10A}">
+      <p15:sldGuideLst xmlns:p15="http://schemas.microsoft.com/office/powerpoint/2012/main"/>
+    </p:ext>
+  </p:extLst>
 </p:presentation>
 </file>
 
@@ -324,7 +330,7 @@
           <a:p>
             <a:fld id="{7BD62930-5499-40C2-A9E0-B6F8263316F8}" type="datetimeFigureOut">
               <a:rPr lang="ru-RU" smtClean="0"/>
-              <a:t>03.08.2013</a:t>
+              <a:t>04.08.2013</a:t>
             </a:fld>
             <a:endParaRPr lang="ru-RU"/>
           </a:p>
@@ -615,7 +621,7 @@
           <a:p>
             <a:fld id="{7BD62930-5499-40C2-A9E0-B6F8263316F8}" type="datetimeFigureOut">
               <a:rPr lang="ru-RU" smtClean="0"/>
-              <a:t>03.08.2013</a:t>
+              <a:t>04.08.2013</a:t>
             </a:fld>
             <a:endParaRPr lang="ru-RU"/>
           </a:p>
@@ -879,7 +885,7 @@
           <a:p>
             <a:fld id="{7BD62930-5499-40C2-A9E0-B6F8263316F8}" type="datetimeFigureOut">
               <a:rPr lang="ru-RU" smtClean="0"/>
-              <a:t>03.08.2013</a:t>
+              <a:t>04.08.2013</a:t>
             </a:fld>
             <a:endParaRPr lang="ru-RU"/>
           </a:p>
@@ -1439,7 +1445,7 @@
           <a:p>
             <a:fld id="{7BD62930-5499-40C2-A9E0-B6F8263316F8}" type="datetimeFigureOut">
               <a:rPr lang="ru-RU" smtClean="0"/>
-              <a:t>03.08.2013</a:t>
+              <a:t>04.08.2013</a:t>
             </a:fld>
             <a:endParaRPr lang="ru-RU"/>
           </a:p>
@@ -1698,7 +1704,7 @@
           <a:p>
             <a:fld id="{7BD62930-5499-40C2-A9E0-B6F8263316F8}" type="datetimeFigureOut">
               <a:rPr lang="ru-RU" smtClean="0"/>
-              <a:t>03.08.2013</a:t>
+              <a:t>04.08.2013</a:t>
             </a:fld>
             <a:endParaRPr lang="ru-RU"/>
           </a:p>
@@ -2274,7 +2280,7 @@
           <a:p>
             <a:fld id="{7BD62930-5499-40C2-A9E0-B6F8263316F8}" type="datetimeFigureOut">
               <a:rPr lang="ru-RU" smtClean="0"/>
-              <a:t>03.08.2013</a:t>
+              <a:t>04.08.2013</a:t>
             </a:fld>
             <a:endParaRPr lang="ru-RU"/>
           </a:p>
@@ -2606,7 +2612,7 @@
           <a:p>
             <a:fld id="{7BD62930-5499-40C2-A9E0-B6F8263316F8}" type="datetimeFigureOut">
               <a:rPr lang="ru-RU" smtClean="0"/>
-              <a:t>03.08.2013</a:t>
+              <a:t>04.08.2013</a:t>
             </a:fld>
             <a:endParaRPr lang="ru-RU"/>
           </a:p>
@@ -2781,7 +2787,7 @@
           <a:p>
             <a:fld id="{7BD62930-5499-40C2-A9E0-B6F8263316F8}" type="datetimeFigureOut">
               <a:rPr lang="ru-RU" smtClean="0"/>
-              <a:t>03.08.2013</a:t>
+              <a:t>04.08.2013</a:t>
             </a:fld>
             <a:endParaRPr lang="ru-RU"/>
           </a:p>
@@ -2961,7 +2967,7 @@
           <a:p>
             <a:fld id="{7BD62930-5499-40C2-A9E0-B6F8263316F8}" type="datetimeFigureOut">
               <a:rPr lang="ru-RU" smtClean="0"/>
-              <a:t>03.08.2013</a:t>
+              <a:t>04.08.2013</a:t>
             </a:fld>
             <a:endParaRPr lang="ru-RU"/>
           </a:p>
@@ -3131,7 +3137,7 @@
           <a:p>
             <a:fld id="{7BD62930-5499-40C2-A9E0-B6F8263316F8}" type="datetimeFigureOut">
               <a:rPr lang="ru-RU" smtClean="0"/>
-              <a:t>03.08.2013</a:t>
+              <a:t>04.08.2013</a:t>
             </a:fld>
             <a:endParaRPr lang="ru-RU"/>
           </a:p>
@@ -3390,7 +3396,7 @@
           <a:p>
             <a:fld id="{7BD62930-5499-40C2-A9E0-B6F8263316F8}" type="datetimeFigureOut">
               <a:rPr lang="ru-RU" smtClean="0"/>
-              <a:t>03.08.2013</a:t>
+              <a:t>04.08.2013</a:t>
             </a:fld>
             <a:endParaRPr lang="ru-RU"/>
           </a:p>
@@ -3682,7 +3688,7 @@
           <a:p>
             <a:fld id="{7BD62930-5499-40C2-A9E0-B6F8263316F8}" type="datetimeFigureOut">
               <a:rPr lang="ru-RU" smtClean="0"/>
-              <a:t>03.08.2013</a:t>
+              <a:t>04.08.2013</a:t>
             </a:fld>
             <a:endParaRPr lang="ru-RU"/>
           </a:p>
@@ -4112,7 +4118,7 @@
           <a:p>
             <a:fld id="{7BD62930-5499-40C2-A9E0-B6F8263316F8}" type="datetimeFigureOut">
               <a:rPr lang="ru-RU" smtClean="0"/>
-              <a:t>03.08.2013</a:t>
+              <a:t>04.08.2013</a:t>
             </a:fld>
             <a:endParaRPr lang="ru-RU"/>
           </a:p>
@@ -4236,7 +4242,7 @@
           <a:p>
             <a:fld id="{7BD62930-5499-40C2-A9E0-B6F8263316F8}" type="datetimeFigureOut">
               <a:rPr lang="ru-RU" smtClean="0"/>
-              <a:t>03.08.2013</a:t>
+              <a:t>04.08.2013</a:t>
             </a:fld>
             <a:endParaRPr lang="ru-RU"/>
           </a:p>
@@ -4331,7 +4337,7 @@
           <a:p>
             <a:fld id="{7BD62930-5499-40C2-A9E0-B6F8263316F8}" type="datetimeFigureOut">
               <a:rPr lang="ru-RU" smtClean="0"/>
-              <a:t>03.08.2013</a:t>
+              <a:t>04.08.2013</a:t>
             </a:fld>
             <a:endParaRPr lang="ru-RU"/>
           </a:p>
@@ -4614,7 +4620,7 @@
           <a:p>
             <a:fld id="{7BD62930-5499-40C2-A9E0-B6F8263316F8}" type="datetimeFigureOut">
               <a:rPr lang="ru-RU" smtClean="0"/>
-              <a:t>03.08.2013</a:t>
+              <a:t>04.08.2013</a:t>
             </a:fld>
             <a:endParaRPr lang="ru-RU"/>
           </a:p>
@@ -4905,7 +4911,7 @@
           <a:p>
             <a:fld id="{7BD62930-5499-40C2-A9E0-B6F8263316F8}" type="datetimeFigureOut">
               <a:rPr lang="ru-RU" smtClean="0"/>
-              <a:t>03.08.2013</a:t>
+              <a:t>04.08.2013</a:t>
             </a:fld>
             <a:endParaRPr lang="ru-RU"/>
           </a:p>
@@ -5136,7 +5142,7 @@
           <a:p>
             <a:fld id="{7BD62930-5499-40C2-A9E0-B6F8263316F8}" type="datetimeFigureOut">
               <a:rPr lang="ru-RU" smtClean="0"/>
-              <a:t>03.08.2013</a:t>
+              <a:t>04.08.2013</a:t>
             </a:fld>
             <a:endParaRPr lang="ru-RU"/>
           </a:p>
@@ -6659,64 +6665,9 @@
           <a:p>
             <a:r>
               <a:rPr lang="en-US" dirty="0" smtClean="0"/>
-              <a:t>Mark and Sweep</a:t>
+              <a:t>CLR Bootstrap</a:t>
             </a:r>
             <a:endParaRPr lang="ru-RU" dirty="0"/>
-          </a:p>
-        </p:txBody>
-      </p:sp>
-      <p:sp>
-        <p:nvSpPr>
-          <p:cNvPr id="3" name="Content Placeholder 2"/>
-          <p:cNvSpPr>
-            <a:spLocks noGrp="1"/>
-          </p:cNvSpPr>
-          <p:nvPr>
-            <p:ph idx="1"/>
-          </p:nvPr>
-        </p:nvSpPr>
-        <p:spPr>
-          <a:xfrm>
-            <a:off x="818348" y="1371600"/>
-            <a:ext cx="7511472" cy="4730460"/>
-          </a:xfrm>
-        </p:spPr>
-        <p:txBody>
-          <a:bodyPr>
-            <a:normAutofit/>
-          </a:bodyPr>
-          <a:lstStyle/>
-          <a:p>
-            <a:pPr marL="342900" indent="-342900">
-              <a:buSzPct val="80000"/>
-              <a:buFont typeface="+mj-lt"/>
-              <a:buAutoNum type="arabicPeriod"/>
-            </a:pPr>
-            <a:r>
-              <a:rPr lang="en-US" sz="2400" cap="none" dirty="0" smtClean="0">
-                <a:latin typeface="Calibri" panose="020F0502020204030204" pitchFamily="34" charset="0"/>
-                <a:cs typeface="Calibri" panose="020F0502020204030204" pitchFamily="34" charset="0"/>
-              </a:rPr>
-              <a:t>Define size of object MyClass</a:t>
-            </a:r>
-          </a:p>
-          <a:p>
-            <a:pPr marL="342900" indent="-342900">
-              <a:buSzPct val="80000"/>
-              <a:buFont typeface="+mj-lt"/>
-              <a:buAutoNum type="arabicPeriod"/>
-            </a:pPr>
-            <a:r>
-              <a:rPr lang="en-US" sz="2400" cap="none" dirty="0" smtClean="0">
-                <a:latin typeface="Calibri" panose="020F0502020204030204" pitchFamily="34" charset="0"/>
-                <a:cs typeface="Calibri" panose="020F0502020204030204" pitchFamily="34" charset="0"/>
-              </a:rPr>
-              <a:t>Allocate memory </a:t>
-            </a:r>
-            <a:endParaRPr lang="ru-RU" sz="2400" cap="none" dirty="0">
-              <a:latin typeface="Calibri" panose="020F0502020204030204" pitchFamily="34" charset="0"/>
-              <a:cs typeface="Calibri" panose="020F0502020204030204" pitchFamily="34" charset="0"/>
-            </a:endParaRPr>
           </a:p>
         </p:txBody>
       </p:sp>
@@ -6728,8 +6679,8 @@
         </p:nvSpPr>
         <p:spPr>
           <a:xfrm>
-            <a:off x="1922293" y="1371600"/>
-            <a:ext cx="5303579" cy="827314"/>
+            <a:off x="609600" y="1371600"/>
+            <a:ext cx="7720219" cy="5168900"/>
           </a:xfrm>
           <a:prstGeom prst="rect">
             <a:avLst/>
@@ -6766,57 +6717,6 @@
           <a:lstStyle/>
           <a:p>
             <a:pPr algn="ctr"/>
-            <a:r>
-              <a:rPr lang="en-US" sz="2000" dirty="0" smtClean="0">
-                <a:solidFill>
-                  <a:srgbClr val="F137E8"/>
-                </a:solidFill>
-                <a:latin typeface="Courier New" panose="02070309020205020404" pitchFamily="49" charset="0"/>
-                <a:cs typeface="Courier New" panose="02070309020205020404" pitchFamily="49" charset="0"/>
-              </a:rPr>
-              <a:t>MyClass</a:t>
-            </a:r>
-            <a:r>
-              <a:rPr lang="en-US" sz="2000" dirty="0" smtClean="0">
-                <a:latin typeface="Courier New" panose="02070309020205020404" pitchFamily="49" charset="0"/>
-                <a:cs typeface="Courier New" panose="02070309020205020404" pitchFamily="49" charset="0"/>
-              </a:rPr>
-              <a:t> instance = </a:t>
-            </a:r>
-            <a:r>
-              <a:rPr lang="en-US" sz="2000" dirty="0" smtClean="0">
-                <a:solidFill>
-                  <a:srgbClr val="3366FF"/>
-                </a:solidFill>
-                <a:latin typeface="Courier New" panose="02070309020205020404" pitchFamily="49" charset="0"/>
-                <a:cs typeface="Courier New" panose="02070309020205020404" pitchFamily="49" charset="0"/>
-              </a:rPr>
-              <a:t>new</a:t>
-            </a:r>
-            <a:r>
-              <a:rPr lang="en-US" sz="2000" dirty="0" smtClean="0">
-                <a:latin typeface="Courier New" panose="02070309020205020404" pitchFamily="49" charset="0"/>
-                <a:cs typeface="Courier New" panose="02070309020205020404" pitchFamily="49" charset="0"/>
-              </a:rPr>
-              <a:t> </a:t>
-            </a:r>
-            <a:r>
-              <a:rPr lang="en-US" sz="2000" dirty="0" smtClean="0">
-                <a:solidFill>
-                  <a:srgbClr val="F137E8"/>
-                </a:solidFill>
-                <a:latin typeface="Courier New" panose="02070309020205020404" pitchFamily="49" charset="0"/>
-                <a:cs typeface="Courier New" panose="02070309020205020404" pitchFamily="49" charset="0"/>
-              </a:rPr>
-              <a:t>MyClass</a:t>
-            </a:r>
-            <a:r>
-              <a:rPr lang="en-US" sz="2000" dirty="0" smtClean="0">
-                <a:latin typeface="Courier New" panose="02070309020205020404" pitchFamily="49" charset="0"/>
-                <a:cs typeface="Courier New" panose="02070309020205020404" pitchFamily="49" charset="0"/>
-              </a:rPr>
-              <a:t>();</a:t>
-            </a:r>
             <a:endParaRPr lang="ru-RU" sz="2000" dirty="0">
               <a:latin typeface="Courier New" panose="02070309020205020404" pitchFamily="49" charset="0"/>
               <a:cs typeface="Courier New" panose="02070309020205020404" pitchFamily="49" charset="0"/>
@@ -6824,6 +6724,1883 @@
           </a:p>
         </p:txBody>
       </p:sp>
+      <p:sp>
+        <p:nvSpPr>
+          <p:cNvPr id="6" name="Rectangle 5"/>
+          <p:cNvSpPr/>
+          <p:nvPr/>
+        </p:nvSpPr>
+        <p:spPr>
+          <a:xfrm>
+            <a:off x="672409" y="5689600"/>
+            <a:ext cx="7594600" cy="749300"/>
+          </a:xfrm>
+          <a:prstGeom prst="rect">
+            <a:avLst/>
+          </a:prstGeom>
+        </p:spPr>
+        <p:style>
+          <a:lnRef idx="2">
+            <a:schemeClr val="accent1">
+              <a:shade val="50000"/>
+            </a:schemeClr>
+          </a:lnRef>
+          <a:fillRef idx="1">
+            <a:schemeClr val="accent1"/>
+          </a:fillRef>
+          <a:effectRef idx="0">
+            <a:schemeClr val="accent1"/>
+          </a:effectRef>
+          <a:fontRef idx="minor">
+            <a:schemeClr val="lt1"/>
+          </a:fontRef>
+        </p:style>
+        <p:txBody>
+          <a:bodyPr rtlCol="0" anchor="ctr"/>
+          <a:lstStyle/>
+          <a:p>
+            <a:pPr algn="ctr"/>
+            <a:endParaRPr lang="ru-RU"/>
+          </a:p>
+        </p:txBody>
+      </p:sp>
+    </p:spTree>
+    <p:extLst>
+      <p:ext uri="{BB962C8B-B14F-4D97-AF65-F5344CB8AC3E}">
+        <p14:creationId xmlns:p14="http://schemas.microsoft.com/office/powerpoint/2010/main" val="2714199734"/>
+      </p:ext>
+    </p:extLst>
+  </p:cSld>
+  <p:clrMapOvr>
+    <a:masterClrMapping/>
+  </p:clrMapOvr>
+  <p:timing>
+    <p:tnLst>
+      <p:par>
+        <p:cTn id="1" dur="indefinite" restart="never" nodeType="tmRoot"/>
+      </p:par>
+    </p:tnLst>
+  </p:timing>
+</p:sld>
+</file>
+
+<file path=ppt/slides/slide6.xml><?xml version="1.0" encoding="utf-8"?>
+<p:sld xmlns:a="http://schemas.openxmlformats.org/drawingml/2006/main" xmlns:r="http://schemas.openxmlformats.org/officeDocument/2006/relationships" xmlns:p="http://schemas.openxmlformats.org/presentationml/2006/main">
+  <p:cSld>
+    <p:spTree>
+      <p:nvGrpSpPr>
+        <p:cNvPr id="1" name=""/>
+        <p:cNvGrpSpPr/>
+        <p:nvPr/>
+      </p:nvGrpSpPr>
+      <p:grpSpPr>
+        <a:xfrm>
+          <a:off x="0" y="0"/>
+          <a:ext cx="0" cy="0"/>
+          <a:chOff x="0" y="0"/>
+          <a:chExt cx="0" cy="0"/>
+        </a:xfrm>
+      </p:grpSpPr>
+      <p:sp>
+        <p:nvSpPr>
+          <p:cNvPr id="2" name="Title 1"/>
+          <p:cNvSpPr>
+            <a:spLocks noGrp="1"/>
+          </p:cNvSpPr>
+          <p:nvPr>
+            <p:ph type="title"/>
+          </p:nvPr>
+        </p:nvSpPr>
+        <p:spPr>
+          <a:xfrm>
+            <a:off x="818347" y="596018"/>
+            <a:ext cx="7511473" cy="623182"/>
+          </a:xfrm>
+        </p:spPr>
+        <p:txBody>
+          <a:bodyPr/>
+          <a:lstStyle/>
+          <a:p>
+            <a:r>
+              <a:rPr lang="en-US" dirty="0" smtClean="0"/>
+              <a:t>Mark and Sweep</a:t>
+            </a:r>
+            <a:endParaRPr lang="ru-RU" dirty="0"/>
+          </a:p>
+        </p:txBody>
+      </p:sp>
+      <p:grpSp>
+        <p:nvGrpSpPr>
+          <p:cNvPr id="13" name="Group 12"/>
+          <p:cNvGrpSpPr/>
+          <p:nvPr/>
+        </p:nvGrpSpPr>
+        <p:grpSpPr>
+          <a:xfrm>
+            <a:off x="818347" y="1362853"/>
+            <a:ext cx="7478038" cy="1565755"/>
+            <a:chOff x="818347" y="1162828"/>
+            <a:chExt cx="7478038" cy="1565755"/>
+          </a:xfrm>
+        </p:grpSpPr>
+        <p:sp>
+          <p:nvSpPr>
+            <p:cNvPr id="6" name="Rectangle 5"/>
+            <p:cNvSpPr/>
+            <p:nvPr/>
+          </p:nvSpPr>
+          <p:spPr>
+            <a:xfrm>
+              <a:off x="818347" y="1162828"/>
+              <a:ext cx="7478038" cy="1565755"/>
+            </a:xfrm>
+            <a:prstGeom prst="rect">
+              <a:avLst/>
+            </a:prstGeom>
+          </p:spPr>
+          <p:style>
+            <a:lnRef idx="2">
+              <a:schemeClr val="accent1">
+                <a:shade val="50000"/>
+              </a:schemeClr>
+            </a:lnRef>
+            <a:fillRef idx="1">
+              <a:schemeClr val="accent1"/>
+            </a:fillRef>
+            <a:effectRef idx="0">
+              <a:schemeClr val="accent1"/>
+            </a:effectRef>
+            <a:fontRef idx="minor">
+              <a:schemeClr val="lt1"/>
+            </a:fontRef>
+          </p:style>
+          <p:txBody>
+            <a:bodyPr rtlCol="0" anchor="t"/>
+            <a:lstStyle/>
+            <a:p>
+              <a:r>
+                <a:rPr lang="en-US" dirty="0" smtClean="0"/>
+                <a:t>Roots</a:t>
+              </a:r>
+              <a:endParaRPr lang="ru-RU" dirty="0"/>
+            </a:p>
+          </p:txBody>
+        </p:sp>
+        <p:sp>
+          <p:nvSpPr>
+            <p:cNvPr id="7" name="Rectangle 6"/>
+            <p:cNvSpPr/>
+            <p:nvPr/>
+          </p:nvSpPr>
+          <p:spPr>
+            <a:xfrm>
+              <a:off x="1271306" y="1713973"/>
+              <a:ext cx="1691014" cy="693632"/>
+            </a:xfrm>
+            <a:prstGeom prst="rect">
+              <a:avLst/>
+            </a:prstGeom>
+          </p:spPr>
+          <p:style>
+            <a:lnRef idx="2">
+              <a:schemeClr val="accent5">
+                <a:shade val="50000"/>
+              </a:schemeClr>
+            </a:lnRef>
+            <a:fillRef idx="1">
+              <a:schemeClr val="accent5"/>
+            </a:fillRef>
+            <a:effectRef idx="0">
+              <a:schemeClr val="accent5"/>
+            </a:effectRef>
+            <a:fontRef idx="minor">
+              <a:schemeClr val="lt1"/>
+            </a:fontRef>
+          </p:style>
+          <p:txBody>
+            <a:bodyPr rtlCol="0" anchor="ctr"/>
+            <a:lstStyle/>
+            <a:p>
+              <a:pPr algn="ctr"/>
+              <a:r>
+                <a:rPr lang="en-US" b="1" dirty="0" smtClean="0">
+                  <a:solidFill>
+                    <a:schemeClr val="bg1"/>
+                  </a:solidFill>
+                  <a:effectLst>
+                    <a:outerShdw blurRad="38100" dist="38100" dir="2700000" algn="tl">
+                      <a:srgbClr val="000000">
+                        <a:alpha val="43137"/>
+                      </a:srgbClr>
+                    </a:outerShdw>
+                  </a:effectLst>
+                </a:rPr>
+                <a:t>global</a:t>
+              </a:r>
+              <a:endParaRPr lang="ru-RU" b="1" dirty="0">
+                <a:solidFill>
+                  <a:schemeClr val="bg1"/>
+                </a:solidFill>
+                <a:effectLst>
+                  <a:outerShdw blurRad="38100" dist="38100" dir="2700000" algn="tl">
+                    <a:srgbClr val="000000">
+                      <a:alpha val="43137"/>
+                    </a:srgbClr>
+                  </a:outerShdw>
+                </a:effectLst>
+              </a:endParaRPr>
+            </a:p>
+          </p:txBody>
+        </p:sp>
+        <p:sp>
+          <p:nvSpPr>
+            <p:cNvPr id="8" name="Rectangle 7"/>
+            <p:cNvSpPr/>
+            <p:nvPr/>
+          </p:nvSpPr>
+          <p:spPr>
+            <a:xfrm>
+              <a:off x="3552424" y="1703537"/>
+              <a:ext cx="1691014" cy="444675"/>
+            </a:xfrm>
+            <a:prstGeom prst="rect">
+              <a:avLst/>
+            </a:prstGeom>
+          </p:spPr>
+          <p:style>
+            <a:lnRef idx="2">
+              <a:schemeClr val="accent5">
+                <a:shade val="50000"/>
+              </a:schemeClr>
+            </a:lnRef>
+            <a:fillRef idx="1">
+              <a:schemeClr val="accent5"/>
+            </a:fillRef>
+            <a:effectRef idx="0">
+              <a:schemeClr val="accent5"/>
+            </a:effectRef>
+            <a:fontRef idx="minor">
+              <a:schemeClr val="lt1"/>
+            </a:fontRef>
+          </p:style>
+          <p:txBody>
+            <a:bodyPr rtlCol="0" anchor="ctr"/>
+            <a:lstStyle/>
+            <a:p>
+              <a:pPr algn="ctr"/>
+              <a:r>
+                <a:rPr lang="en-US" dirty="0" smtClean="0"/>
+                <a:t>stack</a:t>
+              </a:r>
+              <a:endParaRPr lang="ru-RU" dirty="0"/>
+            </a:p>
+          </p:txBody>
+        </p:sp>
+        <p:sp>
+          <p:nvSpPr>
+            <p:cNvPr id="9" name="Rectangle 8"/>
+            <p:cNvSpPr/>
+            <p:nvPr/>
+          </p:nvSpPr>
+          <p:spPr>
+            <a:xfrm>
+              <a:off x="6109168" y="1703537"/>
+              <a:ext cx="1691014" cy="704068"/>
+            </a:xfrm>
+            <a:prstGeom prst="rect">
+              <a:avLst/>
+            </a:prstGeom>
+          </p:spPr>
+          <p:style>
+            <a:lnRef idx="2">
+              <a:schemeClr val="accent5">
+                <a:shade val="50000"/>
+              </a:schemeClr>
+            </a:lnRef>
+            <a:fillRef idx="1">
+              <a:schemeClr val="accent5"/>
+            </a:fillRef>
+            <a:effectRef idx="0">
+              <a:schemeClr val="accent5"/>
+            </a:effectRef>
+            <a:fontRef idx="minor">
+              <a:schemeClr val="lt1"/>
+            </a:fontRef>
+          </p:style>
+          <p:txBody>
+            <a:bodyPr rtlCol="0" anchor="ctr"/>
+            <a:lstStyle/>
+            <a:p>
+              <a:pPr algn="ctr"/>
+              <a:r>
+                <a:rPr lang="en-US" b="1" dirty="0" smtClean="0">
+                  <a:solidFill>
+                    <a:schemeClr val="bg1"/>
+                  </a:solidFill>
+                  <a:effectLst>
+                    <a:outerShdw blurRad="38100" dist="38100" dir="2700000" algn="tl">
+                      <a:srgbClr val="000000">
+                        <a:alpha val="43137"/>
+                      </a:srgbClr>
+                    </a:outerShdw>
+                  </a:effectLst>
+                </a:rPr>
+                <a:t>CPU registers</a:t>
+              </a:r>
+              <a:endParaRPr lang="ru-RU" b="1" dirty="0">
+                <a:solidFill>
+                  <a:schemeClr val="bg1"/>
+                </a:solidFill>
+                <a:effectLst>
+                  <a:outerShdw blurRad="38100" dist="38100" dir="2700000" algn="tl">
+                    <a:srgbClr val="000000">
+                      <a:alpha val="43137"/>
+                    </a:srgbClr>
+                  </a:outerShdw>
+                </a:effectLst>
+              </a:endParaRPr>
+            </a:p>
+          </p:txBody>
+        </p:sp>
+        <p:sp>
+          <p:nvSpPr>
+            <p:cNvPr id="10" name="Rounded Rectangle 9"/>
+            <p:cNvSpPr/>
+            <p:nvPr/>
+          </p:nvSpPr>
+          <p:spPr>
+            <a:xfrm>
+              <a:off x="3267074" y="1219200"/>
+              <a:ext cx="2562225" cy="1362075"/>
+            </a:xfrm>
+            <a:prstGeom prst="roundRect">
+              <a:avLst/>
+            </a:prstGeom>
+            <a:noFill/>
+            <a:ln>
+              <a:solidFill>
+                <a:srgbClr val="92D050"/>
+              </a:solidFill>
+              <a:prstDash val="dash"/>
+            </a:ln>
+          </p:spPr>
+          <p:style>
+            <a:lnRef idx="2">
+              <a:schemeClr val="accent1">
+                <a:shade val="50000"/>
+              </a:schemeClr>
+            </a:lnRef>
+            <a:fillRef idx="1">
+              <a:schemeClr val="accent1"/>
+            </a:fillRef>
+            <a:effectRef idx="0">
+              <a:schemeClr val="accent1"/>
+            </a:effectRef>
+            <a:fontRef idx="minor">
+              <a:schemeClr val="lt1"/>
+            </a:fontRef>
+          </p:style>
+          <p:txBody>
+            <a:bodyPr rtlCol="0" anchor="t"/>
+            <a:lstStyle/>
+            <a:p>
+              <a:pPr algn="ctr"/>
+              <a:r>
+                <a:rPr lang="en-US" dirty="0" smtClean="0"/>
+                <a:t>Processes</a:t>
+              </a:r>
+              <a:endParaRPr lang="ru-RU" dirty="0"/>
+            </a:p>
+          </p:txBody>
+        </p:sp>
+        <p:sp>
+          <p:nvSpPr>
+            <p:cNvPr id="11" name="Rectangle 10"/>
+            <p:cNvSpPr/>
+            <p:nvPr/>
+          </p:nvSpPr>
+          <p:spPr>
+            <a:xfrm>
+              <a:off x="3646325" y="1809482"/>
+              <a:ext cx="1691014" cy="444675"/>
+            </a:xfrm>
+            <a:prstGeom prst="rect">
+              <a:avLst/>
+            </a:prstGeom>
+          </p:spPr>
+          <p:style>
+            <a:lnRef idx="2">
+              <a:schemeClr val="accent5">
+                <a:shade val="50000"/>
+              </a:schemeClr>
+            </a:lnRef>
+            <a:fillRef idx="1">
+              <a:schemeClr val="accent5"/>
+            </a:fillRef>
+            <a:effectRef idx="0">
+              <a:schemeClr val="accent5"/>
+            </a:effectRef>
+            <a:fontRef idx="minor">
+              <a:schemeClr val="lt1"/>
+            </a:fontRef>
+          </p:style>
+          <p:txBody>
+            <a:bodyPr rtlCol="0" anchor="ctr"/>
+            <a:lstStyle/>
+            <a:p>
+              <a:pPr algn="ctr"/>
+              <a:r>
+                <a:rPr lang="en-US" dirty="0" smtClean="0"/>
+                <a:t>stack</a:t>
+              </a:r>
+              <a:endParaRPr lang="ru-RU" dirty="0"/>
+            </a:p>
+          </p:txBody>
+        </p:sp>
+        <p:sp>
+          <p:nvSpPr>
+            <p:cNvPr id="12" name="Rectangle 11"/>
+            <p:cNvSpPr/>
+            <p:nvPr/>
+          </p:nvSpPr>
+          <p:spPr>
+            <a:xfrm>
+              <a:off x="3784138" y="1934224"/>
+              <a:ext cx="1691014" cy="444675"/>
+            </a:xfrm>
+            <a:prstGeom prst="rect">
+              <a:avLst/>
+            </a:prstGeom>
+          </p:spPr>
+          <p:style>
+            <a:lnRef idx="2">
+              <a:schemeClr val="accent5">
+                <a:shade val="50000"/>
+              </a:schemeClr>
+            </a:lnRef>
+            <a:fillRef idx="1">
+              <a:schemeClr val="accent5"/>
+            </a:fillRef>
+            <a:effectRef idx="0">
+              <a:schemeClr val="accent5"/>
+            </a:effectRef>
+            <a:fontRef idx="minor">
+              <a:schemeClr val="lt1"/>
+            </a:fontRef>
+          </p:style>
+          <p:txBody>
+            <a:bodyPr rtlCol="0" anchor="ctr"/>
+            <a:lstStyle/>
+            <a:p>
+              <a:pPr algn="ctr"/>
+              <a:r>
+                <a:rPr lang="en-US" b="1" dirty="0" smtClean="0">
+                  <a:solidFill>
+                    <a:schemeClr val="bg1"/>
+                  </a:solidFill>
+                  <a:effectLst>
+                    <a:outerShdw blurRad="38100" dist="38100" dir="2700000" algn="tl">
+                      <a:srgbClr val="000000">
+                        <a:alpha val="43137"/>
+                      </a:srgbClr>
+                    </a:outerShdw>
+                  </a:effectLst>
+                </a:rPr>
+                <a:t>stack</a:t>
+              </a:r>
+              <a:endParaRPr lang="ru-RU" b="1" dirty="0">
+                <a:solidFill>
+                  <a:schemeClr val="bg1"/>
+                </a:solidFill>
+                <a:effectLst>
+                  <a:outerShdw blurRad="38100" dist="38100" dir="2700000" algn="tl">
+                    <a:srgbClr val="000000">
+                      <a:alpha val="43137"/>
+                    </a:srgbClr>
+                  </a:outerShdw>
+                </a:effectLst>
+              </a:endParaRPr>
+            </a:p>
+          </p:txBody>
+        </p:sp>
+      </p:grpSp>
+      <p:sp>
+        <p:nvSpPr>
+          <p:cNvPr id="15" name="Rectangle 14"/>
+          <p:cNvSpPr/>
+          <p:nvPr/>
+        </p:nvSpPr>
+        <p:spPr>
+          <a:xfrm>
+            <a:off x="4183378" y="3124669"/>
+            <a:ext cx="914400" cy="533400"/>
+          </a:xfrm>
+          <a:prstGeom prst="rect">
+            <a:avLst/>
+          </a:prstGeom>
+          <a:solidFill>
+            <a:srgbClr val="92D050"/>
+          </a:solidFill>
+        </p:spPr>
+        <p:style>
+          <a:lnRef idx="2">
+            <a:schemeClr val="accent1">
+              <a:shade val="50000"/>
+            </a:schemeClr>
+          </a:lnRef>
+          <a:fillRef idx="1">
+            <a:schemeClr val="accent1"/>
+          </a:fillRef>
+          <a:effectRef idx="0">
+            <a:schemeClr val="accent1"/>
+          </a:effectRef>
+          <a:fontRef idx="minor">
+            <a:schemeClr val="lt1"/>
+          </a:fontRef>
+        </p:style>
+        <p:txBody>
+          <a:bodyPr rtlCol="0" anchor="ctr"/>
+          <a:lstStyle/>
+          <a:p>
+            <a:pPr algn="ctr"/>
+            <a:endParaRPr lang="ru-RU"/>
+          </a:p>
+        </p:txBody>
+      </p:sp>
+      <p:sp>
+        <p:nvSpPr>
+          <p:cNvPr id="16" name="Rectangle 15"/>
+          <p:cNvSpPr/>
+          <p:nvPr/>
+        </p:nvSpPr>
+        <p:spPr>
+          <a:xfrm>
+            <a:off x="3414176" y="4136066"/>
+            <a:ext cx="914400" cy="533400"/>
+          </a:xfrm>
+          <a:prstGeom prst="rect">
+            <a:avLst/>
+          </a:prstGeom>
+          <a:solidFill>
+            <a:srgbClr val="92D050"/>
+          </a:solidFill>
+        </p:spPr>
+        <p:style>
+          <a:lnRef idx="2">
+            <a:schemeClr val="accent1">
+              <a:shade val="50000"/>
+            </a:schemeClr>
+          </a:lnRef>
+          <a:fillRef idx="1">
+            <a:schemeClr val="accent1"/>
+          </a:fillRef>
+          <a:effectRef idx="0">
+            <a:schemeClr val="accent1"/>
+          </a:effectRef>
+          <a:fontRef idx="minor">
+            <a:schemeClr val="lt1"/>
+          </a:fontRef>
+        </p:style>
+        <p:txBody>
+          <a:bodyPr rtlCol="0" anchor="ctr"/>
+          <a:lstStyle/>
+          <a:p>
+            <a:pPr algn="ctr"/>
+            <a:endParaRPr lang="ru-RU"/>
+          </a:p>
+        </p:txBody>
+      </p:sp>
+      <p:sp>
+        <p:nvSpPr>
+          <p:cNvPr id="17" name="Rectangle 16"/>
+          <p:cNvSpPr/>
+          <p:nvPr/>
+        </p:nvSpPr>
+        <p:spPr>
+          <a:xfrm>
+            <a:off x="4786238" y="4136066"/>
+            <a:ext cx="914400" cy="533400"/>
+          </a:xfrm>
+          <a:prstGeom prst="rect">
+            <a:avLst/>
+          </a:prstGeom>
+          <a:solidFill>
+            <a:srgbClr val="92D050"/>
+          </a:solidFill>
+        </p:spPr>
+        <p:style>
+          <a:lnRef idx="2">
+            <a:schemeClr val="accent1">
+              <a:shade val="50000"/>
+            </a:schemeClr>
+          </a:lnRef>
+          <a:fillRef idx="1">
+            <a:schemeClr val="accent1"/>
+          </a:fillRef>
+          <a:effectRef idx="0">
+            <a:schemeClr val="accent1"/>
+          </a:effectRef>
+          <a:fontRef idx="minor">
+            <a:schemeClr val="lt1"/>
+          </a:fontRef>
+        </p:style>
+        <p:txBody>
+          <a:bodyPr rtlCol="0" anchor="ctr"/>
+          <a:lstStyle/>
+          <a:p>
+            <a:pPr algn="ctr"/>
+            <a:endParaRPr lang="ru-RU"/>
+          </a:p>
+        </p:txBody>
+      </p:sp>
+      <p:sp>
+        <p:nvSpPr>
+          <p:cNvPr id="18" name="Rectangle 17"/>
+          <p:cNvSpPr/>
+          <p:nvPr/>
+        </p:nvSpPr>
+        <p:spPr>
+          <a:xfrm>
+            <a:off x="2946044" y="5089790"/>
+            <a:ext cx="914400" cy="533400"/>
+          </a:xfrm>
+          <a:prstGeom prst="rect">
+            <a:avLst/>
+          </a:prstGeom>
+          <a:solidFill>
+            <a:srgbClr val="92D050"/>
+          </a:solidFill>
+        </p:spPr>
+        <p:style>
+          <a:lnRef idx="2">
+            <a:schemeClr val="accent1">
+              <a:shade val="50000"/>
+            </a:schemeClr>
+          </a:lnRef>
+          <a:fillRef idx="1">
+            <a:schemeClr val="accent1"/>
+          </a:fillRef>
+          <a:effectRef idx="0">
+            <a:schemeClr val="accent1"/>
+          </a:effectRef>
+          <a:fontRef idx="minor">
+            <a:schemeClr val="lt1"/>
+          </a:fontRef>
+        </p:style>
+        <p:txBody>
+          <a:bodyPr rtlCol="0" anchor="ctr"/>
+          <a:lstStyle/>
+          <a:p>
+            <a:pPr algn="ctr"/>
+            <a:endParaRPr lang="ru-RU"/>
+          </a:p>
+        </p:txBody>
+      </p:sp>
+      <p:sp>
+        <p:nvSpPr>
+          <p:cNvPr id="19" name="Rectangle 18"/>
+          <p:cNvSpPr/>
+          <p:nvPr/>
+        </p:nvSpPr>
+        <p:spPr>
+          <a:xfrm>
+            <a:off x="4156169" y="5089790"/>
+            <a:ext cx="914400" cy="533400"/>
+          </a:xfrm>
+          <a:prstGeom prst="rect">
+            <a:avLst/>
+          </a:prstGeom>
+          <a:solidFill>
+            <a:srgbClr val="92D050"/>
+          </a:solidFill>
+        </p:spPr>
+        <p:style>
+          <a:lnRef idx="2">
+            <a:schemeClr val="accent1">
+              <a:shade val="50000"/>
+            </a:schemeClr>
+          </a:lnRef>
+          <a:fillRef idx="1">
+            <a:schemeClr val="accent1"/>
+          </a:fillRef>
+          <a:effectRef idx="0">
+            <a:schemeClr val="accent1"/>
+          </a:effectRef>
+          <a:fontRef idx="minor">
+            <a:schemeClr val="lt1"/>
+          </a:fontRef>
+        </p:style>
+        <p:txBody>
+          <a:bodyPr rtlCol="0" anchor="ctr"/>
+          <a:lstStyle/>
+          <a:p>
+            <a:pPr algn="ctr"/>
+            <a:endParaRPr lang="ru-RU"/>
+          </a:p>
+        </p:txBody>
+      </p:sp>
+      <p:sp>
+        <p:nvSpPr>
+          <p:cNvPr id="20" name="Rectangle 19"/>
+          <p:cNvSpPr/>
+          <p:nvPr/>
+        </p:nvSpPr>
+        <p:spPr>
+          <a:xfrm>
+            <a:off x="5458876" y="5149156"/>
+            <a:ext cx="914400" cy="533400"/>
+          </a:xfrm>
+          <a:prstGeom prst="rect">
+            <a:avLst/>
+          </a:prstGeom>
+          <a:solidFill>
+            <a:srgbClr val="92D050"/>
+          </a:solidFill>
+        </p:spPr>
+        <p:style>
+          <a:lnRef idx="2">
+            <a:schemeClr val="accent1">
+              <a:shade val="50000"/>
+            </a:schemeClr>
+          </a:lnRef>
+          <a:fillRef idx="1">
+            <a:schemeClr val="accent1"/>
+          </a:fillRef>
+          <a:effectRef idx="0">
+            <a:schemeClr val="accent1"/>
+          </a:effectRef>
+          <a:fontRef idx="minor">
+            <a:schemeClr val="lt1"/>
+          </a:fontRef>
+        </p:style>
+        <p:txBody>
+          <a:bodyPr rtlCol="0" anchor="ctr"/>
+          <a:lstStyle/>
+          <a:p>
+            <a:pPr algn="ctr"/>
+            <a:endParaRPr lang="ru-RU"/>
+          </a:p>
+        </p:txBody>
+      </p:sp>
+      <p:sp>
+        <p:nvSpPr>
+          <p:cNvPr id="21" name="Rectangle 20"/>
+          <p:cNvSpPr/>
+          <p:nvPr/>
+        </p:nvSpPr>
+        <p:spPr>
+          <a:xfrm>
+            <a:off x="6497475" y="3166402"/>
+            <a:ext cx="914400" cy="533400"/>
+          </a:xfrm>
+          <a:prstGeom prst="rect">
+            <a:avLst/>
+          </a:prstGeom>
+          <a:solidFill>
+            <a:srgbClr val="92D050"/>
+          </a:solidFill>
+        </p:spPr>
+        <p:style>
+          <a:lnRef idx="2">
+            <a:schemeClr val="accent1">
+              <a:shade val="50000"/>
+            </a:schemeClr>
+          </a:lnRef>
+          <a:fillRef idx="1">
+            <a:schemeClr val="accent1"/>
+          </a:fillRef>
+          <a:effectRef idx="0">
+            <a:schemeClr val="accent1"/>
+          </a:effectRef>
+          <a:fontRef idx="minor">
+            <a:schemeClr val="lt1"/>
+          </a:fontRef>
+        </p:style>
+        <p:txBody>
+          <a:bodyPr rtlCol="0" anchor="ctr"/>
+          <a:lstStyle/>
+          <a:p>
+            <a:pPr algn="ctr"/>
+            <a:endParaRPr lang="ru-RU"/>
+          </a:p>
+        </p:txBody>
+      </p:sp>
+      <p:sp>
+        <p:nvSpPr>
+          <p:cNvPr id="22" name="Rectangle 21"/>
+          <p:cNvSpPr/>
+          <p:nvPr/>
+        </p:nvSpPr>
+        <p:spPr>
+          <a:xfrm>
+            <a:off x="967481" y="3166402"/>
+            <a:ext cx="914400" cy="533400"/>
+          </a:xfrm>
+          <a:prstGeom prst="rect">
+            <a:avLst/>
+          </a:prstGeom>
+          <a:solidFill>
+            <a:srgbClr val="92D050"/>
+          </a:solidFill>
+        </p:spPr>
+        <p:style>
+          <a:lnRef idx="2">
+            <a:schemeClr val="accent1">
+              <a:shade val="50000"/>
+            </a:schemeClr>
+          </a:lnRef>
+          <a:fillRef idx="1">
+            <a:schemeClr val="accent1"/>
+          </a:fillRef>
+          <a:effectRef idx="0">
+            <a:schemeClr val="accent1"/>
+          </a:effectRef>
+          <a:fontRef idx="minor">
+            <a:schemeClr val="lt1"/>
+          </a:fontRef>
+        </p:style>
+        <p:txBody>
+          <a:bodyPr rtlCol="0" anchor="ctr"/>
+          <a:lstStyle/>
+          <a:p>
+            <a:pPr algn="ctr"/>
+            <a:endParaRPr lang="ru-RU"/>
+          </a:p>
+        </p:txBody>
+      </p:sp>
+      <p:sp>
+        <p:nvSpPr>
+          <p:cNvPr id="23" name="Rectangle 22"/>
+          <p:cNvSpPr/>
+          <p:nvPr/>
+        </p:nvSpPr>
+        <p:spPr>
+          <a:xfrm>
+            <a:off x="2349068" y="3166402"/>
+            <a:ext cx="914400" cy="533400"/>
+          </a:xfrm>
+          <a:prstGeom prst="rect">
+            <a:avLst/>
+          </a:prstGeom>
+          <a:solidFill>
+            <a:srgbClr val="92D050"/>
+          </a:solidFill>
+        </p:spPr>
+        <p:style>
+          <a:lnRef idx="2">
+            <a:schemeClr val="accent1">
+              <a:shade val="50000"/>
+            </a:schemeClr>
+          </a:lnRef>
+          <a:fillRef idx="1">
+            <a:schemeClr val="accent1"/>
+          </a:fillRef>
+          <a:effectRef idx="0">
+            <a:schemeClr val="accent1"/>
+          </a:effectRef>
+          <a:fontRef idx="minor">
+            <a:schemeClr val="lt1"/>
+          </a:fontRef>
+        </p:style>
+        <p:txBody>
+          <a:bodyPr rtlCol="0" anchor="ctr"/>
+          <a:lstStyle/>
+          <a:p>
+            <a:pPr algn="ctr"/>
+            <a:endParaRPr lang="ru-RU"/>
+          </a:p>
+        </p:txBody>
+      </p:sp>
+      <p:sp>
+        <p:nvSpPr>
+          <p:cNvPr id="24" name="Rectangle 23"/>
+          <p:cNvSpPr/>
+          <p:nvPr/>
+        </p:nvSpPr>
+        <p:spPr>
+          <a:xfrm>
+            <a:off x="356906" y="4128692"/>
+            <a:ext cx="914400" cy="533400"/>
+          </a:xfrm>
+          <a:prstGeom prst="rect">
+            <a:avLst/>
+          </a:prstGeom>
+          <a:solidFill>
+            <a:srgbClr val="92D050"/>
+          </a:solidFill>
+        </p:spPr>
+        <p:style>
+          <a:lnRef idx="2">
+            <a:schemeClr val="accent1">
+              <a:shade val="50000"/>
+            </a:schemeClr>
+          </a:lnRef>
+          <a:fillRef idx="1">
+            <a:schemeClr val="accent1"/>
+          </a:fillRef>
+          <a:effectRef idx="0">
+            <a:schemeClr val="accent1"/>
+          </a:effectRef>
+          <a:fontRef idx="minor">
+            <a:schemeClr val="lt1"/>
+          </a:fontRef>
+        </p:style>
+        <p:txBody>
+          <a:bodyPr rtlCol="0" anchor="ctr"/>
+          <a:lstStyle/>
+          <a:p>
+            <a:pPr algn="ctr"/>
+            <a:endParaRPr lang="ru-RU"/>
+          </a:p>
+        </p:txBody>
+      </p:sp>
+      <p:sp>
+        <p:nvSpPr>
+          <p:cNvPr id="25" name="Rectangle 24"/>
+          <p:cNvSpPr/>
+          <p:nvPr/>
+        </p:nvSpPr>
+        <p:spPr>
+          <a:xfrm>
+            <a:off x="1595681" y="4137258"/>
+            <a:ext cx="914400" cy="533400"/>
+          </a:xfrm>
+          <a:prstGeom prst="rect">
+            <a:avLst/>
+          </a:prstGeom>
+          <a:solidFill>
+            <a:srgbClr val="92D050"/>
+          </a:solidFill>
+        </p:spPr>
+        <p:style>
+          <a:lnRef idx="2">
+            <a:schemeClr val="accent1">
+              <a:shade val="50000"/>
+            </a:schemeClr>
+          </a:lnRef>
+          <a:fillRef idx="1">
+            <a:schemeClr val="accent1"/>
+          </a:fillRef>
+          <a:effectRef idx="0">
+            <a:schemeClr val="accent1"/>
+          </a:effectRef>
+          <a:fontRef idx="minor">
+            <a:schemeClr val="lt1"/>
+          </a:fontRef>
+        </p:style>
+        <p:txBody>
+          <a:bodyPr rtlCol="0" anchor="ctr"/>
+          <a:lstStyle/>
+          <a:p>
+            <a:pPr algn="ctr"/>
+            <a:endParaRPr lang="ru-RU"/>
+          </a:p>
+        </p:txBody>
+      </p:sp>
+      <p:sp>
+        <p:nvSpPr>
+          <p:cNvPr id="26" name="Rectangle 25"/>
+          <p:cNvSpPr/>
+          <p:nvPr/>
+        </p:nvSpPr>
+        <p:spPr>
+          <a:xfrm>
+            <a:off x="7103745" y="4136066"/>
+            <a:ext cx="914400" cy="533400"/>
+          </a:xfrm>
+          <a:prstGeom prst="rect">
+            <a:avLst/>
+          </a:prstGeom>
+          <a:solidFill>
+            <a:srgbClr val="92D050"/>
+          </a:solidFill>
+        </p:spPr>
+        <p:style>
+          <a:lnRef idx="2">
+            <a:schemeClr val="accent1">
+              <a:shade val="50000"/>
+            </a:schemeClr>
+          </a:lnRef>
+          <a:fillRef idx="1">
+            <a:schemeClr val="accent1"/>
+          </a:fillRef>
+          <a:effectRef idx="0">
+            <a:schemeClr val="accent1"/>
+          </a:effectRef>
+          <a:fontRef idx="minor">
+            <a:schemeClr val="lt1"/>
+          </a:fontRef>
+        </p:style>
+        <p:txBody>
+          <a:bodyPr rtlCol="0" anchor="ctr"/>
+          <a:lstStyle/>
+          <a:p>
+            <a:pPr algn="ctr"/>
+            <a:endParaRPr lang="ru-RU"/>
+          </a:p>
+        </p:txBody>
+      </p:sp>
+      <p:sp>
+        <p:nvSpPr>
+          <p:cNvPr id="27" name="Rectangle 26"/>
+          <p:cNvSpPr/>
+          <p:nvPr/>
+        </p:nvSpPr>
+        <p:spPr>
+          <a:xfrm>
+            <a:off x="7800182" y="5146246"/>
+            <a:ext cx="914400" cy="533400"/>
+          </a:xfrm>
+          <a:prstGeom prst="rect">
+            <a:avLst/>
+          </a:prstGeom>
+          <a:solidFill>
+            <a:srgbClr val="92D050"/>
+          </a:solidFill>
+        </p:spPr>
+        <p:style>
+          <a:lnRef idx="2">
+            <a:schemeClr val="accent1">
+              <a:shade val="50000"/>
+            </a:schemeClr>
+          </a:lnRef>
+          <a:fillRef idx="1">
+            <a:schemeClr val="accent1"/>
+          </a:fillRef>
+          <a:effectRef idx="0">
+            <a:schemeClr val="accent1"/>
+          </a:effectRef>
+          <a:fontRef idx="minor">
+            <a:schemeClr val="lt1"/>
+          </a:fontRef>
+        </p:style>
+        <p:txBody>
+          <a:bodyPr rtlCol="0" anchor="ctr"/>
+          <a:lstStyle/>
+          <a:p>
+            <a:pPr algn="ctr"/>
+            <a:endParaRPr lang="ru-RU"/>
+          </a:p>
+        </p:txBody>
+      </p:sp>
+      <p:sp>
+        <p:nvSpPr>
+          <p:cNvPr id="28" name="Rectangle 27"/>
+          <p:cNvSpPr/>
+          <p:nvPr/>
+        </p:nvSpPr>
+        <p:spPr>
+          <a:xfrm>
+            <a:off x="681281" y="5108114"/>
+            <a:ext cx="914400" cy="533400"/>
+          </a:xfrm>
+          <a:prstGeom prst="rect">
+            <a:avLst/>
+          </a:prstGeom>
+          <a:solidFill>
+            <a:srgbClr val="92D050"/>
+          </a:solidFill>
+        </p:spPr>
+        <p:style>
+          <a:lnRef idx="2">
+            <a:schemeClr val="accent1">
+              <a:shade val="50000"/>
+            </a:schemeClr>
+          </a:lnRef>
+          <a:fillRef idx="1">
+            <a:schemeClr val="accent1"/>
+          </a:fillRef>
+          <a:effectRef idx="0">
+            <a:schemeClr val="accent1"/>
+          </a:effectRef>
+          <a:fontRef idx="minor">
+            <a:schemeClr val="lt1"/>
+          </a:fontRef>
+        </p:style>
+        <p:txBody>
+          <a:bodyPr rtlCol="0" anchor="ctr"/>
+          <a:lstStyle/>
+          <a:p>
+            <a:pPr algn="ctr"/>
+            <a:endParaRPr lang="ru-RU"/>
+          </a:p>
+        </p:txBody>
+      </p:sp>
+      <p:sp>
+        <p:nvSpPr>
+          <p:cNvPr id="29" name="Rectangle 28"/>
+          <p:cNvSpPr/>
+          <p:nvPr/>
+        </p:nvSpPr>
+        <p:spPr>
+          <a:xfrm>
+            <a:off x="2346233" y="6014227"/>
+            <a:ext cx="914400" cy="533400"/>
+          </a:xfrm>
+          <a:prstGeom prst="rect">
+            <a:avLst/>
+          </a:prstGeom>
+          <a:solidFill>
+            <a:srgbClr val="92D050"/>
+          </a:solidFill>
+        </p:spPr>
+        <p:style>
+          <a:lnRef idx="2">
+            <a:schemeClr val="accent1">
+              <a:shade val="50000"/>
+            </a:schemeClr>
+          </a:lnRef>
+          <a:fillRef idx="1">
+            <a:schemeClr val="accent1"/>
+          </a:fillRef>
+          <a:effectRef idx="0">
+            <a:schemeClr val="accent1"/>
+          </a:effectRef>
+          <a:fontRef idx="minor">
+            <a:schemeClr val="lt1"/>
+          </a:fontRef>
+        </p:style>
+        <p:txBody>
+          <a:bodyPr rtlCol="0" anchor="ctr"/>
+          <a:lstStyle/>
+          <a:p>
+            <a:pPr algn="ctr"/>
+            <a:endParaRPr lang="ru-RU"/>
+          </a:p>
+        </p:txBody>
+      </p:sp>
+      <p:sp>
+        <p:nvSpPr>
+          <p:cNvPr id="30" name="Rectangle 29"/>
+          <p:cNvSpPr/>
+          <p:nvPr/>
+        </p:nvSpPr>
+        <p:spPr>
+          <a:xfrm>
+            <a:off x="3556358" y="6014227"/>
+            <a:ext cx="914400" cy="533400"/>
+          </a:xfrm>
+          <a:prstGeom prst="rect">
+            <a:avLst/>
+          </a:prstGeom>
+          <a:solidFill>
+            <a:srgbClr val="92D050"/>
+          </a:solidFill>
+        </p:spPr>
+        <p:style>
+          <a:lnRef idx="2">
+            <a:schemeClr val="accent1">
+              <a:shade val="50000"/>
+            </a:schemeClr>
+          </a:lnRef>
+          <a:fillRef idx="1">
+            <a:schemeClr val="accent1"/>
+          </a:fillRef>
+          <a:effectRef idx="0">
+            <a:schemeClr val="accent1"/>
+          </a:effectRef>
+          <a:fontRef idx="minor">
+            <a:schemeClr val="lt1"/>
+          </a:fontRef>
+        </p:style>
+        <p:txBody>
+          <a:bodyPr rtlCol="0" anchor="ctr"/>
+          <a:lstStyle/>
+          <a:p>
+            <a:pPr algn="ctr"/>
+            <a:endParaRPr lang="ru-RU"/>
+          </a:p>
+        </p:txBody>
+      </p:sp>
+      <p:sp>
+        <p:nvSpPr>
+          <p:cNvPr id="31" name="Rectangle 30"/>
+          <p:cNvSpPr/>
+          <p:nvPr/>
+        </p:nvSpPr>
+        <p:spPr>
+          <a:xfrm>
+            <a:off x="4859065" y="6073593"/>
+            <a:ext cx="914400" cy="533400"/>
+          </a:xfrm>
+          <a:prstGeom prst="rect">
+            <a:avLst/>
+          </a:prstGeom>
+          <a:solidFill>
+            <a:srgbClr val="92D050"/>
+          </a:solidFill>
+        </p:spPr>
+        <p:style>
+          <a:lnRef idx="2">
+            <a:schemeClr val="accent1">
+              <a:shade val="50000"/>
+            </a:schemeClr>
+          </a:lnRef>
+          <a:fillRef idx="1">
+            <a:schemeClr val="accent1"/>
+          </a:fillRef>
+          <a:effectRef idx="0">
+            <a:schemeClr val="accent1"/>
+          </a:effectRef>
+          <a:fontRef idx="minor">
+            <a:schemeClr val="lt1"/>
+          </a:fontRef>
+        </p:style>
+        <p:txBody>
+          <a:bodyPr rtlCol="0" anchor="ctr"/>
+          <a:lstStyle/>
+          <a:p>
+            <a:pPr algn="ctr"/>
+            <a:endParaRPr lang="ru-RU"/>
+          </a:p>
+        </p:txBody>
+      </p:sp>
+      <p:cxnSp>
+        <p:nvCxnSpPr>
+          <p:cNvPr id="33" name="Straight Connector 32"/>
+          <p:cNvCxnSpPr>
+            <a:stCxn id="7" idx="2"/>
+            <a:endCxn id="22" idx="0"/>
+          </p:cNvCxnSpPr>
+          <p:nvPr/>
+        </p:nvCxnSpPr>
+        <p:spPr>
+          <a:xfrm flipH="1">
+            <a:off x="1424681" y="2607630"/>
+            <a:ext cx="692132" cy="558772"/>
+          </a:xfrm>
+          <a:prstGeom prst="line">
+            <a:avLst/>
+          </a:prstGeom>
+          <a:ln w="22225">
+            <a:solidFill>
+              <a:srgbClr val="00B050"/>
+            </a:solidFill>
+          </a:ln>
+        </p:spPr>
+        <p:style>
+          <a:lnRef idx="1">
+            <a:schemeClr val="accent1"/>
+          </a:lnRef>
+          <a:fillRef idx="0">
+            <a:schemeClr val="accent1"/>
+          </a:fillRef>
+          <a:effectRef idx="0">
+            <a:schemeClr val="accent1"/>
+          </a:effectRef>
+          <a:fontRef idx="minor">
+            <a:schemeClr val="tx1"/>
+          </a:fontRef>
+        </p:style>
+      </p:cxnSp>
+      <p:cxnSp>
+        <p:nvCxnSpPr>
+          <p:cNvPr id="34" name="Straight Connector 33"/>
+          <p:cNvCxnSpPr>
+            <a:stCxn id="7" idx="2"/>
+            <a:endCxn id="23" idx="0"/>
+          </p:cNvCxnSpPr>
+          <p:nvPr/>
+        </p:nvCxnSpPr>
+        <p:spPr>
+          <a:xfrm>
+            <a:off x="2116813" y="2607630"/>
+            <a:ext cx="689455" cy="558772"/>
+          </a:xfrm>
+          <a:prstGeom prst="line">
+            <a:avLst/>
+          </a:prstGeom>
+          <a:ln w="22225">
+            <a:solidFill>
+              <a:srgbClr val="00B050"/>
+            </a:solidFill>
+          </a:ln>
+        </p:spPr>
+        <p:style>
+          <a:lnRef idx="1">
+            <a:schemeClr val="accent1"/>
+          </a:lnRef>
+          <a:fillRef idx="0">
+            <a:schemeClr val="accent1"/>
+          </a:fillRef>
+          <a:effectRef idx="0">
+            <a:schemeClr val="accent1"/>
+          </a:effectRef>
+          <a:fontRef idx="minor">
+            <a:schemeClr val="tx1"/>
+          </a:fontRef>
+        </p:style>
+      </p:cxnSp>
+      <p:cxnSp>
+        <p:nvCxnSpPr>
+          <p:cNvPr id="37" name="Straight Connector 36"/>
+          <p:cNvCxnSpPr>
+            <a:stCxn id="22" idx="2"/>
+            <a:endCxn id="25" idx="0"/>
+          </p:cNvCxnSpPr>
+          <p:nvPr/>
+        </p:nvCxnSpPr>
+        <p:spPr>
+          <a:xfrm>
+            <a:off x="1424681" y="3699802"/>
+            <a:ext cx="628200" cy="437456"/>
+          </a:xfrm>
+          <a:prstGeom prst="line">
+            <a:avLst/>
+          </a:prstGeom>
+          <a:ln w="22225">
+            <a:solidFill>
+              <a:srgbClr val="00B050"/>
+            </a:solidFill>
+          </a:ln>
+        </p:spPr>
+        <p:style>
+          <a:lnRef idx="1">
+            <a:schemeClr val="accent1"/>
+          </a:lnRef>
+          <a:fillRef idx="0">
+            <a:schemeClr val="accent1"/>
+          </a:fillRef>
+          <a:effectRef idx="0">
+            <a:schemeClr val="accent1"/>
+          </a:effectRef>
+          <a:fontRef idx="minor">
+            <a:schemeClr val="tx1"/>
+          </a:fontRef>
+        </p:style>
+      </p:cxnSp>
+      <p:cxnSp>
+        <p:nvCxnSpPr>
+          <p:cNvPr id="39" name="Straight Connector 38"/>
+          <p:cNvCxnSpPr>
+            <a:stCxn id="22" idx="2"/>
+            <a:endCxn id="24" idx="0"/>
+          </p:cNvCxnSpPr>
+          <p:nvPr/>
+        </p:nvCxnSpPr>
+        <p:spPr>
+          <a:xfrm flipH="1">
+            <a:off x="814106" y="3699802"/>
+            <a:ext cx="610575" cy="428890"/>
+          </a:xfrm>
+          <a:prstGeom prst="line">
+            <a:avLst/>
+          </a:prstGeom>
+          <a:ln w="22225">
+            <a:solidFill>
+              <a:srgbClr val="00B050"/>
+            </a:solidFill>
+          </a:ln>
+        </p:spPr>
+        <p:style>
+          <a:lnRef idx="1">
+            <a:schemeClr val="accent1"/>
+          </a:lnRef>
+          <a:fillRef idx="0">
+            <a:schemeClr val="accent1"/>
+          </a:fillRef>
+          <a:effectRef idx="0">
+            <a:schemeClr val="accent1"/>
+          </a:effectRef>
+          <a:fontRef idx="minor">
+            <a:schemeClr val="tx1"/>
+          </a:fontRef>
+        </p:style>
+      </p:cxnSp>
+      <p:cxnSp>
+        <p:nvCxnSpPr>
+          <p:cNvPr id="42" name="Straight Connector 41"/>
+          <p:cNvCxnSpPr>
+            <a:stCxn id="24" idx="2"/>
+            <a:endCxn id="28" idx="0"/>
+          </p:cNvCxnSpPr>
+          <p:nvPr/>
+        </p:nvCxnSpPr>
+        <p:spPr>
+          <a:xfrm>
+            <a:off x="814106" y="4662092"/>
+            <a:ext cx="324375" cy="446022"/>
+          </a:xfrm>
+          <a:prstGeom prst="line">
+            <a:avLst/>
+          </a:prstGeom>
+          <a:ln w="22225">
+            <a:solidFill>
+              <a:srgbClr val="00B050"/>
+            </a:solidFill>
+          </a:ln>
+        </p:spPr>
+        <p:style>
+          <a:lnRef idx="1">
+            <a:schemeClr val="accent1"/>
+          </a:lnRef>
+          <a:fillRef idx="0">
+            <a:schemeClr val="accent1"/>
+          </a:fillRef>
+          <a:effectRef idx="0">
+            <a:schemeClr val="accent1"/>
+          </a:effectRef>
+          <a:fontRef idx="minor">
+            <a:schemeClr val="tx1"/>
+          </a:fontRef>
+        </p:style>
+      </p:cxnSp>
+      <p:cxnSp>
+        <p:nvCxnSpPr>
+          <p:cNvPr id="56" name="Straight Connector 55"/>
+          <p:cNvCxnSpPr>
+            <a:stCxn id="12" idx="2"/>
+            <a:endCxn id="15" idx="0"/>
+          </p:cNvCxnSpPr>
+          <p:nvPr/>
+        </p:nvCxnSpPr>
+        <p:spPr>
+          <a:xfrm>
+            <a:off x="4629645" y="2578924"/>
+            <a:ext cx="10933" cy="545745"/>
+          </a:xfrm>
+          <a:prstGeom prst="line">
+            <a:avLst/>
+          </a:prstGeom>
+          <a:ln w="22225">
+            <a:solidFill>
+              <a:srgbClr val="00B050"/>
+            </a:solidFill>
+          </a:ln>
+        </p:spPr>
+        <p:style>
+          <a:lnRef idx="1">
+            <a:schemeClr val="accent1"/>
+          </a:lnRef>
+          <a:fillRef idx="0">
+            <a:schemeClr val="accent1"/>
+          </a:fillRef>
+          <a:effectRef idx="0">
+            <a:schemeClr val="accent1"/>
+          </a:effectRef>
+          <a:fontRef idx="minor">
+            <a:schemeClr val="tx1"/>
+          </a:fontRef>
+        </p:style>
+      </p:cxnSp>
+      <p:cxnSp>
+        <p:nvCxnSpPr>
+          <p:cNvPr id="60" name="Straight Connector 59"/>
+          <p:cNvCxnSpPr>
+            <a:stCxn id="15" idx="2"/>
+            <a:endCxn id="16" idx="0"/>
+          </p:cNvCxnSpPr>
+          <p:nvPr/>
+        </p:nvCxnSpPr>
+        <p:spPr>
+          <a:xfrm flipH="1">
+            <a:off x="3871376" y="3658069"/>
+            <a:ext cx="769202" cy="477997"/>
+          </a:xfrm>
+          <a:prstGeom prst="line">
+            <a:avLst/>
+          </a:prstGeom>
+          <a:ln w="22225">
+            <a:solidFill>
+              <a:srgbClr val="00B050"/>
+            </a:solidFill>
+          </a:ln>
+        </p:spPr>
+        <p:style>
+          <a:lnRef idx="1">
+            <a:schemeClr val="accent1"/>
+          </a:lnRef>
+          <a:fillRef idx="0">
+            <a:schemeClr val="accent1"/>
+          </a:fillRef>
+          <a:effectRef idx="0">
+            <a:schemeClr val="accent1"/>
+          </a:effectRef>
+          <a:fontRef idx="minor">
+            <a:schemeClr val="tx1"/>
+          </a:fontRef>
+        </p:style>
+      </p:cxnSp>
+      <p:cxnSp>
+        <p:nvCxnSpPr>
+          <p:cNvPr id="63" name="Straight Connector 62"/>
+          <p:cNvCxnSpPr>
+            <a:stCxn id="15" idx="2"/>
+            <a:endCxn id="17" idx="0"/>
+          </p:cNvCxnSpPr>
+          <p:nvPr/>
+        </p:nvCxnSpPr>
+        <p:spPr>
+          <a:xfrm>
+            <a:off x="4640578" y="3658069"/>
+            <a:ext cx="602860" cy="477997"/>
+          </a:xfrm>
+          <a:prstGeom prst="line">
+            <a:avLst/>
+          </a:prstGeom>
+          <a:ln w="22225">
+            <a:solidFill>
+              <a:srgbClr val="00B050"/>
+            </a:solidFill>
+          </a:ln>
+        </p:spPr>
+        <p:style>
+          <a:lnRef idx="1">
+            <a:schemeClr val="accent1"/>
+          </a:lnRef>
+          <a:fillRef idx="0">
+            <a:schemeClr val="accent1"/>
+          </a:fillRef>
+          <a:effectRef idx="0">
+            <a:schemeClr val="accent1"/>
+          </a:effectRef>
+          <a:fontRef idx="minor">
+            <a:schemeClr val="tx1"/>
+          </a:fontRef>
+        </p:style>
+      </p:cxnSp>
+      <p:cxnSp>
+        <p:nvCxnSpPr>
+          <p:cNvPr id="66" name="Straight Connector 65"/>
+          <p:cNvCxnSpPr>
+            <a:stCxn id="16" idx="2"/>
+            <a:endCxn id="18" idx="0"/>
+          </p:cNvCxnSpPr>
+          <p:nvPr/>
+        </p:nvCxnSpPr>
+        <p:spPr>
+          <a:xfrm flipH="1">
+            <a:off x="3403244" y="4669466"/>
+            <a:ext cx="468132" cy="420324"/>
+          </a:xfrm>
+          <a:prstGeom prst="line">
+            <a:avLst/>
+          </a:prstGeom>
+          <a:ln w="22225">
+            <a:solidFill>
+              <a:srgbClr val="00B050"/>
+            </a:solidFill>
+          </a:ln>
+        </p:spPr>
+        <p:style>
+          <a:lnRef idx="1">
+            <a:schemeClr val="accent1"/>
+          </a:lnRef>
+          <a:fillRef idx="0">
+            <a:schemeClr val="accent1"/>
+          </a:fillRef>
+          <a:effectRef idx="0">
+            <a:schemeClr val="accent1"/>
+          </a:effectRef>
+          <a:fontRef idx="minor">
+            <a:schemeClr val="tx1"/>
+          </a:fontRef>
+        </p:style>
+      </p:cxnSp>
+      <p:cxnSp>
+        <p:nvCxnSpPr>
+          <p:cNvPr id="69" name="Straight Connector 68"/>
+          <p:cNvCxnSpPr>
+            <a:stCxn id="16" idx="2"/>
+            <a:endCxn id="19" idx="0"/>
+          </p:cNvCxnSpPr>
+          <p:nvPr/>
+        </p:nvCxnSpPr>
+        <p:spPr>
+          <a:xfrm>
+            <a:off x="3871376" y="4669466"/>
+            <a:ext cx="741993" cy="420324"/>
+          </a:xfrm>
+          <a:prstGeom prst="line">
+            <a:avLst/>
+          </a:prstGeom>
+          <a:ln w="22225">
+            <a:solidFill>
+              <a:srgbClr val="00B050"/>
+            </a:solidFill>
+          </a:ln>
+        </p:spPr>
+        <p:style>
+          <a:lnRef idx="1">
+            <a:schemeClr val="accent1"/>
+          </a:lnRef>
+          <a:fillRef idx="0">
+            <a:schemeClr val="accent1"/>
+          </a:fillRef>
+          <a:effectRef idx="0">
+            <a:schemeClr val="accent1"/>
+          </a:effectRef>
+          <a:fontRef idx="minor">
+            <a:schemeClr val="tx1"/>
+          </a:fontRef>
+        </p:style>
+      </p:cxnSp>
+      <p:cxnSp>
+        <p:nvCxnSpPr>
+          <p:cNvPr id="72" name="Straight Connector 71"/>
+          <p:cNvCxnSpPr>
+            <a:stCxn id="18" idx="2"/>
+            <a:endCxn id="29" idx="0"/>
+          </p:cNvCxnSpPr>
+          <p:nvPr/>
+        </p:nvCxnSpPr>
+        <p:spPr>
+          <a:xfrm flipH="1">
+            <a:off x="2803433" y="5623190"/>
+            <a:ext cx="599811" cy="391037"/>
+          </a:xfrm>
+          <a:prstGeom prst="line">
+            <a:avLst/>
+          </a:prstGeom>
+          <a:ln w="22225">
+            <a:solidFill>
+              <a:srgbClr val="00B050"/>
+            </a:solidFill>
+          </a:ln>
+        </p:spPr>
+        <p:style>
+          <a:lnRef idx="1">
+            <a:schemeClr val="accent1"/>
+          </a:lnRef>
+          <a:fillRef idx="0">
+            <a:schemeClr val="accent1"/>
+          </a:fillRef>
+          <a:effectRef idx="0">
+            <a:schemeClr val="accent1"/>
+          </a:effectRef>
+          <a:fontRef idx="minor">
+            <a:schemeClr val="tx1"/>
+          </a:fontRef>
+        </p:style>
+      </p:cxnSp>
+      <p:cxnSp>
+        <p:nvCxnSpPr>
+          <p:cNvPr id="75" name="Straight Connector 74"/>
+          <p:cNvCxnSpPr>
+            <a:stCxn id="18" idx="2"/>
+            <a:endCxn id="30" idx="0"/>
+          </p:cNvCxnSpPr>
+          <p:nvPr/>
+        </p:nvCxnSpPr>
+        <p:spPr>
+          <a:xfrm>
+            <a:off x="3403244" y="5623190"/>
+            <a:ext cx="610314" cy="391037"/>
+          </a:xfrm>
+          <a:prstGeom prst="line">
+            <a:avLst/>
+          </a:prstGeom>
+          <a:ln w="22225">
+            <a:solidFill>
+              <a:srgbClr val="00B050"/>
+            </a:solidFill>
+          </a:ln>
+        </p:spPr>
+        <p:style>
+          <a:lnRef idx="1">
+            <a:schemeClr val="accent1"/>
+          </a:lnRef>
+          <a:fillRef idx="0">
+            <a:schemeClr val="accent1"/>
+          </a:fillRef>
+          <a:effectRef idx="0">
+            <a:schemeClr val="accent1"/>
+          </a:effectRef>
+          <a:fontRef idx="minor">
+            <a:schemeClr val="tx1"/>
+          </a:fontRef>
+        </p:style>
+      </p:cxnSp>
+      <p:cxnSp>
+        <p:nvCxnSpPr>
+          <p:cNvPr id="78" name="Straight Connector 77"/>
+          <p:cNvCxnSpPr>
+            <a:stCxn id="20" idx="2"/>
+            <a:endCxn id="31" idx="0"/>
+          </p:cNvCxnSpPr>
+          <p:nvPr/>
+        </p:nvCxnSpPr>
+        <p:spPr>
+          <a:xfrm flipH="1">
+            <a:off x="5316265" y="5682556"/>
+            <a:ext cx="599811" cy="391037"/>
+          </a:xfrm>
+          <a:prstGeom prst="line">
+            <a:avLst/>
+          </a:prstGeom>
+          <a:ln w="22225">
+            <a:solidFill>
+              <a:srgbClr val="00B050"/>
+            </a:solidFill>
+          </a:ln>
+        </p:spPr>
+        <p:style>
+          <a:lnRef idx="1">
+            <a:schemeClr val="accent1"/>
+          </a:lnRef>
+          <a:fillRef idx="0">
+            <a:schemeClr val="accent1"/>
+          </a:fillRef>
+          <a:effectRef idx="0">
+            <a:schemeClr val="accent1"/>
+          </a:effectRef>
+          <a:fontRef idx="minor">
+            <a:schemeClr val="tx1"/>
+          </a:fontRef>
+        </p:style>
+      </p:cxnSp>
+      <p:cxnSp>
+        <p:nvCxnSpPr>
+          <p:cNvPr id="81" name="Straight Connector 80"/>
+          <p:cNvCxnSpPr>
+            <a:stCxn id="17" idx="2"/>
+            <a:endCxn id="20" idx="0"/>
+          </p:cNvCxnSpPr>
+          <p:nvPr/>
+        </p:nvCxnSpPr>
+        <p:spPr>
+          <a:xfrm>
+            <a:off x="5243438" y="4669466"/>
+            <a:ext cx="672638" cy="479690"/>
+          </a:xfrm>
+          <a:prstGeom prst="line">
+            <a:avLst/>
+          </a:prstGeom>
+          <a:ln w="22225">
+            <a:solidFill>
+              <a:srgbClr val="00B050"/>
+            </a:solidFill>
+          </a:ln>
+        </p:spPr>
+        <p:style>
+          <a:lnRef idx="1">
+            <a:schemeClr val="accent1"/>
+          </a:lnRef>
+          <a:fillRef idx="0">
+            <a:schemeClr val="accent1"/>
+          </a:fillRef>
+          <a:effectRef idx="0">
+            <a:schemeClr val="accent1"/>
+          </a:effectRef>
+          <a:fontRef idx="minor">
+            <a:schemeClr val="tx1"/>
+          </a:fontRef>
+        </p:style>
+      </p:cxnSp>
+      <p:cxnSp>
+        <p:nvCxnSpPr>
+          <p:cNvPr id="85" name="Straight Connector 84"/>
+          <p:cNvCxnSpPr>
+            <a:stCxn id="9" idx="2"/>
+            <a:endCxn id="21" idx="0"/>
+          </p:cNvCxnSpPr>
+          <p:nvPr/>
+        </p:nvCxnSpPr>
+        <p:spPr>
+          <a:xfrm>
+            <a:off x="6954675" y="2607630"/>
+            <a:ext cx="0" cy="558772"/>
+          </a:xfrm>
+          <a:prstGeom prst="line">
+            <a:avLst/>
+          </a:prstGeom>
+          <a:ln w="22225">
+            <a:solidFill>
+              <a:srgbClr val="00B050"/>
+            </a:solidFill>
+          </a:ln>
+        </p:spPr>
+        <p:style>
+          <a:lnRef idx="1">
+            <a:schemeClr val="accent1"/>
+          </a:lnRef>
+          <a:fillRef idx="0">
+            <a:schemeClr val="accent1"/>
+          </a:fillRef>
+          <a:effectRef idx="0">
+            <a:schemeClr val="accent1"/>
+          </a:effectRef>
+          <a:fontRef idx="minor">
+            <a:schemeClr val="tx1"/>
+          </a:fontRef>
+        </p:style>
+      </p:cxnSp>
+      <p:cxnSp>
+        <p:nvCxnSpPr>
+          <p:cNvPr id="89" name="Straight Connector 88"/>
+          <p:cNvCxnSpPr>
+            <a:stCxn id="21" idx="2"/>
+            <a:endCxn id="26" idx="0"/>
+          </p:cNvCxnSpPr>
+          <p:nvPr/>
+        </p:nvCxnSpPr>
+        <p:spPr>
+          <a:xfrm>
+            <a:off x="6954675" y="3699802"/>
+            <a:ext cx="606270" cy="436264"/>
+          </a:xfrm>
+          <a:prstGeom prst="line">
+            <a:avLst/>
+          </a:prstGeom>
+          <a:ln w="22225">
+            <a:solidFill>
+              <a:srgbClr val="00B050"/>
+            </a:solidFill>
+          </a:ln>
+        </p:spPr>
+        <p:style>
+          <a:lnRef idx="1">
+            <a:schemeClr val="accent1"/>
+          </a:lnRef>
+          <a:fillRef idx="0">
+            <a:schemeClr val="accent1"/>
+          </a:fillRef>
+          <a:effectRef idx="0">
+            <a:schemeClr val="accent1"/>
+          </a:effectRef>
+          <a:fontRef idx="minor">
+            <a:schemeClr val="tx1"/>
+          </a:fontRef>
+        </p:style>
+      </p:cxnSp>
+      <p:cxnSp>
+        <p:nvCxnSpPr>
+          <p:cNvPr id="92" name="Straight Connector 91"/>
+          <p:cNvCxnSpPr>
+            <a:stCxn id="26" idx="2"/>
+            <a:endCxn id="27" idx="0"/>
+          </p:cNvCxnSpPr>
+          <p:nvPr/>
+        </p:nvCxnSpPr>
+        <p:spPr>
+          <a:xfrm>
+            <a:off x="7560945" y="4669466"/>
+            <a:ext cx="696437" cy="476780"/>
+          </a:xfrm>
+          <a:prstGeom prst="line">
+            <a:avLst/>
+          </a:prstGeom>
+          <a:ln w="22225">
+            <a:solidFill>
+              <a:srgbClr val="00B050"/>
+            </a:solidFill>
+          </a:ln>
+        </p:spPr>
+        <p:style>
+          <a:lnRef idx="1">
+            <a:schemeClr val="accent1"/>
+          </a:lnRef>
+          <a:fillRef idx="0">
+            <a:schemeClr val="accent1"/>
+          </a:fillRef>
+          <a:effectRef idx="0">
+            <a:schemeClr val="accent1"/>
+          </a:effectRef>
+          <a:fontRef idx="minor">
+            <a:schemeClr val="tx1"/>
+          </a:fontRef>
+        </p:style>
+      </p:cxnSp>
     </p:spTree>
     <p:extLst>
       <p:ext uri="{BB962C8B-B14F-4D97-AF65-F5344CB8AC3E}">

</xml_diff>

<commit_message>
update garbage collection in dotnet slides
</commit_message>
<xml_diff>
--- a/ppt/Garbage collection in dotnet.pptx
+++ b/ppt/Garbage collection in dotnet.pptx
@@ -7,10 +7,11 @@
   <p:sldIdLst>
     <p:sldId id="256" r:id="rId2"/>
     <p:sldId id="257" r:id="rId3"/>
-    <p:sldId id="259" r:id="rId4"/>
-    <p:sldId id="258" r:id="rId5"/>
-    <p:sldId id="261" r:id="rId6"/>
-    <p:sldId id="260" r:id="rId7"/>
+    <p:sldId id="262" r:id="rId4"/>
+    <p:sldId id="259" r:id="rId5"/>
+    <p:sldId id="258" r:id="rId6"/>
+    <p:sldId id="261" r:id="rId7"/>
+    <p:sldId id="260" r:id="rId8"/>
   </p:sldIdLst>
   <p:sldSz cx="9144000" cy="6858000" type="screen4x3"/>
   <p:notesSz cx="6858000" cy="9144000"/>
@@ -6067,13 +6068,36 @@
           <a:p>
             <a:r>
               <a:rPr lang="en-US" dirty="0" smtClean="0"/>
-              <a:t>Memory allocation process</a:t>
-            </a:r>
-          </a:p>
-          <a:p>
+              <a:t>Reference counting vs</a:t>
+            </a:r>
             <a:r>
               <a:rPr lang="en-US" dirty="0" smtClean="0"/>
-              <a:t>Mark and sweep algorithm</a:t>
+              <a:t>. tracing</a:t>
+            </a:r>
+            <a:endParaRPr lang="en-US" dirty="0" smtClean="0"/>
+          </a:p>
+          <a:p>
+            <a:r>
+              <a:rPr lang="en-US" dirty="0" smtClean="0"/>
+              <a:t>Memory </a:t>
+            </a:r>
+            <a:r>
+              <a:rPr lang="en-US" dirty="0" smtClean="0"/>
+              <a:t>allocation process</a:t>
+            </a:r>
+          </a:p>
+          <a:p>
+            <a:r>
+              <a:rPr lang="en-US" dirty="0" smtClean="0"/>
+              <a:t>Mark and </a:t>
+            </a:r>
+            <a:r>
+              <a:rPr lang="en-US" dirty="0" smtClean="0"/>
+              <a:t>sweep (and compact) </a:t>
+            </a:r>
+            <a:r>
+              <a:rPr lang="en-US" dirty="0" smtClean="0"/>
+              <a:t>algorithm</a:t>
             </a:r>
           </a:p>
           <a:p>
@@ -6150,7 +6174,7 @@
           <a:p>
             <a:r>
               <a:rPr lang="en-US" dirty="0" smtClean="0"/>
-              <a:t>Memory Allocation process</a:t>
+              <a:t>GC Algorithms</a:t>
             </a:r>
             <a:endParaRPr lang="ru-RU" dirty="0"/>
           </a:p>
@@ -6188,61 +6212,8 @@
                 <a:latin typeface="Calibri" panose="020F0502020204030204" pitchFamily="34" charset="0"/>
                 <a:cs typeface="Calibri" panose="020F0502020204030204" pitchFamily="34" charset="0"/>
               </a:rPr>
-              <a:t>Before CLR executes the first line of the managed code, it creates three application domains.</a:t>
-            </a:r>
-          </a:p>
-          <a:p>
-            <a:pPr marL="800100" lvl="1" indent="-342900">
-              <a:buSzPct val="80000"/>
-              <a:buFont typeface="+mj-lt"/>
-              <a:buAutoNum type="arabicPeriod"/>
-            </a:pPr>
-            <a:r>
-              <a:rPr lang="en-US" sz="2200" cap="none" dirty="0" smtClean="0">
-                <a:latin typeface="Calibri" panose="020F0502020204030204" pitchFamily="34" charset="0"/>
-                <a:cs typeface="Calibri" panose="020F0502020204030204" pitchFamily="34" charset="0"/>
-              </a:rPr>
-              <a:t>System Domain</a:t>
-            </a:r>
-          </a:p>
-          <a:p>
-            <a:pPr marL="800100" lvl="1" indent="-342900">
-              <a:buSzPct val="80000"/>
-              <a:buFont typeface="+mj-lt"/>
-              <a:buAutoNum type="arabicPeriod"/>
-            </a:pPr>
-            <a:r>
-              <a:rPr lang="en-US" sz="2200" cap="none" dirty="0" smtClean="0">
-                <a:latin typeface="Calibri" panose="020F0502020204030204" pitchFamily="34" charset="0"/>
-                <a:cs typeface="Calibri" panose="020F0502020204030204" pitchFamily="34" charset="0"/>
-              </a:rPr>
-              <a:t>Shared Domain</a:t>
-            </a:r>
-          </a:p>
-          <a:p>
-            <a:pPr marL="800100" lvl="1" indent="-342900">
-              <a:buSzPct val="80000"/>
-              <a:buFont typeface="+mj-lt"/>
-              <a:buAutoNum type="arabicPeriod"/>
-            </a:pPr>
-            <a:r>
-              <a:rPr lang="en-US" sz="2200" cap="none" dirty="0" smtClean="0">
-                <a:latin typeface="Calibri" panose="020F0502020204030204" pitchFamily="34" charset="0"/>
-                <a:cs typeface="Calibri" panose="020F0502020204030204" pitchFamily="34" charset="0"/>
-              </a:rPr>
-              <a:t>Default </a:t>
-            </a:r>
-            <a:r>
-              <a:rPr lang="en-US" sz="2200" cap="none" dirty="0" err="1" smtClean="0">
-                <a:latin typeface="Calibri" panose="020F0502020204030204" pitchFamily="34" charset="0"/>
-                <a:cs typeface="Calibri" panose="020F0502020204030204" pitchFamily="34" charset="0"/>
-              </a:rPr>
-              <a:t>AppDomain</a:t>
-            </a:r>
-            <a:endParaRPr lang="en-US" sz="2200" cap="none" dirty="0" smtClean="0">
-              <a:latin typeface="Calibri" panose="020F0502020204030204" pitchFamily="34" charset="0"/>
-              <a:cs typeface="Calibri" panose="020F0502020204030204" pitchFamily="34" charset="0"/>
-            </a:endParaRPr>
+              <a:t>Tracing [McCarthy, 1960]</a:t>
+            </a:r>
           </a:p>
           <a:p>
             <a:pPr marL="342900" indent="-342900">
@@ -6255,8 +6226,12 @@
                 <a:latin typeface="Calibri" panose="020F0502020204030204" pitchFamily="34" charset="0"/>
                 <a:cs typeface="Calibri" panose="020F0502020204030204" pitchFamily="34" charset="0"/>
               </a:rPr>
-              <a:t>Define size of object MyClass</a:t>
-            </a:r>
+              <a:t>Reference Counting [Collins, 1960]</a:t>
+            </a:r>
+            <a:endParaRPr lang="en-US" sz="2400" cap="none" dirty="0" smtClean="0">
+              <a:latin typeface="Calibri" panose="020F0502020204030204" pitchFamily="34" charset="0"/>
+              <a:cs typeface="Calibri" panose="020F0502020204030204" pitchFamily="34" charset="0"/>
+            </a:endParaRPr>
           </a:p>
           <a:p>
             <a:pPr marL="342900" indent="-342900">
@@ -6269,7 +6244,7 @@
                 <a:latin typeface="Calibri" panose="020F0502020204030204" pitchFamily="34" charset="0"/>
                 <a:cs typeface="Calibri" panose="020F0502020204030204" pitchFamily="34" charset="0"/>
               </a:rPr>
-              <a:t>Allocate memory </a:t>
+              <a:t>Copying Collection [Minsky, 1963]</a:t>
             </a:r>
             <a:endParaRPr lang="ru-RU" sz="2400" cap="none" dirty="0">
               <a:latin typeface="Calibri" panose="020F0502020204030204" pitchFamily="34" charset="0"/>
@@ -6278,114 +6253,118 @@
           </a:p>
         </p:txBody>
       </p:sp>
-      <p:sp>
-        <p:nvSpPr>
-          <p:cNvPr id="5" name="Rectangle 4"/>
-          <p:cNvSpPr/>
+      <p:pic>
+        <p:nvPicPr>
+          <p:cNvPr id="6" name="Picture 5"/>
+          <p:cNvPicPr>
+            <a:picLocks noChangeAspect="1"/>
+          </p:cNvPicPr>
           <p:nvPr/>
-        </p:nvSpPr>
-        <p:spPr>
-          <a:xfrm>
-            <a:off x="1922293" y="1371600"/>
-            <a:ext cx="5303579" cy="695195"/>
+        </p:nvPicPr>
+        <p:blipFill>
+          <a:blip r:embed="rId2"/>
+          <a:stretch>
+            <a:fillRect/>
+          </a:stretch>
+        </p:blipFill>
+        <p:spPr>
+          <a:xfrm>
+            <a:off x="7138611" y="4994718"/>
+            <a:ext cx="1503268" cy="1685482"/>
           </a:xfrm>
           <a:prstGeom prst="rect">
             <a:avLst/>
           </a:prstGeom>
-          <a:solidFill>
-            <a:schemeClr val="tx2">
-              <a:lumMod val="25000"/>
-            </a:schemeClr>
-          </a:solidFill>
-          <a:ln>
-            <a:solidFill>
-              <a:schemeClr val="accent6"/>
-            </a:solidFill>
+          <a:ln w="31750">
+            <a:noFill/>
           </a:ln>
-        </p:spPr>
-        <p:style>
-          <a:lnRef idx="2">
-            <a:schemeClr val="accent1">
-              <a:shade val="50000"/>
-            </a:schemeClr>
-          </a:lnRef>
-          <a:fillRef idx="1">
-            <a:schemeClr val="accent1"/>
-          </a:fillRef>
-          <a:effectRef idx="0">
-            <a:schemeClr val="accent1"/>
-          </a:effectRef>
-          <a:fontRef idx="minor">
-            <a:schemeClr val="lt1"/>
-          </a:fontRef>
-        </p:style>
-        <p:txBody>
-          <a:bodyPr rtlCol="0" anchor="ctr"/>
-          <a:lstStyle/>
-          <a:p>
-            <a:pPr algn="ctr"/>
-            <a:r>
-              <a:rPr lang="en-US" sz="2000" dirty="0" smtClean="0">
-                <a:solidFill>
-                  <a:srgbClr val="F137E8"/>
-                </a:solidFill>
-                <a:latin typeface="Courier New" panose="02070309020205020404" pitchFamily="49" charset="0"/>
-                <a:cs typeface="Courier New" panose="02070309020205020404" pitchFamily="49" charset="0"/>
-              </a:rPr>
-              <a:t>MyClass</a:t>
-            </a:r>
-            <a:r>
-              <a:rPr lang="en-US" sz="2000" dirty="0" smtClean="0">
-                <a:latin typeface="Courier New" panose="02070309020205020404" pitchFamily="49" charset="0"/>
-                <a:cs typeface="Courier New" panose="02070309020205020404" pitchFamily="49" charset="0"/>
-              </a:rPr>
-              <a:t> instance = </a:t>
-            </a:r>
-            <a:r>
-              <a:rPr lang="en-US" sz="2000" dirty="0" smtClean="0">
-                <a:solidFill>
-                  <a:srgbClr val="3366FF"/>
-                </a:solidFill>
-                <a:latin typeface="Courier New" panose="02070309020205020404" pitchFamily="49" charset="0"/>
-                <a:cs typeface="Courier New" panose="02070309020205020404" pitchFamily="49" charset="0"/>
-              </a:rPr>
-              <a:t>new</a:t>
-            </a:r>
-            <a:r>
-              <a:rPr lang="en-US" sz="2000" dirty="0" smtClean="0">
-                <a:latin typeface="Courier New" panose="02070309020205020404" pitchFamily="49" charset="0"/>
-                <a:cs typeface="Courier New" panose="02070309020205020404" pitchFamily="49" charset="0"/>
-              </a:rPr>
-              <a:t> </a:t>
-            </a:r>
-            <a:r>
-              <a:rPr lang="en-US" sz="2000" dirty="0" smtClean="0">
-                <a:solidFill>
-                  <a:srgbClr val="F137E8"/>
-                </a:solidFill>
-                <a:latin typeface="Courier New" panose="02070309020205020404" pitchFamily="49" charset="0"/>
-                <a:cs typeface="Courier New" panose="02070309020205020404" pitchFamily="49" charset="0"/>
-              </a:rPr>
-              <a:t>MyClass</a:t>
-            </a:r>
-            <a:r>
-              <a:rPr lang="en-US" sz="2000" dirty="0" smtClean="0">
-                <a:latin typeface="Courier New" panose="02070309020205020404" pitchFamily="49" charset="0"/>
-                <a:cs typeface="Courier New" panose="02070309020205020404" pitchFamily="49" charset="0"/>
-              </a:rPr>
-              <a:t>();</a:t>
-            </a:r>
-            <a:endParaRPr lang="ru-RU" sz="2000" dirty="0">
-              <a:latin typeface="Courier New" panose="02070309020205020404" pitchFamily="49" charset="0"/>
-              <a:cs typeface="Courier New" panose="02070309020205020404" pitchFamily="49" charset="0"/>
-            </a:endParaRPr>
-          </a:p>
-        </p:txBody>
-      </p:sp>
+          <a:effectLst>
+            <a:glow rad="63500">
+              <a:schemeClr val="accent2">
+                <a:satMod val="175000"/>
+                <a:alpha val="40000"/>
+              </a:schemeClr>
+            </a:glow>
+            <a:softEdge rad="88900"/>
+          </a:effectLst>
+        </p:spPr>
+      </p:pic>
+      <p:pic>
+        <p:nvPicPr>
+          <p:cNvPr id="7" name="Picture 6"/>
+          <p:cNvPicPr>
+            <a:picLocks noChangeAspect="1"/>
+          </p:cNvPicPr>
+          <p:nvPr/>
+        </p:nvPicPr>
+        <p:blipFill>
+          <a:blip r:embed="rId3"/>
+          <a:stretch>
+            <a:fillRect/>
+          </a:stretch>
+        </p:blipFill>
+        <p:spPr>
+          <a:xfrm>
+            <a:off x="7113738" y="3035300"/>
+            <a:ext cx="1553014" cy="1676119"/>
+          </a:xfrm>
+          <a:prstGeom prst="rect">
+            <a:avLst/>
+          </a:prstGeom>
+          <a:ln w="31750">
+            <a:noFill/>
+          </a:ln>
+          <a:effectLst>
+            <a:glow rad="63500">
+              <a:schemeClr val="accent2">
+                <a:satMod val="175000"/>
+                <a:alpha val="40000"/>
+              </a:schemeClr>
+            </a:glow>
+            <a:softEdge rad="88900"/>
+          </a:effectLst>
+        </p:spPr>
+      </p:pic>
+      <p:pic>
+        <p:nvPicPr>
+          <p:cNvPr id="10" name="Picture 9"/>
+          <p:cNvPicPr>
+            <a:picLocks noChangeAspect="1"/>
+          </p:cNvPicPr>
+          <p:nvPr/>
+        </p:nvPicPr>
+        <p:blipFill>
+          <a:blip r:embed="rId4"/>
+          <a:stretch>
+            <a:fillRect/>
+          </a:stretch>
+        </p:blipFill>
+        <p:spPr>
+          <a:xfrm>
+            <a:off x="7098158" y="1076461"/>
+            <a:ext cx="1568594" cy="1676119"/>
+          </a:xfrm>
+          <a:prstGeom prst="rect">
+            <a:avLst/>
+          </a:prstGeom>
+          <a:ln w="31750">
+            <a:noFill/>
+          </a:ln>
+          <a:effectLst>
+            <a:glow rad="63500">
+              <a:schemeClr val="accent2">
+                <a:satMod val="175000"/>
+                <a:alpha val="40000"/>
+              </a:schemeClr>
+            </a:glow>
+            <a:softEdge rad="88900"/>
+          </a:effectLst>
+        </p:spPr>
+      </p:pic>
     </p:spTree>
     <p:extLst>
       <p:ext uri="{BB962C8B-B14F-4D97-AF65-F5344CB8AC3E}">
-        <p14:creationId xmlns:p14="http://schemas.microsoft.com/office/powerpoint/2010/main" val="2397819296"/>
+        <p14:creationId xmlns:p14="http://schemas.microsoft.com/office/powerpoint/2010/main" val="2351631168"/>
       </p:ext>
     </p:extLst>
   </p:cSld>
@@ -6479,8 +6458,61 @@
                 <a:latin typeface="Calibri" panose="020F0502020204030204" pitchFamily="34" charset="0"/>
                 <a:cs typeface="Calibri" panose="020F0502020204030204" pitchFamily="34" charset="0"/>
               </a:rPr>
-              <a:t>Define size of object MyClass</a:t>
-            </a:r>
+              <a:t>Before CLR executes the first line of the managed code, it creates three application domains.</a:t>
+            </a:r>
+          </a:p>
+          <a:p>
+            <a:pPr marL="800100" lvl="1" indent="-342900">
+              <a:buSzPct val="80000"/>
+              <a:buFont typeface="+mj-lt"/>
+              <a:buAutoNum type="arabicPeriod"/>
+            </a:pPr>
+            <a:r>
+              <a:rPr lang="en-US" sz="2200" cap="none" dirty="0" smtClean="0">
+                <a:latin typeface="Calibri" panose="020F0502020204030204" pitchFamily="34" charset="0"/>
+                <a:cs typeface="Calibri" panose="020F0502020204030204" pitchFamily="34" charset="0"/>
+              </a:rPr>
+              <a:t>System Domain</a:t>
+            </a:r>
+          </a:p>
+          <a:p>
+            <a:pPr marL="800100" lvl="1" indent="-342900">
+              <a:buSzPct val="80000"/>
+              <a:buFont typeface="+mj-lt"/>
+              <a:buAutoNum type="arabicPeriod"/>
+            </a:pPr>
+            <a:r>
+              <a:rPr lang="en-US" sz="2200" cap="none" dirty="0" smtClean="0">
+                <a:latin typeface="Calibri" panose="020F0502020204030204" pitchFamily="34" charset="0"/>
+                <a:cs typeface="Calibri" panose="020F0502020204030204" pitchFamily="34" charset="0"/>
+              </a:rPr>
+              <a:t>Shared Domain</a:t>
+            </a:r>
+          </a:p>
+          <a:p>
+            <a:pPr marL="800100" lvl="1" indent="-342900">
+              <a:buSzPct val="80000"/>
+              <a:buFont typeface="+mj-lt"/>
+              <a:buAutoNum type="arabicPeriod"/>
+            </a:pPr>
+            <a:r>
+              <a:rPr lang="en-US" sz="2200" cap="none" dirty="0" smtClean="0">
+                <a:latin typeface="Calibri" panose="020F0502020204030204" pitchFamily="34" charset="0"/>
+                <a:cs typeface="Calibri" panose="020F0502020204030204" pitchFamily="34" charset="0"/>
+              </a:rPr>
+              <a:t>Default </a:t>
+            </a:r>
+            <a:r>
+              <a:rPr lang="en-US" sz="2200" cap="none" dirty="0" err="1" smtClean="0">
+                <a:latin typeface="Calibri" panose="020F0502020204030204" pitchFamily="34" charset="0"/>
+                <a:cs typeface="Calibri" panose="020F0502020204030204" pitchFamily="34" charset="0"/>
+              </a:rPr>
+              <a:t>AppDomain</a:t>
+            </a:r>
+            <a:endParaRPr lang="en-US" sz="2200" cap="none" dirty="0" smtClean="0">
+              <a:latin typeface="Calibri" panose="020F0502020204030204" pitchFamily="34" charset="0"/>
+              <a:cs typeface="Calibri" panose="020F0502020204030204" pitchFamily="34" charset="0"/>
+            </a:endParaRPr>
           </a:p>
           <a:p>
             <a:pPr marL="342900" indent="-342900">
@@ -6493,6 +6525,20 @@
                 <a:latin typeface="Calibri" panose="020F0502020204030204" pitchFamily="34" charset="0"/>
                 <a:cs typeface="Calibri" panose="020F0502020204030204" pitchFamily="34" charset="0"/>
               </a:rPr>
+              <a:t>Define size of object MyClass</a:t>
+            </a:r>
+          </a:p>
+          <a:p>
+            <a:pPr marL="342900" indent="-342900">
+              <a:buSzPct val="80000"/>
+              <a:buFont typeface="+mj-lt"/>
+              <a:buAutoNum type="arabicPeriod"/>
+            </a:pPr>
+            <a:r>
+              <a:rPr lang="en-US" sz="2400" cap="none" dirty="0" smtClean="0">
+                <a:latin typeface="Calibri" panose="020F0502020204030204" pitchFamily="34" charset="0"/>
+                <a:cs typeface="Calibri" panose="020F0502020204030204" pitchFamily="34" charset="0"/>
+              </a:rPr>
               <a:t>Allocate memory </a:t>
             </a:r>
             <a:endParaRPr lang="ru-RU" sz="2400" cap="none" dirty="0">
@@ -6511,7 +6557,7 @@
         <p:spPr>
           <a:xfrm>
             <a:off x="1922293" y="1371600"/>
-            <a:ext cx="5303579" cy="827314"/>
+            <a:ext cx="5303579" cy="695195"/>
           </a:xfrm>
           <a:prstGeom prst="rect">
             <a:avLst/>
@@ -6609,7 +6655,7 @@
     </p:spTree>
     <p:extLst>
       <p:ext uri="{BB962C8B-B14F-4D97-AF65-F5344CB8AC3E}">
-        <p14:creationId xmlns:p14="http://schemas.microsoft.com/office/powerpoint/2010/main" val="923669526"/>
+        <p14:creationId xmlns:p14="http://schemas.microsoft.com/office/powerpoint/2010/main" val="2397819296"/>
       </p:ext>
     </p:extLst>
   </p:cSld>
@@ -6665,6 +6711,230 @@
           <a:p>
             <a:r>
               <a:rPr lang="en-US" dirty="0" smtClean="0"/>
+              <a:t>Memory Allocation process</a:t>
+            </a:r>
+            <a:endParaRPr lang="ru-RU" dirty="0"/>
+          </a:p>
+        </p:txBody>
+      </p:sp>
+      <p:sp>
+        <p:nvSpPr>
+          <p:cNvPr id="3" name="Content Placeholder 2"/>
+          <p:cNvSpPr>
+            <a:spLocks noGrp="1"/>
+          </p:cNvSpPr>
+          <p:nvPr>
+            <p:ph idx="1"/>
+          </p:nvPr>
+        </p:nvSpPr>
+        <p:spPr>
+          <a:xfrm>
+            <a:off x="818348" y="1371600"/>
+            <a:ext cx="7511472" cy="4730460"/>
+          </a:xfrm>
+        </p:spPr>
+        <p:txBody>
+          <a:bodyPr>
+            <a:normAutofit/>
+          </a:bodyPr>
+          <a:lstStyle/>
+          <a:p>
+            <a:pPr marL="342900" indent="-342900">
+              <a:buSzPct val="80000"/>
+              <a:buFont typeface="+mj-lt"/>
+              <a:buAutoNum type="arabicPeriod"/>
+            </a:pPr>
+            <a:r>
+              <a:rPr lang="en-US" sz="2400" cap="none" dirty="0" smtClean="0">
+                <a:latin typeface="Calibri" panose="020F0502020204030204" pitchFamily="34" charset="0"/>
+                <a:cs typeface="Calibri" panose="020F0502020204030204" pitchFamily="34" charset="0"/>
+              </a:rPr>
+              <a:t>Define size of object MyClass</a:t>
+            </a:r>
+          </a:p>
+          <a:p>
+            <a:pPr marL="342900" indent="-342900">
+              <a:buSzPct val="80000"/>
+              <a:buFont typeface="+mj-lt"/>
+              <a:buAutoNum type="arabicPeriod"/>
+            </a:pPr>
+            <a:r>
+              <a:rPr lang="en-US" sz="2400" cap="none" dirty="0" smtClean="0">
+                <a:latin typeface="Calibri" panose="020F0502020204030204" pitchFamily="34" charset="0"/>
+                <a:cs typeface="Calibri" panose="020F0502020204030204" pitchFamily="34" charset="0"/>
+              </a:rPr>
+              <a:t>Allocate memory </a:t>
+            </a:r>
+            <a:endParaRPr lang="ru-RU" sz="2400" cap="none" dirty="0">
+              <a:latin typeface="Calibri" panose="020F0502020204030204" pitchFamily="34" charset="0"/>
+              <a:cs typeface="Calibri" panose="020F0502020204030204" pitchFamily="34" charset="0"/>
+            </a:endParaRPr>
+          </a:p>
+        </p:txBody>
+      </p:sp>
+      <p:sp>
+        <p:nvSpPr>
+          <p:cNvPr id="5" name="Rectangle 4"/>
+          <p:cNvSpPr/>
+          <p:nvPr/>
+        </p:nvSpPr>
+        <p:spPr>
+          <a:xfrm>
+            <a:off x="1922293" y="1371600"/>
+            <a:ext cx="5303579" cy="827314"/>
+          </a:xfrm>
+          <a:prstGeom prst="rect">
+            <a:avLst/>
+          </a:prstGeom>
+          <a:solidFill>
+            <a:schemeClr val="tx2">
+              <a:lumMod val="25000"/>
+            </a:schemeClr>
+          </a:solidFill>
+          <a:ln>
+            <a:solidFill>
+              <a:schemeClr val="accent6"/>
+            </a:solidFill>
+          </a:ln>
+        </p:spPr>
+        <p:style>
+          <a:lnRef idx="2">
+            <a:schemeClr val="accent1">
+              <a:shade val="50000"/>
+            </a:schemeClr>
+          </a:lnRef>
+          <a:fillRef idx="1">
+            <a:schemeClr val="accent1"/>
+          </a:fillRef>
+          <a:effectRef idx="0">
+            <a:schemeClr val="accent1"/>
+          </a:effectRef>
+          <a:fontRef idx="minor">
+            <a:schemeClr val="lt1"/>
+          </a:fontRef>
+        </p:style>
+        <p:txBody>
+          <a:bodyPr rtlCol="0" anchor="ctr"/>
+          <a:lstStyle/>
+          <a:p>
+            <a:pPr algn="ctr"/>
+            <a:r>
+              <a:rPr lang="en-US" sz="2000" dirty="0" smtClean="0">
+                <a:solidFill>
+                  <a:srgbClr val="F137E8"/>
+                </a:solidFill>
+                <a:latin typeface="Courier New" panose="02070309020205020404" pitchFamily="49" charset="0"/>
+                <a:cs typeface="Courier New" panose="02070309020205020404" pitchFamily="49" charset="0"/>
+              </a:rPr>
+              <a:t>MyClass</a:t>
+            </a:r>
+            <a:r>
+              <a:rPr lang="en-US" sz="2000" dirty="0" smtClean="0">
+                <a:latin typeface="Courier New" panose="02070309020205020404" pitchFamily="49" charset="0"/>
+                <a:cs typeface="Courier New" panose="02070309020205020404" pitchFamily="49" charset="0"/>
+              </a:rPr>
+              <a:t> instance = </a:t>
+            </a:r>
+            <a:r>
+              <a:rPr lang="en-US" sz="2000" dirty="0" smtClean="0">
+                <a:solidFill>
+                  <a:srgbClr val="3366FF"/>
+                </a:solidFill>
+                <a:latin typeface="Courier New" panose="02070309020205020404" pitchFamily="49" charset="0"/>
+                <a:cs typeface="Courier New" panose="02070309020205020404" pitchFamily="49" charset="0"/>
+              </a:rPr>
+              <a:t>new</a:t>
+            </a:r>
+            <a:r>
+              <a:rPr lang="en-US" sz="2000" dirty="0" smtClean="0">
+                <a:latin typeface="Courier New" panose="02070309020205020404" pitchFamily="49" charset="0"/>
+                <a:cs typeface="Courier New" panose="02070309020205020404" pitchFamily="49" charset="0"/>
+              </a:rPr>
+              <a:t> </a:t>
+            </a:r>
+            <a:r>
+              <a:rPr lang="en-US" sz="2000" dirty="0" smtClean="0">
+                <a:solidFill>
+                  <a:srgbClr val="F137E8"/>
+                </a:solidFill>
+                <a:latin typeface="Courier New" panose="02070309020205020404" pitchFamily="49" charset="0"/>
+                <a:cs typeface="Courier New" panose="02070309020205020404" pitchFamily="49" charset="0"/>
+              </a:rPr>
+              <a:t>MyClass</a:t>
+            </a:r>
+            <a:r>
+              <a:rPr lang="en-US" sz="2000" dirty="0" smtClean="0">
+                <a:latin typeface="Courier New" panose="02070309020205020404" pitchFamily="49" charset="0"/>
+                <a:cs typeface="Courier New" panose="02070309020205020404" pitchFamily="49" charset="0"/>
+              </a:rPr>
+              <a:t>();</a:t>
+            </a:r>
+            <a:endParaRPr lang="ru-RU" sz="2000" dirty="0">
+              <a:latin typeface="Courier New" panose="02070309020205020404" pitchFamily="49" charset="0"/>
+              <a:cs typeface="Courier New" panose="02070309020205020404" pitchFamily="49" charset="0"/>
+            </a:endParaRPr>
+          </a:p>
+        </p:txBody>
+      </p:sp>
+    </p:spTree>
+    <p:extLst>
+      <p:ext uri="{BB962C8B-B14F-4D97-AF65-F5344CB8AC3E}">
+        <p14:creationId xmlns:p14="http://schemas.microsoft.com/office/powerpoint/2010/main" val="923669526"/>
+      </p:ext>
+    </p:extLst>
+  </p:cSld>
+  <p:clrMapOvr>
+    <a:masterClrMapping/>
+  </p:clrMapOvr>
+  <p:timing>
+    <p:tnLst>
+      <p:par>
+        <p:cTn id="1" dur="indefinite" restart="never" nodeType="tmRoot"/>
+      </p:par>
+    </p:tnLst>
+  </p:timing>
+</p:sld>
+</file>
+
+<file path=ppt/slides/slide6.xml><?xml version="1.0" encoding="utf-8"?>
+<p:sld xmlns:a="http://schemas.openxmlformats.org/drawingml/2006/main" xmlns:r="http://schemas.openxmlformats.org/officeDocument/2006/relationships" xmlns:p="http://schemas.openxmlformats.org/presentationml/2006/main">
+  <p:cSld>
+    <p:spTree>
+      <p:nvGrpSpPr>
+        <p:cNvPr id="1" name=""/>
+        <p:cNvGrpSpPr/>
+        <p:nvPr/>
+      </p:nvGrpSpPr>
+      <p:grpSpPr>
+        <a:xfrm>
+          <a:off x="0" y="0"/>
+          <a:ext cx="0" cy="0"/>
+          <a:chOff x="0" y="0"/>
+          <a:chExt cx="0" cy="0"/>
+        </a:xfrm>
+      </p:grpSpPr>
+      <p:sp>
+        <p:nvSpPr>
+          <p:cNvPr id="2" name="Title 1"/>
+          <p:cNvSpPr>
+            <a:spLocks noGrp="1"/>
+          </p:cNvSpPr>
+          <p:nvPr>
+            <p:ph type="title"/>
+          </p:nvPr>
+        </p:nvSpPr>
+        <p:spPr>
+          <a:xfrm>
+            <a:off x="818347" y="596018"/>
+            <a:ext cx="7511473" cy="623182"/>
+          </a:xfrm>
+        </p:spPr>
+        <p:txBody>
+          <a:bodyPr/>
+          <a:lstStyle/>
+          <a:p>
+            <a:r>
+              <a:rPr lang="en-US" dirty="0" smtClean="0"/>
               <a:t>CLR Bootstrap</a:t>
             </a:r>
             <a:endParaRPr lang="ru-RU" dirty="0"/>
@@ -6784,7 +7054,7 @@
 </p:sld>
 </file>
 
-<file path=ppt/slides/slide6.xml><?xml version="1.0" encoding="utf-8"?>
+<file path=ppt/slides/slide7.xml><?xml version="1.0" encoding="utf-8"?>
 <p:sld xmlns:a="http://schemas.openxmlformats.org/drawingml/2006/main" xmlns:r="http://schemas.openxmlformats.org/officeDocument/2006/relationships" xmlns:p="http://schemas.openxmlformats.org/presentationml/2006/main">
   <p:cSld>
     <p:spTree>

</xml_diff>

<commit_message>
garbage collection in .net: complete section about common algorithms
</commit_message>
<xml_diff>
--- a/ppt/Garbage collection in dotnet.pptx
+++ b/ppt/Garbage collection in dotnet.pptx
@@ -6088,12 +6088,28 @@
             <a:pPr>
               <a:buSzPct val="80000"/>
             </a:pPr>
+            <a:endParaRPr lang="en-US" sz="2400" cap="none" dirty="0" smtClean="0">
+              <a:latin typeface="Calibri" panose="020F0502020204030204" pitchFamily="34" charset="0"/>
+              <a:cs typeface="Calibri" panose="020F0502020204030204" pitchFamily="34" charset="0"/>
+            </a:endParaRPr>
+          </a:p>
+          <a:p>
+            <a:pPr>
+              <a:buSzPct val="80000"/>
+            </a:pPr>
             <a:r>
               <a:rPr lang="en-US" sz="2400" cap="none" dirty="0" smtClean="0">
                 <a:latin typeface="Calibri" panose="020F0502020204030204" pitchFamily="34" charset="0"/>
                 <a:cs typeface="Calibri" panose="020F0502020204030204" pitchFamily="34" charset="0"/>
               </a:rPr>
-              <a:t>Each object has counter of incoming pointers</a:t>
+              <a:t>Each </a:t>
+            </a:r>
+            <a:r>
+              <a:rPr lang="en-US" sz="2400" cap="none" dirty="0" smtClean="0">
+                <a:latin typeface="Calibri" panose="020F0502020204030204" pitchFamily="34" charset="0"/>
+                <a:cs typeface="Calibri" panose="020F0502020204030204" pitchFamily="34" charset="0"/>
+              </a:rPr>
+              <a:t>object has counter of incoming pointers</a:t>
             </a:r>
           </a:p>
           <a:p>
@@ -7096,12 +7112,28 @@
             <a:pPr>
               <a:buSzPct val="80000"/>
             </a:pPr>
+            <a:endParaRPr lang="en-US" sz="2400" cap="none" dirty="0" smtClean="0">
+              <a:latin typeface="Calibri" panose="020F0502020204030204" pitchFamily="34" charset="0"/>
+              <a:cs typeface="Calibri" panose="020F0502020204030204" pitchFamily="34" charset="0"/>
+            </a:endParaRPr>
+          </a:p>
+          <a:p>
+            <a:pPr>
+              <a:buSzPct val="80000"/>
+            </a:pPr>
             <a:r>
               <a:rPr lang="en-US" sz="2400" cap="none" dirty="0" smtClean="0">
                 <a:latin typeface="Calibri" panose="020F0502020204030204" pitchFamily="34" charset="0"/>
                 <a:cs typeface="Calibri" panose="020F0502020204030204" pitchFamily="34" charset="0"/>
               </a:rPr>
-              <a:t>Each object has counter of incoming pointers</a:t>
+              <a:t>Each </a:t>
+            </a:r>
+            <a:r>
+              <a:rPr lang="en-US" sz="2400" cap="none" dirty="0" smtClean="0">
+                <a:latin typeface="Calibri" panose="020F0502020204030204" pitchFamily="34" charset="0"/>
+                <a:cs typeface="Calibri" panose="020F0502020204030204" pitchFamily="34" charset="0"/>
+              </a:rPr>
+              <a:t>object has counter of incoming pointers</a:t>
             </a:r>
           </a:p>
           <a:p>
@@ -9140,58 +9172,50 @@
           </a:bodyPr>
           <a:lstStyle/>
           <a:p>
-            <a:pPr>
+            <a:pPr marL="0" indent="0">
               <a:buSzPct val="80000"/>
+              <a:buNone/>
             </a:pPr>
+            <a:r>
+              <a:rPr lang="en-US" sz="2400" b="1" cap="none" dirty="0" smtClean="0">
+                <a:solidFill>
+                  <a:srgbClr val="99FF66"/>
+                </a:solidFill>
+                <a:latin typeface="Calibri" panose="020F0502020204030204" pitchFamily="34" charset="0"/>
+                <a:cs typeface="Calibri" panose="020F0502020204030204" pitchFamily="34" charset="0"/>
+              </a:rPr>
+              <a:t>+</a:t>
+            </a:r>
             <a:r>
               <a:rPr lang="en-US" sz="2400" cap="none" dirty="0" smtClean="0">
                 <a:latin typeface="Calibri" panose="020F0502020204030204" pitchFamily="34" charset="0"/>
                 <a:cs typeface="Calibri" panose="020F0502020204030204" pitchFamily="34" charset="0"/>
               </a:rPr>
-              <a:t>Each object has counter of incoming pointers</a:t>
-            </a:r>
-          </a:p>
-          <a:p>
-            <a:pPr>
+              <a:t> Simple. Garbage is easily identified.</a:t>
+            </a:r>
+          </a:p>
+          <a:p>
+            <a:pPr marL="0" indent="0">
               <a:buSzPct val="80000"/>
+              <a:buNone/>
             </a:pPr>
+            <a:r>
+              <a:rPr lang="en-US" sz="2400" b="1" cap="none" dirty="0" smtClean="0">
+                <a:solidFill>
+                  <a:srgbClr val="99FF66"/>
+                </a:solidFill>
+                <a:latin typeface="Calibri" panose="020F0502020204030204" pitchFamily="34" charset="0"/>
+                <a:cs typeface="Calibri" panose="020F0502020204030204" pitchFamily="34" charset="0"/>
+              </a:rPr>
+              <a:t>+</a:t>
+            </a:r>
             <a:r>
               <a:rPr lang="en-US" sz="2400" cap="none" dirty="0" smtClean="0">
                 <a:latin typeface="Calibri" panose="020F0502020204030204" pitchFamily="34" charset="0"/>
                 <a:cs typeface="Calibri" panose="020F0502020204030204" pitchFamily="34" charset="0"/>
               </a:rPr>
-              <a:t>When counter reaches zero, object can</a:t>
-            </a:r>
-            <a:r>
-              <a:rPr lang="en-US" sz="2200" cap="none" dirty="0">
-                <a:latin typeface="Calibri" panose="020F0502020204030204" pitchFamily="34" charset="0"/>
-                <a:cs typeface="Calibri" panose="020F0502020204030204" pitchFamily="34" charset="0"/>
-              </a:rPr>
-              <a:t> </a:t>
-            </a:r>
-            <a:r>
-              <a:rPr lang="en-US" sz="2200" cap="none" dirty="0" smtClean="0">
-                <a:latin typeface="Calibri" panose="020F0502020204030204" pitchFamily="34" charset="0"/>
-                <a:cs typeface="Calibri" panose="020F0502020204030204" pitchFamily="34" charset="0"/>
-              </a:rPr>
-              <a:t>be collected</a:t>
-            </a:r>
-            <a:r>
-              <a:rPr lang="en-US" sz="2200" cap="none" dirty="0" smtClean="0">
-                <a:latin typeface="Calibri" panose="020F0502020204030204" pitchFamily="34" charset="0"/>
-                <a:cs typeface="Calibri" panose="020F0502020204030204" pitchFamily="34" charset="0"/>
-              </a:rPr>
-              <a:t>.</a:t>
-            </a:r>
-          </a:p>
-          <a:p>
-            <a:pPr>
-              <a:buSzPct val="80000"/>
-            </a:pPr>
-            <a:endParaRPr lang="en-US" sz="2200" cap="none" dirty="0">
-              <a:latin typeface="Calibri" panose="020F0502020204030204" pitchFamily="34" charset="0"/>
-              <a:cs typeface="Calibri" panose="020F0502020204030204" pitchFamily="34" charset="0"/>
-            </a:endParaRPr>
+              <a:t> Easy to implement.</a:t>
+            </a:r>
           </a:p>
           <a:p>
             <a:pPr marL="0" indent="0">
@@ -9199,11 +9223,123 @@
               <a:buNone/>
             </a:pPr>
             <a:r>
-              <a:rPr lang="en-US" sz="2200" cap="none" dirty="0" smtClean="0">
+              <a:rPr lang="en-US" sz="2400" b="1" cap="none" dirty="0" smtClean="0">
+                <a:solidFill>
+                  <a:srgbClr val="99FF66"/>
+                </a:solidFill>
                 <a:latin typeface="Calibri" panose="020F0502020204030204" pitchFamily="34" charset="0"/>
                 <a:cs typeface="Calibri" panose="020F0502020204030204" pitchFamily="34" charset="0"/>
               </a:rPr>
-              <a:t>- Have a problem with cyclic dependencies</a:t>
+              <a:t>+</a:t>
+            </a:r>
+            <a:r>
+              <a:rPr lang="en-US" sz="2400" cap="none" dirty="0" smtClean="0">
+                <a:latin typeface="Calibri" panose="020F0502020204030204" pitchFamily="34" charset="0"/>
+                <a:cs typeface="Calibri" panose="020F0502020204030204" pitchFamily="34" charset="0"/>
+              </a:rPr>
+              <a:t> Immediate reclamation of storage.</a:t>
+            </a:r>
+          </a:p>
+          <a:p>
+            <a:pPr marL="0" indent="0">
+              <a:buSzPct val="80000"/>
+              <a:buNone/>
+            </a:pPr>
+            <a:endParaRPr lang="en-US" sz="2400" cap="none" dirty="0">
+              <a:latin typeface="Calibri" panose="020F0502020204030204" pitchFamily="34" charset="0"/>
+              <a:cs typeface="Calibri" panose="020F0502020204030204" pitchFamily="34" charset="0"/>
+            </a:endParaRPr>
+          </a:p>
+          <a:p>
+            <a:pPr marL="0" indent="0">
+              <a:buSzPct val="80000"/>
+              <a:buNone/>
+            </a:pPr>
+            <a:r>
+              <a:rPr lang="en-US" sz="2400" b="1" cap="none" dirty="0">
+                <a:solidFill>
+                  <a:srgbClr val="FF3300"/>
+                </a:solidFill>
+                <a:latin typeface="Calibri" panose="020F0502020204030204" pitchFamily="34" charset="0"/>
+                <a:cs typeface="Calibri" panose="020F0502020204030204" pitchFamily="34" charset="0"/>
+              </a:rPr>
+              <a:t>-</a:t>
+            </a:r>
+            <a:r>
+              <a:rPr lang="en-US" sz="2400" cap="none" dirty="0" smtClean="0">
+                <a:latin typeface="Calibri" panose="020F0502020204030204" pitchFamily="34" charset="0"/>
+                <a:cs typeface="Calibri" panose="020F0502020204030204" pitchFamily="34" charset="0"/>
+              </a:rPr>
+              <a:t> The overhead of incrementing and decrementing the reference count each time</a:t>
+            </a:r>
+          </a:p>
+          <a:p>
+            <a:pPr marL="0" indent="0">
+              <a:buSzPct val="80000"/>
+              <a:buNone/>
+            </a:pPr>
+            <a:r>
+              <a:rPr lang="en-US" sz="2400" b="1" cap="none" dirty="0" smtClean="0">
+                <a:solidFill>
+                  <a:srgbClr val="FF3300"/>
+                </a:solidFill>
+                <a:latin typeface="Calibri" panose="020F0502020204030204" pitchFamily="34" charset="0"/>
+                <a:cs typeface="Calibri" panose="020F0502020204030204" pitchFamily="34" charset="0"/>
+              </a:rPr>
+              <a:t>-</a:t>
+            </a:r>
+            <a:r>
+              <a:rPr lang="en-US" sz="2400" cap="none" dirty="0" smtClean="0">
+                <a:latin typeface="Calibri" panose="020F0502020204030204" pitchFamily="34" charset="0"/>
+                <a:cs typeface="Calibri" panose="020F0502020204030204" pitchFamily="34" charset="0"/>
+              </a:rPr>
+              <a:t> Extra space for counter field in each object.</a:t>
+            </a:r>
+          </a:p>
+          <a:p>
+            <a:pPr marL="0" indent="0">
+              <a:buSzPct val="80000"/>
+              <a:buNone/>
+            </a:pPr>
+            <a:r>
+              <a:rPr lang="en-US" sz="2400" b="1" cap="none" dirty="0" smtClean="0">
+                <a:solidFill>
+                  <a:srgbClr val="FF3300"/>
+                </a:solidFill>
+                <a:latin typeface="Calibri" panose="020F0502020204030204" pitchFamily="34" charset="0"/>
+                <a:cs typeface="Calibri" panose="020F0502020204030204" pitchFamily="34" charset="0"/>
+              </a:rPr>
+              <a:t>-</a:t>
+            </a:r>
+            <a:r>
+              <a:rPr lang="en-US" sz="2400" cap="none" dirty="0" smtClean="0">
+                <a:latin typeface="Calibri" panose="020F0502020204030204" pitchFamily="34" charset="0"/>
+                <a:cs typeface="Calibri" panose="020F0502020204030204" pitchFamily="34" charset="0"/>
+              </a:rPr>
+              <a:t> It may increase heap fragmentation</a:t>
+            </a:r>
+          </a:p>
+          <a:p>
+            <a:pPr marL="0" indent="0">
+              <a:buSzPct val="80000"/>
+              <a:buNone/>
+            </a:pPr>
+            <a:r>
+              <a:rPr lang="en-US" sz="2400" b="1" cap="none" dirty="0" smtClean="0">
+                <a:solidFill>
+                  <a:srgbClr val="FF3300"/>
+                </a:solidFill>
+                <a:latin typeface="Calibri" panose="020F0502020204030204" pitchFamily="34" charset="0"/>
+                <a:cs typeface="Calibri" panose="020F0502020204030204" pitchFamily="34" charset="0"/>
+              </a:rPr>
+              <a:t>-</a:t>
+            </a:r>
+            <a:r>
+              <a:rPr lang="en-US" sz="2400" cap="none" dirty="0" smtClean="0">
+                <a:latin typeface="Calibri" panose="020F0502020204030204" pitchFamily="34" charset="0"/>
+                <a:cs typeface="Calibri" panose="020F0502020204030204" pitchFamily="34" charset="0"/>
+              </a:rPr>
+              <a:t> Does not detect garbage with cyclic references.</a:t>
             </a:r>
             <a:endParaRPr lang="en-US" sz="2400" cap="none" dirty="0" smtClean="0">
               <a:latin typeface="Calibri" panose="020F0502020204030204" pitchFamily="34" charset="0"/>
@@ -9212,42 +9348,6 @@
           </a:p>
         </p:txBody>
       </p:sp>
-      <p:pic>
-        <p:nvPicPr>
-          <p:cNvPr id="7" name="Picture 6"/>
-          <p:cNvPicPr>
-            <a:picLocks noChangeAspect="1"/>
-          </p:cNvPicPr>
-          <p:nvPr/>
-        </p:nvPicPr>
-        <p:blipFill>
-          <a:blip r:embed="rId2"/>
-          <a:stretch>
-            <a:fillRect/>
-          </a:stretch>
-        </p:blipFill>
-        <p:spPr>
-          <a:xfrm>
-            <a:off x="7138611" y="381140"/>
-            <a:ext cx="1553014" cy="1676119"/>
-          </a:xfrm>
-          <a:prstGeom prst="rect">
-            <a:avLst/>
-          </a:prstGeom>
-          <a:ln w="31750">
-            <a:noFill/>
-          </a:ln>
-          <a:effectLst>
-            <a:glow rad="63500">
-              <a:schemeClr val="accent2">
-                <a:satMod val="175000"/>
-                <a:alpha val="40000"/>
-              </a:schemeClr>
-            </a:glow>
-            <a:softEdge rad="88900"/>
-          </a:effectLst>
-        </p:spPr>
-      </p:pic>
     </p:spTree>
     <p:extLst>
       <p:ext uri="{BB962C8B-B14F-4D97-AF65-F5344CB8AC3E}">
@@ -11990,11 +12090,21 @@
               <a:buNone/>
             </a:pPr>
             <a:r>
+              <a:rPr lang="en-US" sz="2400" b="1" cap="none" dirty="0" smtClean="0">
+                <a:solidFill>
+                  <a:srgbClr val="99FF66"/>
+                </a:solidFill>
+                <a:latin typeface="Calibri" panose="020F0502020204030204" pitchFamily="34" charset="0"/>
+                <a:cs typeface="Calibri" panose="020F0502020204030204" pitchFamily="34" charset="0"/>
+              </a:rPr>
+              <a:t>+</a:t>
+            </a:r>
+            <a:r>
               <a:rPr lang="en-US" sz="2400" cap="none" dirty="0" smtClean="0">
                 <a:latin typeface="Calibri" panose="020F0502020204030204" pitchFamily="34" charset="0"/>
                 <a:cs typeface="Calibri" panose="020F0502020204030204" pitchFamily="34" charset="0"/>
               </a:rPr>
-              <a:t>+ Only one pass through the data is required</a:t>
+              <a:t> Only one pass through the data is required</a:t>
             </a:r>
           </a:p>
           <a:p>
@@ -12003,11 +12113,21 @@
               <a:buNone/>
             </a:pPr>
             <a:r>
+              <a:rPr lang="en-US" sz="2400" b="1" cap="none" dirty="0" smtClean="0">
+                <a:solidFill>
+                  <a:srgbClr val="99FF66"/>
+                </a:solidFill>
+                <a:latin typeface="Calibri" panose="020F0502020204030204" pitchFamily="34" charset="0"/>
+                <a:cs typeface="Calibri" panose="020F0502020204030204" pitchFamily="34" charset="0"/>
+              </a:rPr>
+              <a:t>+</a:t>
+            </a:r>
+            <a:r>
               <a:rPr lang="en-US" sz="2400" cap="none" dirty="0" smtClean="0">
                 <a:latin typeface="Calibri" panose="020F0502020204030204" pitchFamily="34" charset="0"/>
                 <a:cs typeface="Calibri" panose="020F0502020204030204" pitchFamily="34" charset="0"/>
               </a:rPr>
-              <a:t>+ It de-fragment the heap</a:t>
+              <a:t> It de-fragment the heap</a:t>
             </a:r>
           </a:p>
           <a:p>
@@ -12016,11 +12136,21 @@
               <a:buNone/>
             </a:pPr>
             <a:r>
+              <a:rPr lang="en-US" sz="2400" b="1" cap="none" dirty="0" smtClean="0">
+                <a:solidFill>
+                  <a:srgbClr val="99FF66"/>
+                </a:solidFill>
+                <a:latin typeface="Calibri" panose="020F0502020204030204" pitchFamily="34" charset="0"/>
+                <a:cs typeface="Calibri" panose="020F0502020204030204" pitchFamily="34" charset="0"/>
+              </a:rPr>
+              <a:t>+</a:t>
+            </a:r>
+            <a:r>
               <a:rPr lang="en-US" sz="2400" cap="none" dirty="0" smtClean="0">
                 <a:latin typeface="Calibri" panose="020F0502020204030204" pitchFamily="34" charset="0"/>
                 <a:cs typeface="Calibri" panose="020F0502020204030204" pitchFamily="34" charset="0"/>
               </a:rPr>
-              <a:t>+ Able to reclaim garbage with cyclic references.</a:t>
+              <a:t> Able to reclaim garbage with cyclic references.</a:t>
             </a:r>
           </a:p>
           <a:p>
@@ -12029,11 +12159,21 @@
               <a:buNone/>
             </a:pPr>
             <a:r>
+              <a:rPr lang="en-US" sz="2400" b="1" cap="none" dirty="0" smtClean="0">
+                <a:solidFill>
+                  <a:srgbClr val="99FF66"/>
+                </a:solidFill>
+                <a:latin typeface="Calibri" panose="020F0502020204030204" pitchFamily="34" charset="0"/>
+                <a:cs typeface="Calibri" panose="020F0502020204030204" pitchFamily="34" charset="0"/>
+              </a:rPr>
+              <a:t>+</a:t>
+            </a:r>
+            <a:r>
               <a:rPr lang="en-US" sz="2400" cap="none" dirty="0" smtClean="0">
                 <a:latin typeface="Calibri" panose="020F0502020204030204" pitchFamily="34" charset="0"/>
                 <a:cs typeface="Calibri" panose="020F0502020204030204" pitchFamily="34" charset="0"/>
               </a:rPr>
-              <a:t>+ No overhead with reference storage and manipulating.</a:t>
+              <a:t> No overhead with reference storage and manipulating.</a:t>
             </a:r>
           </a:p>
           <a:p>
@@ -12052,11 +12192,21 @@
               <a:buNone/>
             </a:pPr>
             <a:r>
+              <a:rPr lang="en-US" sz="2400" b="1" cap="none" dirty="0" smtClean="0">
+                <a:solidFill>
+                  <a:srgbClr val="FF3300"/>
+                </a:solidFill>
+                <a:latin typeface="Calibri" panose="020F0502020204030204" pitchFamily="34" charset="0"/>
+                <a:cs typeface="Calibri" panose="020F0502020204030204" pitchFamily="34" charset="0"/>
+              </a:rPr>
+              <a:t>-</a:t>
+            </a:r>
+            <a:r>
               <a:rPr lang="en-US" sz="2400" cap="none" dirty="0" smtClean="0">
                 <a:latin typeface="Calibri" panose="020F0502020204030204" pitchFamily="34" charset="0"/>
                 <a:cs typeface="Calibri" panose="020F0502020204030204" pitchFamily="34" charset="0"/>
               </a:rPr>
-              <a:t>- Twice as much memory is needed for a given amount of heap space</a:t>
+              <a:t> Twice as much memory is needed for a given amount of heap space</a:t>
             </a:r>
           </a:p>
           <a:p>
@@ -12065,11 +12215,21 @@
               <a:buNone/>
             </a:pPr>
             <a:r>
+              <a:rPr lang="en-US" sz="2400" b="1" cap="none" dirty="0" smtClean="0">
+                <a:solidFill>
+                  <a:srgbClr val="FF3300"/>
+                </a:solidFill>
+                <a:latin typeface="Calibri" panose="020F0502020204030204" pitchFamily="34" charset="0"/>
+                <a:cs typeface="Calibri" panose="020F0502020204030204" pitchFamily="34" charset="0"/>
+              </a:rPr>
+              <a:t>- </a:t>
+            </a:r>
+            <a:r>
               <a:rPr lang="en-US" sz="2400" cap="none" dirty="0" smtClean="0">
                 <a:latin typeface="Calibri" panose="020F0502020204030204" pitchFamily="34" charset="0"/>
                 <a:cs typeface="Calibri" panose="020F0502020204030204" pitchFamily="34" charset="0"/>
               </a:rPr>
-              <a:t>- Objects are moved in memory during garbage collection  (references need to be updated)</a:t>
+              <a:t>Objects are moved in memory during garbage collection  (references need to be updated)</a:t>
             </a:r>
           </a:p>
           <a:p>
@@ -12078,11 +12238,21 @@
               <a:buNone/>
             </a:pPr>
             <a:r>
+              <a:rPr lang="en-US" sz="2400" b="1" cap="none" dirty="0" smtClean="0">
+                <a:solidFill>
+                  <a:srgbClr val="FF3300"/>
+                </a:solidFill>
+                <a:latin typeface="Calibri" panose="020F0502020204030204" pitchFamily="34" charset="0"/>
+                <a:cs typeface="Calibri" panose="020F0502020204030204" pitchFamily="34" charset="0"/>
+              </a:rPr>
+              <a:t>-</a:t>
+            </a:r>
+            <a:r>
               <a:rPr lang="en-US" sz="2400" cap="none" dirty="0" smtClean="0">
                 <a:latin typeface="Calibri" panose="020F0502020204030204" pitchFamily="34" charset="0"/>
                 <a:cs typeface="Calibri" panose="020F0502020204030204" pitchFamily="34" charset="0"/>
               </a:rPr>
-              <a:t>- The program must be halted during garbage collecting.</a:t>
+              <a:t> The program must be halted during garbage collecting.</a:t>
             </a:r>
             <a:endParaRPr lang="en-US" sz="2400" cap="none" dirty="0" smtClean="0">
               <a:latin typeface="Calibri" panose="020F0502020204030204" pitchFamily="34" charset="0"/>
@@ -12166,28 +12336,28 @@
             <p:ph idx="1"/>
             <p:extLst>
               <p:ext uri="{D42A27DB-BD31-4B8C-83A1-F6EECF244321}">
-                <p14:modId xmlns:p14="http://schemas.microsoft.com/office/powerpoint/2010/main" val="489598321"/>
+                <p14:modId xmlns:p14="http://schemas.microsoft.com/office/powerpoint/2010/main" val="196429143"/>
               </p:ext>
             </p:extLst>
           </p:nvPr>
         </p:nvGraphicFramePr>
         <p:xfrm>
-          <a:off x="817563" y="2060575"/>
-          <a:ext cx="7512052" cy="2595880"/>
+          <a:off x="350729" y="1672269"/>
+          <a:ext cx="8430016" cy="4252908"/>
         </p:xfrm>
         <a:graphic>
           <a:graphicData uri="http://schemas.openxmlformats.org/drawingml/2006/table">
             <a:tbl>
               <a:tblPr firstRow="1" bandRow="1">
-                <a:tableStyleId>{7DF18680-E054-41AD-8BC1-D1AEF772440D}</a:tableStyleId>
+                <a:tableStyleId>{616DA210-FB5B-4158-B5E0-FEB733F419BA}</a:tableStyleId>
               </a:tblPr>
               <a:tblGrid>
-                <a:gridCol w="1878013"/>
-                <a:gridCol w="1878013"/>
-                <a:gridCol w="1878013"/>
-                <a:gridCol w="1878013"/>
+                <a:gridCol w="3356975"/>
+                <a:gridCol w="1728592"/>
+                <a:gridCol w="1628383"/>
+                <a:gridCol w="1716066"/>
               </a:tblGrid>
-              <a:tr h="370840">
+              <a:tr h="369474">
                 <a:tc>
                   <a:txBody>
                     <a:bodyPr/>
@@ -12196,7 +12366,14 @@
                       <a:endParaRPr lang="ru-RU" dirty="0"/>
                     </a:p>
                   </a:txBody>
-                  <a:tcPr/>
+                  <a:tcPr>
+                    <a:solidFill>
+                      <a:schemeClr val="bg1">
+                        <a:lumMod val="85000"/>
+                        <a:lumOff val="15000"/>
+                      </a:schemeClr>
+                    </a:solidFill>
+                  </a:tcPr>
                 </a:tc>
                 <a:tc>
                   <a:txBody>
@@ -12204,13 +12381,20 @@
                     <a:lstStyle/>
                     <a:p>
                       <a:r>
-                        <a:rPr lang="en-US" dirty="0" smtClean="0"/>
+                        <a:rPr lang="en-US" b="0" dirty="0" smtClean="0"/>
                         <a:t>Tracing</a:t>
                       </a:r>
-                      <a:endParaRPr lang="ru-RU" dirty="0"/>
+                      <a:endParaRPr lang="ru-RU" b="0" dirty="0"/>
                     </a:p>
                   </a:txBody>
-                  <a:tcPr/>
+                  <a:tcPr>
+                    <a:solidFill>
+                      <a:schemeClr val="bg1">
+                        <a:lumMod val="85000"/>
+                        <a:lumOff val="15000"/>
+                      </a:schemeClr>
+                    </a:solidFill>
+                  </a:tcPr>
                 </a:tc>
                 <a:tc>
                   <a:txBody>
@@ -12218,279 +12402,423 @@
                     <a:lstStyle/>
                     <a:p>
                       <a:r>
-                        <a:rPr lang="en-US" dirty="0" smtClean="0"/>
-                        <a:t>Ref.</a:t>
+                        <a:rPr lang="en-US" b="0" dirty="0" smtClean="0"/>
+                        <a:t>Reference</a:t>
                       </a:r>
                       <a:r>
-                        <a:rPr lang="en-US" baseline="0" dirty="0" smtClean="0"/>
+                        <a:rPr lang="en-US" b="0" baseline="0" dirty="0" smtClean="0"/>
                         <a:t> counting</a:t>
                       </a:r>
-                      <a:endParaRPr lang="ru-RU" dirty="0"/>
+                      <a:endParaRPr lang="ru-RU" b="0" dirty="0"/>
                     </a:p>
                   </a:txBody>
-                  <a:tcPr/>
+                  <a:tcPr>
+                    <a:solidFill>
+                      <a:schemeClr val="bg1">
+                        <a:lumMod val="85000"/>
+                        <a:lumOff val="15000"/>
+                      </a:schemeClr>
+                    </a:solidFill>
+                  </a:tcPr>
                 </a:tc>
                 <a:tc>
                   <a:txBody>
                     <a:bodyPr/>
                     <a:lstStyle/>
                     <a:p>
-                      <a:endParaRPr lang="ru-RU" dirty="0"/>
+                      <a:r>
+                        <a:rPr lang="en-US" b="0" dirty="0" smtClean="0"/>
+                        <a:t>Copying</a:t>
+                      </a:r>
+                      <a:r>
+                        <a:rPr lang="en-US" b="0" baseline="0" dirty="0" smtClean="0"/>
+                        <a:t> collections</a:t>
+                      </a:r>
+                      <a:endParaRPr lang="ru-RU" b="0" dirty="0"/>
                     </a:p>
                   </a:txBody>
-                  <a:tcPr/>
+                  <a:tcPr>
+                    <a:solidFill>
+                      <a:schemeClr val="bg1">
+                        <a:lumMod val="85000"/>
+                        <a:lumOff val="15000"/>
+                      </a:schemeClr>
+                    </a:solidFill>
+                  </a:tcPr>
                 </a:tc>
               </a:tr>
-              <a:tr h="370840">
+              <a:tr h="602138">
                 <a:tc>
                   <a:txBody>
                     <a:bodyPr/>
                     <a:lstStyle/>
                     <a:p>
-                      <a:endParaRPr lang="ru-RU"/>
+                      <a:r>
+                        <a:rPr lang="en-US" b="0" dirty="0" smtClean="0"/>
+                        <a:t>Collection style</a:t>
+                      </a:r>
+                      <a:endParaRPr lang="ru-RU" b="0" dirty="0"/>
                     </a:p>
                   </a:txBody>
-                  <a:tcPr/>
+                  <a:tcPr anchor="ctr"/>
                 </a:tc>
                 <a:tc>
                   <a:txBody>
                     <a:bodyPr/>
                     <a:lstStyle/>
                     <a:p>
-                      <a:endParaRPr lang="ru-RU"/>
+                      <a:pPr algn="ctr"/>
+                      <a:r>
+                        <a:rPr lang="en-US" dirty="0" smtClean="0"/>
+                        <a:t>batch</a:t>
+                      </a:r>
+                      <a:endParaRPr lang="ru-RU" dirty="0"/>
                     </a:p>
                   </a:txBody>
-                  <a:tcPr/>
+                  <a:tcPr anchor="ctr"/>
                 </a:tc>
                 <a:tc>
                   <a:txBody>
                     <a:bodyPr/>
                     <a:lstStyle/>
                     <a:p>
-                      <a:endParaRPr lang="ru-RU"/>
+                      <a:pPr algn="ctr"/>
+                      <a:r>
+                        <a:rPr lang="en-US" dirty="0" smtClean="0"/>
+                        <a:t>incremental</a:t>
+                      </a:r>
+                      <a:endParaRPr lang="ru-RU" dirty="0"/>
                     </a:p>
                   </a:txBody>
-                  <a:tcPr/>
+                  <a:tcPr anchor="ctr"/>
                 </a:tc>
                 <a:tc>
                   <a:txBody>
                     <a:bodyPr/>
                     <a:lstStyle/>
                     <a:p>
-                      <a:endParaRPr lang="ru-RU"/>
+                      <a:pPr algn="ctr"/>
+                      <a:r>
+                        <a:rPr lang="en-US" dirty="0" smtClean="0"/>
+                        <a:t>copy</a:t>
+                      </a:r>
+                      <a:endParaRPr lang="ru-RU" dirty="0"/>
                     </a:p>
                   </a:txBody>
-                  <a:tcPr/>
+                  <a:tcPr anchor="ctr"/>
                 </a:tc>
               </a:tr>
-              <a:tr h="370840">
+              <a:tr h="602138">
                 <a:tc>
                   <a:txBody>
                     <a:bodyPr/>
                     <a:lstStyle/>
                     <a:p>
-                      <a:endParaRPr lang="ru-RU"/>
+                      <a:r>
+                        <a:rPr lang="en-US" b="0" dirty="0" smtClean="0"/>
+                        <a:t>Pause</a:t>
+                      </a:r>
+                      <a:r>
+                        <a:rPr lang="en-US" b="0" baseline="0" dirty="0" smtClean="0"/>
+                        <a:t> Times</a:t>
+                      </a:r>
+                      <a:endParaRPr lang="ru-RU" b="0" dirty="0"/>
                     </a:p>
                   </a:txBody>
-                  <a:tcPr/>
+                  <a:tcPr anchor="ctr"/>
                 </a:tc>
                 <a:tc>
                   <a:txBody>
                     <a:bodyPr/>
                     <a:lstStyle/>
                     <a:p>
-                      <a:endParaRPr lang="ru-RU"/>
+                      <a:pPr algn="ctr"/>
+                      <a:r>
+                        <a:rPr lang="en-US" dirty="0" smtClean="0"/>
+                        <a:t>long</a:t>
+                      </a:r>
+                      <a:endParaRPr lang="ru-RU" dirty="0"/>
                     </a:p>
                   </a:txBody>
-                  <a:tcPr/>
+                  <a:tcPr anchor="ctr"/>
                 </a:tc>
                 <a:tc>
                   <a:txBody>
                     <a:bodyPr/>
                     <a:lstStyle/>
                     <a:p>
-                      <a:endParaRPr lang="ru-RU"/>
+                      <a:pPr algn="ctr"/>
+                      <a:r>
+                        <a:rPr lang="en-US" dirty="0" smtClean="0"/>
+                        <a:t>short</a:t>
+                      </a:r>
+                      <a:endParaRPr lang="ru-RU" dirty="0"/>
                     </a:p>
                   </a:txBody>
-                  <a:tcPr/>
+                  <a:tcPr anchor="ctr"/>
                 </a:tc>
                 <a:tc>
                   <a:txBody>
                     <a:bodyPr/>
                     <a:lstStyle/>
                     <a:p>
-                      <a:endParaRPr lang="ru-RU"/>
+                      <a:pPr algn="ctr"/>
+                      <a:r>
+                        <a:rPr lang="en-US" dirty="0" smtClean="0"/>
+                        <a:t>long</a:t>
+                      </a:r>
+                      <a:endParaRPr lang="ru-RU" dirty="0"/>
                     </a:p>
                   </a:txBody>
-                  <a:tcPr/>
+                  <a:tcPr anchor="ctr"/>
                 </a:tc>
               </a:tr>
-              <a:tr h="370840">
+              <a:tr h="602138">
                 <a:tc>
                   <a:txBody>
                     <a:bodyPr/>
                     <a:lstStyle/>
                     <a:p>
-                      <a:endParaRPr lang="ru-RU"/>
+                      <a:r>
+                        <a:rPr lang="en-US" b="0" dirty="0" smtClean="0"/>
+                        <a:t>Real Time</a:t>
+                      </a:r>
+                      <a:endParaRPr lang="ru-RU" b="0" dirty="0"/>
                     </a:p>
                   </a:txBody>
-                  <a:tcPr/>
+                  <a:tcPr anchor="ctr"/>
                 </a:tc>
                 <a:tc>
                   <a:txBody>
                     <a:bodyPr/>
                     <a:lstStyle/>
                     <a:p>
-                      <a:endParaRPr lang="ru-RU"/>
+                      <a:pPr algn="ctr"/>
+                      <a:r>
+                        <a:rPr lang="en-US" dirty="0" smtClean="0"/>
+                        <a:t>no</a:t>
+                      </a:r>
+                      <a:endParaRPr lang="ru-RU" dirty="0"/>
                     </a:p>
                   </a:txBody>
-                  <a:tcPr/>
+                  <a:tcPr anchor="ctr"/>
                 </a:tc>
                 <a:tc>
                   <a:txBody>
                     <a:bodyPr/>
                     <a:lstStyle/>
                     <a:p>
-                      <a:endParaRPr lang="ru-RU"/>
+                      <a:pPr algn="ctr"/>
+                      <a:r>
+                        <a:rPr lang="en-US" dirty="0" smtClean="0"/>
+                        <a:t>yes</a:t>
+                      </a:r>
+                      <a:endParaRPr lang="ru-RU" dirty="0"/>
                     </a:p>
                   </a:txBody>
-                  <a:tcPr/>
+                  <a:tcPr anchor="ctr"/>
                 </a:tc>
                 <a:tc>
                   <a:txBody>
                     <a:bodyPr/>
                     <a:lstStyle/>
                     <a:p>
-                      <a:endParaRPr lang="ru-RU"/>
+                      <a:pPr algn="ctr"/>
+                      <a:r>
+                        <a:rPr lang="en-US" dirty="0" smtClean="0"/>
+                        <a:t>no</a:t>
+                      </a:r>
+                      <a:endParaRPr lang="ru-RU" dirty="0"/>
                     </a:p>
                   </a:txBody>
-                  <a:tcPr/>
+                  <a:tcPr anchor="ctr"/>
                 </a:tc>
               </a:tr>
-              <a:tr h="370840">
+              <a:tr h="602138">
                 <a:tc>
                   <a:txBody>
                     <a:bodyPr/>
                     <a:lstStyle/>
                     <a:p>
-                      <a:endParaRPr lang="ru-RU"/>
+                      <a:r>
+                        <a:rPr lang="en-US" b="0" dirty="0" smtClean="0"/>
+                        <a:t>Delayed Reclamation</a:t>
+                      </a:r>
+                      <a:endParaRPr lang="ru-RU" b="0" dirty="0"/>
                     </a:p>
                   </a:txBody>
-                  <a:tcPr/>
+                  <a:tcPr anchor="ctr"/>
                 </a:tc>
                 <a:tc>
                   <a:txBody>
                     <a:bodyPr/>
                     <a:lstStyle/>
                     <a:p>
-                      <a:endParaRPr lang="ru-RU"/>
+                      <a:pPr algn="ctr"/>
+                      <a:r>
+                        <a:rPr lang="en-US" dirty="0" smtClean="0"/>
+                        <a:t>yes</a:t>
+                      </a:r>
+                      <a:endParaRPr lang="ru-RU" dirty="0"/>
                     </a:p>
                   </a:txBody>
-                  <a:tcPr/>
+                  <a:tcPr anchor="ctr"/>
                 </a:tc>
                 <a:tc>
                   <a:txBody>
                     <a:bodyPr/>
                     <a:lstStyle/>
                     <a:p>
-                      <a:endParaRPr lang="ru-RU"/>
+                      <a:pPr algn="ctr"/>
+                      <a:r>
+                        <a:rPr lang="en-US" dirty="0" smtClean="0"/>
+                        <a:t>no</a:t>
+                      </a:r>
+                      <a:endParaRPr lang="ru-RU" dirty="0"/>
                     </a:p>
                   </a:txBody>
-                  <a:tcPr/>
+                  <a:tcPr anchor="ctr"/>
                 </a:tc>
                 <a:tc>
                   <a:txBody>
                     <a:bodyPr/>
                     <a:lstStyle/>
                     <a:p>
-                      <a:endParaRPr lang="ru-RU"/>
+                      <a:pPr algn="ctr"/>
+                      <a:r>
+                        <a:rPr lang="en-US" dirty="0" smtClean="0"/>
+                        <a:t>no</a:t>
+                      </a:r>
+                      <a:endParaRPr lang="ru-RU" dirty="0"/>
                     </a:p>
                   </a:txBody>
-                  <a:tcPr/>
+                  <a:tcPr anchor="ctr"/>
                 </a:tc>
               </a:tr>
-              <a:tr h="370840">
+              <a:tr h="602138">
                 <a:tc>
                   <a:txBody>
                     <a:bodyPr/>
                     <a:lstStyle/>
                     <a:p>
-                      <a:endParaRPr lang="ru-RU"/>
+                      <a:r>
+                        <a:rPr lang="en-US" b="0" dirty="0" smtClean="0"/>
+                        <a:t>Cost</a:t>
+                      </a:r>
+                      <a:r>
+                        <a:rPr lang="en-US" b="0" baseline="0" dirty="0" smtClean="0"/>
+                        <a:t> per mutation</a:t>
+                      </a:r>
+                      <a:endParaRPr lang="ru-RU" b="0" dirty="0"/>
                     </a:p>
                   </a:txBody>
-                  <a:tcPr/>
+                  <a:tcPr anchor="ctr"/>
                 </a:tc>
                 <a:tc>
                   <a:txBody>
                     <a:bodyPr/>
                     <a:lstStyle/>
                     <a:p>
-                      <a:endParaRPr lang="ru-RU"/>
+                      <a:pPr algn="ctr"/>
+                      <a:r>
+                        <a:rPr lang="en-US" dirty="0" smtClean="0"/>
+                        <a:t>none</a:t>
+                      </a:r>
+                      <a:endParaRPr lang="ru-RU" dirty="0"/>
                     </a:p>
                   </a:txBody>
-                  <a:tcPr/>
+                  <a:tcPr anchor="ctr"/>
                 </a:tc>
                 <a:tc>
                   <a:txBody>
                     <a:bodyPr/>
                     <a:lstStyle/>
                     <a:p>
-                      <a:endParaRPr lang="ru-RU"/>
+                      <a:pPr algn="ctr"/>
+                      <a:r>
+                        <a:rPr lang="en-US" dirty="0" smtClean="0"/>
+                        <a:t>high</a:t>
+                      </a:r>
+                      <a:endParaRPr lang="ru-RU" dirty="0"/>
                     </a:p>
                   </a:txBody>
-                  <a:tcPr/>
+                  <a:tcPr anchor="ctr"/>
                 </a:tc>
                 <a:tc>
                   <a:txBody>
                     <a:bodyPr/>
                     <a:lstStyle/>
                     <a:p>
-                      <a:endParaRPr lang="ru-RU"/>
+                      <a:pPr algn="ctr"/>
+                      <a:r>
+                        <a:rPr lang="en-US" dirty="0" smtClean="0"/>
+                        <a:t>low</a:t>
+                      </a:r>
+                      <a:endParaRPr lang="ru-RU" dirty="0"/>
                     </a:p>
                   </a:txBody>
-                  <a:tcPr/>
+                  <a:tcPr anchor="ctr"/>
                 </a:tc>
               </a:tr>
-              <a:tr h="370840">
+              <a:tr h="602138">
                 <a:tc>
                   <a:txBody>
                     <a:bodyPr/>
                     <a:lstStyle/>
                     <a:p>
-                      <a:endParaRPr lang="ru-RU"/>
+                      <a:r>
+                        <a:rPr lang="en-US" b="0" dirty="0" smtClean="0"/>
+                        <a:t>Collects cycles</a:t>
+                      </a:r>
+                      <a:endParaRPr lang="ru-RU" b="0" dirty="0"/>
                     </a:p>
                   </a:txBody>
-                  <a:tcPr/>
+                  <a:tcPr anchor="ctr"/>
                 </a:tc>
                 <a:tc>
                   <a:txBody>
                     <a:bodyPr/>
                     <a:lstStyle/>
                     <a:p>
-                      <a:endParaRPr lang="ru-RU"/>
+                      <a:pPr algn="ctr"/>
+                      <a:r>
+                        <a:rPr lang="en-US" dirty="0" smtClean="0"/>
+                        <a:t>yes</a:t>
+                      </a:r>
+                      <a:endParaRPr lang="ru-RU" dirty="0"/>
                     </a:p>
                   </a:txBody>
-                  <a:tcPr/>
+                  <a:tcPr anchor="ctr"/>
                 </a:tc>
                 <a:tc>
                   <a:txBody>
                     <a:bodyPr/>
                     <a:lstStyle/>
                     <a:p>
-                      <a:endParaRPr lang="ru-RU"/>
+                      <a:pPr algn="ctr"/>
+                      <a:r>
+                        <a:rPr lang="en-US" dirty="0" smtClean="0"/>
+                        <a:t>no</a:t>
+                      </a:r>
+                      <a:endParaRPr lang="ru-RU" dirty="0"/>
                     </a:p>
                   </a:txBody>
-                  <a:tcPr/>
+                  <a:tcPr anchor="ctr"/>
                 </a:tc>
                 <a:tc>
                   <a:txBody>
                     <a:bodyPr/>
                     <a:lstStyle/>
                     <a:p>
-                      <a:endParaRPr lang="ru-RU"/>
+                      <a:pPr algn="ctr"/>
+                      <a:r>
+                        <a:rPr lang="en-US" dirty="0" smtClean="0"/>
+                        <a:t>yes</a:t>
+                      </a:r>
+                      <a:endParaRPr lang="ru-RU" dirty="0"/>
                     </a:p>
                   </a:txBody>
-                  <a:tcPr/>
+                  <a:tcPr anchor="ctr"/>
                 </a:tc>
               </a:tr>
             </a:tbl>
@@ -19623,12 +19951,28 @@
             <a:pPr>
               <a:buSzPct val="80000"/>
             </a:pPr>
+            <a:endParaRPr lang="en-US" sz="2400" cap="none" dirty="0" smtClean="0">
+              <a:latin typeface="Calibri" panose="020F0502020204030204" pitchFamily="34" charset="0"/>
+              <a:cs typeface="Calibri" panose="020F0502020204030204" pitchFamily="34" charset="0"/>
+            </a:endParaRPr>
+          </a:p>
+          <a:p>
+            <a:pPr>
+              <a:buSzPct val="80000"/>
+            </a:pPr>
             <a:r>
               <a:rPr lang="en-US" sz="2400" cap="none" dirty="0" smtClean="0">
                 <a:latin typeface="Calibri" panose="020F0502020204030204" pitchFamily="34" charset="0"/>
                 <a:cs typeface="Calibri" panose="020F0502020204030204" pitchFamily="34" charset="0"/>
               </a:rPr>
-              <a:t>Each object has counter of incoming pointers</a:t>
+              <a:t>Each </a:t>
+            </a:r>
+            <a:r>
+              <a:rPr lang="en-US" sz="2400" cap="none" dirty="0" smtClean="0">
+                <a:latin typeface="Calibri" panose="020F0502020204030204" pitchFamily="34" charset="0"/>
+                <a:cs typeface="Calibri" panose="020F0502020204030204" pitchFamily="34" charset="0"/>
+              </a:rPr>
+              <a:t>object has counter of incoming pointers</a:t>
             </a:r>
           </a:p>
           <a:p>
@@ -20951,12 +21295,28 @@
             <a:pPr>
               <a:buSzPct val="80000"/>
             </a:pPr>
+            <a:endParaRPr lang="en-US" sz="2400" cap="none" dirty="0" smtClean="0">
+              <a:latin typeface="Calibri" panose="020F0502020204030204" pitchFamily="34" charset="0"/>
+              <a:cs typeface="Calibri" panose="020F0502020204030204" pitchFamily="34" charset="0"/>
+            </a:endParaRPr>
+          </a:p>
+          <a:p>
+            <a:pPr>
+              <a:buSzPct val="80000"/>
+            </a:pPr>
             <a:r>
               <a:rPr lang="en-US" sz="2400" cap="none" dirty="0" smtClean="0">
                 <a:latin typeface="Calibri" panose="020F0502020204030204" pitchFamily="34" charset="0"/>
                 <a:cs typeface="Calibri" panose="020F0502020204030204" pitchFamily="34" charset="0"/>
               </a:rPr>
-              <a:t>Each object has counter of incoming pointers</a:t>
+              <a:t>Each </a:t>
+            </a:r>
+            <a:r>
+              <a:rPr lang="en-US" sz="2400" cap="none" dirty="0" smtClean="0">
+                <a:latin typeface="Calibri" panose="020F0502020204030204" pitchFamily="34" charset="0"/>
+                <a:cs typeface="Calibri" panose="020F0502020204030204" pitchFamily="34" charset="0"/>
+              </a:rPr>
+              <a:t>object has counter of incoming pointers</a:t>
             </a:r>
           </a:p>
           <a:p>

</xml_diff>

<commit_message>
updated garbage collection in .net slides
</commit_message>
<xml_diff>
--- a/ppt/Garbage collection in dotnet.pptx
+++ b/ppt/Garbage collection in dotnet.pptx
@@ -24,11 +24,14 @@
     <p:sldId id="275" r:id="rId18"/>
     <p:sldId id="277" r:id="rId19"/>
     <p:sldId id="269" r:id="rId20"/>
-    <p:sldId id="259" r:id="rId21"/>
-    <p:sldId id="258" r:id="rId22"/>
-    <p:sldId id="268" r:id="rId23"/>
+    <p:sldId id="280" r:id="rId21"/>
+    <p:sldId id="259" r:id="rId22"/>
+    <p:sldId id="258" r:id="rId23"/>
     <p:sldId id="261" r:id="rId24"/>
     <p:sldId id="260" r:id="rId25"/>
+    <p:sldId id="281" r:id="rId26"/>
+    <p:sldId id="268" r:id="rId27"/>
+    <p:sldId id="282" r:id="rId28"/>
   </p:sldIdLst>
   <p:sldSz cx="9144000" cy="6858000" type="screen4x3"/>
   <p:notesSz cx="6858000" cy="9144000"/>
@@ -13032,7 +13035,7 @@
           <a:p>
             <a:r>
               <a:rPr lang="en-US" dirty="0" smtClean="0"/>
-              <a:t>Memory Allocation process</a:t>
+              <a:t>Copying collections</a:t>
             </a:r>
             <a:endParaRPr lang="ru-RU" dirty="0"/>
           </a:p>
@@ -13051,223 +13054,30 @@
         <p:spPr>
           <a:xfrm>
             <a:off x="818348" y="1371600"/>
-            <a:ext cx="7511472" cy="4730460"/>
-          </a:xfrm>
-        </p:spPr>
-        <p:txBody>
-          <a:bodyPr>
+            <a:ext cx="7511472" cy="5217090"/>
+          </a:xfrm>
+        </p:spPr>
+        <p:txBody>
+          <a:bodyPr anchor="t">
             <a:normAutofit/>
           </a:bodyPr>
           <a:lstStyle/>
           <a:p>
-            <a:pPr marL="342900" indent="-342900">
+            <a:pPr marL="0" indent="0">
               <a:buSzPct val="80000"/>
-              <a:buFont typeface="+mj-lt"/>
-              <a:buAutoNum type="arabicPeriod"/>
+              <a:buNone/>
             </a:pPr>
-            <a:r>
-              <a:rPr lang="en-US" sz="2400" cap="none" dirty="0" smtClean="0">
-                <a:latin typeface="Calibri" panose="020F0502020204030204" pitchFamily="34" charset="0"/>
-                <a:cs typeface="Calibri" panose="020F0502020204030204" pitchFamily="34" charset="0"/>
-              </a:rPr>
-              <a:t>Before CLR executes the first line of the managed code, it creates three application domains.</a:t>
-            </a:r>
-          </a:p>
-          <a:p>
-            <a:pPr marL="800100" lvl="1" indent="-342900">
-              <a:buSzPct val="80000"/>
-              <a:buFont typeface="+mj-lt"/>
-              <a:buAutoNum type="arabicPeriod"/>
-            </a:pPr>
-            <a:r>
-              <a:rPr lang="en-US" sz="2200" cap="none" dirty="0" smtClean="0">
-                <a:latin typeface="Calibri" panose="020F0502020204030204" pitchFamily="34" charset="0"/>
-                <a:cs typeface="Calibri" panose="020F0502020204030204" pitchFamily="34" charset="0"/>
-              </a:rPr>
-              <a:t>System Domain</a:t>
-            </a:r>
-          </a:p>
-          <a:p>
-            <a:pPr marL="800100" lvl="1" indent="-342900">
-              <a:buSzPct val="80000"/>
-              <a:buFont typeface="+mj-lt"/>
-              <a:buAutoNum type="arabicPeriod"/>
-            </a:pPr>
-            <a:r>
-              <a:rPr lang="en-US" sz="2200" cap="none" dirty="0" smtClean="0">
-                <a:latin typeface="Calibri" panose="020F0502020204030204" pitchFamily="34" charset="0"/>
-                <a:cs typeface="Calibri" panose="020F0502020204030204" pitchFamily="34" charset="0"/>
-              </a:rPr>
-              <a:t>Shared Domain</a:t>
-            </a:r>
-          </a:p>
-          <a:p>
-            <a:pPr marL="800100" lvl="1" indent="-342900">
-              <a:buSzPct val="80000"/>
-              <a:buFont typeface="+mj-lt"/>
-              <a:buAutoNum type="arabicPeriod"/>
-            </a:pPr>
-            <a:r>
-              <a:rPr lang="en-US" sz="2200" cap="none" dirty="0" smtClean="0">
-                <a:latin typeface="Calibri" panose="020F0502020204030204" pitchFamily="34" charset="0"/>
-                <a:cs typeface="Calibri" panose="020F0502020204030204" pitchFamily="34" charset="0"/>
-              </a:rPr>
-              <a:t>Default </a:t>
-            </a:r>
-            <a:r>
-              <a:rPr lang="en-US" sz="2200" cap="none" dirty="0" err="1" smtClean="0">
-                <a:latin typeface="Calibri" panose="020F0502020204030204" pitchFamily="34" charset="0"/>
-                <a:cs typeface="Calibri" panose="020F0502020204030204" pitchFamily="34" charset="0"/>
-              </a:rPr>
-              <a:t>AppDomain</a:t>
-            </a:r>
-            <a:endParaRPr lang="en-US" sz="2200" cap="none" dirty="0" smtClean="0">
+            <a:endParaRPr lang="en-US" sz="2400" cap="none" dirty="0" smtClean="0">
               <a:latin typeface="Calibri" panose="020F0502020204030204" pitchFamily="34" charset="0"/>
               <a:cs typeface="Calibri" panose="020F0502020204030204" pitchFamily="34" charset="0"/>
             </a:endParaRPr>
           </a:p>
-          <a:p>
-            <a:pPr marL="342900" indent="-342900">
-              <a:buSzPct val="80000"/>
-              <a:buFont typeface="+mj-lt"/>
-              <a:buAutoNum type="arabicPeriod"/>
-            </a:pPr>
-            <a:r>
-              <a:rPr lang="en-US" sz="2400" cap="none" dirty="0" smtClean="0">
-                <a:latin typeface="Calibri" panose="020F0502020204030204" pitchFamily="34" charset="0"/>
-                <a:cs typeface="Calibri" panose="020F0502020204030204" pitchFamily="34" charset="0"/>
-              </a:rPr>
-              <a:t>Define size of object MyClass</a:t>
-            </a:r>
-          </a:p>
-          <a:p>
-            <a:pPr marL="342900" indent="-342900">
-              <a:buSzPct val="80000"/>
-              <a:buFont typeface="+mj-lt"/>
-              <a:buAutoNum type="arabicPeriod"/>
-            </a:pPr>
-            <a:r>
-              <a:rPr lang="en-US" sz="2400" cap="none" dirty="0" smtClean="0">
-                <a:latin typeface="Calibri" panose="020F0502020204030204" pitchFamily="34" charset="0"/>
-                <a:cs typeface="Calibri" panose="020F0502020204030204" pitchFamily="34" charset="0"/>
-              </a:rPr>
-              <a:t>Allocate memory </a:t>
-            </a:r>
-            <a:endParaRPr lang="ru-RU" sz="2400" cap="none" dirty="0">
-              <a:latin typeface="Calibri" panose="020F0502020204030204" pitchFamily="34" charset="0"/>
-              <a:cs typeface="Calibri" panose="020F0502020204030204" pitchFamily="34" charset="0"/>
-            </a:endParaRPr>
-          </a:p>
-        </p:txBody>
-      </p:sp>
-      <p:sp>
-        <p:nvSpPr>
-          <p:cNvPr id="5" name="Rectangle 4"/>
-          <p:cNvSpPr/>
-          <p:nvPr/>
-        </p:nvSpPr>
-        <p:spPr>
-          <a:xfrm>
-            <a:off x="1922293" y="1371600"/>
-            <a:ext cx="5303579" cy="695195"/>
-          </a:xfrm>
-          <a:prstGeom prst="rect">
-            <a:avLst/>
-          </a:prstGeom>
-          <a:solidFill>
-            <a:schemeClr val="tx2">
-              <a:lumMod val="25000"/>
-            </a:schemeClr>
-          </a:solidFill>
-          <a:ln>
-            <a:solidFill>
-              <a:schemeClr val="accent6"/>
-            </a:solidFill>
-          </a:ln>
-        </p:spPr>
-        <p:style>
-          <a:lnRef idx="2">
-            <a:schemeClr val="accent1">
-              <a:shade val="50000"/>
-            </a:schemeClr>
-          </a:lnRef>
-          <a:fillRef idx="1">
-            <a:schemeClr val="accent1"/>
-          </a:fillRef>
-          <a:effectRef idx="0">
-            <a:schemeClr val="accent1"/>
-          </a:effectRef>
-          <a:fontRef idx="minor">
-            <a:schemeClr val="lt1"/>
-          </a:fontRef>
-        </p:style>
-        <p:txBody>
-          <a:bodyPr rtlCol="0" anchor="ctr"/>
-          <a:lstStyle/>
-          <a:p>
-            <a:pPr algn="ctr"/>
-            <a:r>
-              <a:rPr lang="en-US" sz="2000" dirty="0" smtClean="0">
-                <a:solidFill>
-                  <a:srgbClr val="F137E8"/>
-                </a:solidFill>
-                <a:latin typeface="Courier New" panose="02070309020205020404" pitchFamily="49" charset="0"/>
-                <a:cs typeface="Courier New" panose="02070309020205020404" pitchFamily="49" charset="0"/>
-              </a:rPr>
-              <a:t>MyClass</a:t>
-            </a:r>
-            <a:r>
-              <a:rPr lang="en-US" sz="2000" dirty="0" smtClean="0">
-                <a:latin typeface="Courier New" panose="02070309020205020404" pitchFamily="49" charset="0"/>
-                <a:cs typeface="Courier New" panose="02070309020205020404" pitchFamily="49" charset="0"/>
-              </a:rPr>
-              <a:t> instance = </a:t>
-            </a:r>
-            <a:r>
-              <a:rPr lang="en-US" sz="2000" dirty="0" smtClean="0">
-                <a:solidFill>
-                  <a:srgbClr val="3366FF"/>
-                </a:solidFill>
-                <a:latin typeface="Courier New" panose="02070309020205020404" pitchFamily="49" charset="0"/>
-                <a:cs typeface="Courier New" panose="02070309020205020404" pitchFamily="49" charset="0"/>
-              </a:rPr>
-              <a:t>new</a:t>
-            </a:r>
-            <a:r>
-              <a:rPr lang="en-US" sz="2000" dirty="0" smtClean="0">
-                <a:latin typeface="Courier New" panose="02070309020205020404" pitchFamily="49" charset="0"/>
-                <a:cs typeface="Courier New" panose="02070309020205020404" pitchFamily="49" charset="0"/>
-              </a:rPr>
-              <a:t> </a:t>
-            </a:r>
-            <a:r>
-              <a:rPr lang="en-US" sz="2000" dirty="0" smtClean="0">
-                <a:solidFill>
-                  <a:srgbClr val="F137E8"/>
-                </a:solidFill>
-                <a:latin typeface="Courier New" panose="02070309020205020404" pitchFamily="49" charset="0"/>
-                <a:cs typeface="Courier New" panose="02070309020205020404" pitchFamily="49" charset="0"/>
-              </a:rPr>
-              <a:t>MyClass</a:t>
-            </a:r>
-            <a:r>
-              <a:rPr lang="en-US" sz="2000" dirty="0" smtClean="0">
-                <a:latin typeface="Courier New" panose="02070309020205020404" pitchFamily="49" charset="0"/>
-                <a:cs typeface="Courier New" panose="02070309020205020404" pitchFamily="49" charset="0"/>
-              </a:rPr>
-              <a:t>();</a:t>
-            </a:r>
-            <a:endParaRPr lang="ru-RU" sz="2000" dirty="0">
-              <a:latin typeface="Courier New" panose="02070309020205020404" pitchFamily="49" charset="0"/>
-              <a:cs typeface="Courier New" panose="02070309020205020404" pitchFamily="49" charset="0"/>
-            </a:endParaRPr>
-          </a:p>
         </p:txBody>
       </p:sp>
     </p:spTree>
     <p:extLst>
       <p:ext uri="{BB962C8B-B14F-4D97-AF65-F5344CB8AC3E}">
-        <p14:creationId xmlns:p14="http://schemas.microsoft.com/office/powerpoint/2010/main" val="2397819296"/>
+        <p14:creationId xmlns:p14="http://schemas.microsoft.com/office/powerpoint/2010/main" val="2533420550"/>
       </p:ext>
     </p:extLst>
   </p:cSld>
@@ -13361,8 +13171,61 @@
                 <a:latin typeface="Calibri" panose="020F0502020204030204" pitchFamily="34" charset="0"/>
                 <a:cs typeface="Calibri" panose="020F0502020204030204" pitchFamily="34" charset="0"/>
               </a:rPr>
-              <a:t>Define size of object MyClass</a:t>
-            </a:r>
+              <a:t>Before CLR executes the first line of the managed code, it creates three application domains.</a:t>
+            </a:r>
+          </a:p>
+          <a:p>
+            <a:pPr marL="800100" lvl="1" indent="-342900">
+              <a:buSzPct val="80000"/>
+              <a:buFont typeface="+mj-lt"/>
+              <a:buAutoNum type="arabicPeriod"/>
+            </a:pPr>
+            <a:r>
+              <a:rPr lang="en-US" sz="2200" cap="none" dirty="0" smtClean="0">
+                <a:latin typeface="Calibri" panose="020F0502020204030204" pitchFamily="34" charset="0"/>
+                <a:cs typeface="Calibri" panose="020F0502020204030204" pitchFamily="34" charset="0"/>
+              </a:rPr>
+              <a:t>System Domain</a:t>
+            </a:r>
+          </a:p>
+          <a:p>
+            <a:pPr marL="800100" lvl="1" indent="-342900">
+              <a:buSzPct val="80000"/>
+              <a:buFont typeface="+mj-lt"/>
+              <a:buAutoNum type="arabicPeriod"/>
+            </a:pPr>
+            <a:r>
+              <a:rPr lang="en-US" sz="2200" cap="none" dirty="0" smtClean="0">
+                <a:latin typeface="Calibri" panose="020F0502020204030204" pitchFamily="34" charset="0"/>
+                <a:cs typeface="Calibri" panose="020F0502020204030204" pitchFamily="34" charset="0"/>
+              </a:rPr>
+              <a:t>Shared Domain</a:t>
+            </a:r>
+          </a:p>
+          <a:p>
+            <a:pPr marL="800100" lvl="1" indent="-342900">
+              <a:buSzPct val="80000"/>
+              <a:buFont typeface="+mj-lt"/>
+              <a:buAutoNum type="arabicPeriod"/>
+            </a:pPr>
+            <a:r>
+              <a:rPr lang="en-US" sz="2200" cap="none" dirty="0" smtClean="0">
+                <a:latin typeface="Calibri" panose="020F0502020204030204" pitchFamily="34" charset="0"/>
+                <a:cs typeface="Calibri" panose="020F0502020204030204" pitchFamily="34" charset="0"/>
+              </a:rPr>
+              <a:t>Default </a:t>
+            </a:r>
+            <a:r>
+              <a:rPr lang="en-US" sz="2200" cap="none" dirty="0" err="1" smtClean="0">
+                <a:latin typeface="Calibri" panose="020F0502020204030204" pitchFamily="34" charset="0"/>
+                <a:cs typeface="Calibri" panose="020F0502020204030204" pitchFamily="34" charset="0"/>
+              </a:rPr>
+              <a:t>AppDomain</a:t>
+            </a:r>
+            <a:endParaRPr lang="en-US" sz="2200" cap="none" dirty="0" smtClean="0">
+              <a:latin typeface="Calibri" panose="020F0502020204030204" pitchFamily="34" charset="0"/>
+              <a:cs typeface="Calibri" panose="020F0502020204030204" pitchFamily="34" charset="0"/>
+            </a:endParaRPr>
           </a:p>
           <a:p>
             <a:pPr marL="342900" indent="-342900">
@@ -13375,6 +13238,20 @@
                 <a:latin typeface="Calibri" panose="020F0502020204030204" pitchFamily="34" charset="0"/>
                 <a:cs typeface="Calibri" panose="020F0502020204030204" pitchFamily="34" charset="0"/>
               </a:rPr>
+              <a:t>Define size of object MyClass</a:t>
+            </a:r>
+          </a:p>
+          <a:p>
+            <a:pPr marL="342900" indent="-342900">
+              <a:buSzPct val="80000"/>
+              <a:buFont typeface="+mj-lt"/>
+              <a:buAutoNum type="arabicPeriod"/>
+            </a:pPr>
+            <a:r>
+              <a:rPr lang="en-US" sz="2400" cap="none" dirty="0" smtClean="0">
+                <a:latin typeface="Calibri" panose="020F0502020204030204" pitchFamily="34" charset="0"/>
+                <a:cs typeface="Calibri" panose="020F0502020204030204" pitchFamily="34" charset="0"/>
+              </a:rPr>
               <a:t>Allocate memory </a:t>
             </a:r>
             <a:endParaRPr lang="ru-RU" sz="2400" cap="none" dirty="0">
@@ -13393,7 +13270,7 @@
         <p:spPr>
           <a:xfrm>
             <a:off x="1922293" y="1371600"/>
-            <a:ext cx="5303579" cy="827314"/>
+            <a:ext cx="5303579" cy="695195"/>
           </a:xfrm>
           <a:prstGeom prst="rect">
             <a:avLst/>
@@ -13491,7 +13368,7 @@
     </p:spTree>
     <p:extLst>
       <p:ext uri="{BB962C8B-B14F-4D97-AF65-F5344CB8AC3E}">
-        <p14:creationId xmlns:p14="http://schemas.microsoft.com/office/powerpoint/2010/main" val="923669526"/>
+        <p14:creationId xmlns:p14="http://schemas.microsoft.com/office/powerpoint/2010/main" val="2397819296"/>
       </p:ext>
     </p:extLst>
   </p:cSld>
@@ -13547,7 +13424,7 @@
           <a:p>
             <a:r>
               <a:rPr lang="en-US" dirty="0" smtClean="0"/>
-              <a:t>Garbage Collection: Python</a:t>
+              <a:t>Memory Allocation process</a:t>
             </a:r>
             <a:endParaRPr lang="ru-RU" dirty="0"/>
           </a:p>
@@ -13570,101 +13447,144 @@
           </a:xfrm>
         </p:spPr>
         <p:txBody>
-          <a:bodyPr anchor="t">
+          <a:bodyPr>
             <a:normAutofit/>
           </a:bodyPr>
           <a:lstStyle/>
           <a:p>
-            <a:pPr>
+            <a:pPr marL="342900" indent="-342900">
               <a:buSzPct val="80000"/>
-            </a:pPr>
-            <a:r>
-              <a:rPr lang="en-US" sz="2400" b="1" u="sng" cap="none" dirty="0">
-                <a:latin typeface="Calibri" panose="020F0502020204030204" pitchFamily="34" charset="0"/>
-                <a:cs typeface="Calibri" panose="020F0502020204030204" pitchFamily="34" charset="0"/>
-              </a:rPr>
-              <a:t>Generational Reference </a:t>
-            </a:r>
-            <a:r>
-              <a:rPr lang="en-US" sz="2400" b="1" u="sng" cap="none" dirty="0" smtClean="0">
-                <a:latin typeface="Calibri" panose="020F0502020204030204" pitchFamily="34" charset="0"/>
-                <a:cs typeface="Calibri" panose="020F0502020204030204" pitchFamily="34" charset="0"/>
-              </a:rPr>
-              <a:t>Counting</a:t>
-            </a:r>
-          </a:p>
-          <a:p>
-            <a:pPr>
-              <a:buSzPct val="80000"/>
-            </a:pPr>
-            <a:endParaRPr lang="en-US" sz="2400" b="1" u="sng" cap="none" dirty="0" smtClean="0">
-              <a:latin typeface="Calibri" panose="020F0502020204030204" pitchFamily="34" charset="0"/>
-              <a:cs typeface="Calibri" panose="020F0502020204030204" pitchFamily="34" charset="0"/>
-            </a:endParaRPr>
-          </a:p>
-          <a:p>
-            <a:pPr>
-              <a:buSzPct val="80000"/>
+              <a:buFont typeface="+mj-lt"/>
+              <a:buAutoNum type="arabicPeriod"/>
             </a:pPr>
             <a:r>
               <a:rPr lang="en-US" sz="2400" cap="none" dirty="0" smtClean="0">
                 <a:latin typeface="Calibri" panose="020F0502020204030204" pitchFamily="34" charset="0"/>
                 <a:cs typeface="Calibri" panose="020F0502020204030204" pitchFamily="34" charset="0"/>
               </a:rPr>
-              <a:t>The same as .NET CLR, has </a:t>
-            </a:r>
-            <a:r>
-              <a:rPr lang="en-US" sz="2400" cap="none" dirty="0">
-                <a:latin typeface="Calibri" panose="020F0502020204030204" pitchFamily="34" charset="0"/>
-                <a:cs typeface="Calibri" panose="020F0502020204030204" pitchFamily="34" charset="0"/>
-              </a:rPr>
-              <a:t>3 </a:t>
-            </a:r>
+              <a:t>Define size of object MyClass</a:t>
+            </a:r>
+          </a:p>
+          <a:p>
+            <a:pPr marL="342900" indent="-342900">
+              <a:buSzPct val="80000"/>
+              <a:buFont typeface="+mj-lt"/>
+              <a:buAutoNum type="arabicPeriod"/>
+            </a:pPr>
             <a:r>
               <a:rPr lang="en-US" sz="2400" cap="none" dirty="0" smtClean="0">
                 <a:latin typeface="Calibri" panose="020F0502020204030204" pitchFamily="34" charset="0"/>
                 <a:cs typeface="Calibri" panose="020F0502020204030204" pitchFamily="34" charset="0"/>
               </a:rPr>
-              <a:t>generations.</a:t>
-            </a:r>
-          </a:p>
-          <a:p>
-            <a:pPr>
-              <a:buSzPct val="80000"/>
-            </a:pPr>
-            <a:r>
-              <a:rPr lang="en-US" sz="2400" cap="none" dirty="0" smtClean="0">
-                <a:latin typeface="Calibri" panose="020F0502020204030204" pitchFamily="34" charset="0"/>
-                <a:cs typeface="Calibri" panose="020F0502020204030204" pitchFamily="34" charset="0"/>
-              </a:rPr>
-              <a:t>GC can be disabled, and programmer can switch it off.</a:t>
-            </a:r>
-            <a:endParaRPr lang="en-US" sz="2400" cap="none" dirty="0">
+              <a:t>Allocate memory </a:t>
+            </a:r>
+            <a:endParaRPr lang="ru-RU" sz="2400" cap="none" dirty="0">
               <a:latin typeface="Calibri" panose="020F0502020204030204" pitchFamily="34" charset="0"/>
               <a:cs typeface="Calibri" panose="020F0502020204030204" pitchFamily="34" charset="0"/>
             </a:endParaRPr>
           </a:p>
-          <a:p>
-            <a:pPr>
-              <a:buSzPct val="80000"/>
-            </a:pPr>
-            <a:r>
-              <a:rPr lang="en-US" sz="2400" cap="none" dirty="0">
-                <a:latin typeface="Calibri" panose="020F0502020204030204" pitchFamily="34" charset="0"/>
-                <a:cs typeface="Calibri" panose="020F0502020204030204" pitchFamily="34" charset="0"/>
+        </p:txBody>
+      </p:sp>
+      <p:sp>
+        <p:nvSpPr>
+          <p:cNvPr id="5" name="Rectangle 4"/>
+          <p:cNvSpPr/>
+          <p:nvPr/>
+        </p:nvSpPr>
+        <p:spPr>
+          <a:xfrm>
+            <a:off x="1922293" y="1371600"/>
+            <a:ext cx="5303579" cy="827314"/>
+          </a:xfrm>
+          <a:prstGeom prst="rect">
+            <a:avLst/>
+          </a:prstGeom>
+          <a:solidFill>
+            <a:schemeClr val="tx2">
+              <a:lumMod val="25000"/>
+            </a:schemeClr>
+          </a:solidFill>
+          <a:ln>
+            <a:solidFill>
+              <a:schemeClr val="accent6"/>
+            </a:solidFill>
+          </a:ln>
+        </p:spPr>
+        <p:style>
+          <a:lnRef idx="2">
+            <a:schemeClr val="accent1">
+              <a:shade val="50000"/>
+            </a:schemeClr>
+          </a:lnRef>
+          <a:fillRef idx="1">
+            <a:schemeClr val="accent1"/>
+          </a:fillRef>
+          <a:effectRef idx="0">
+            <a:schemeClr val="accent1"/>
+          </a:effectRef>
+          <a:fontRef idx="minor">
+            <a:schemeClr val="lt1"/>
+          </a:fontRef>
+        </p:style>
+        <p:txBody>
+          <a:bodyPr rtlCol="0" anchor="ctr"/>
+          <a:lstStyle/>
+          <a:p>
+            <a:pPr algn="ctr"/>
+            <a:r>
+              <a:rPr lang="en-US" sz="2000" dirty="0" smtClean="0">
+                <a:solidFill>
+                  <a:srgbClr val="F137E8"/>
+                </a:solidFill>
+                <a:latin typeface="Courier New" panose="02070309020205020404" pitchFamily="49" charset="0"/>
+                <a:cs typeface="Courier New" panose="02070309020205020404" pitchFamily="49" charset="0"/>
               </a:rPr>
-              <a:t>Using reference counting with specific procedure of cycles handling</a:t>
-            </a:r>
-            <a:r>
-              <a:rPr lang="en-US" sz="2400" cap="none" dirty="0" smtClean="0">
-                <a:latin typeface="Calibri" panose="020F0502020204030204" pitchFamily="34" charset="0"/>
-                <a:cs typeface="Calibri" panose="020F0502020204030204" pitchFamily="34" charset="0"/>
+              <a:t>MyClass</a:t>
+            </a:r>
+            <a:r>
+              <a:rPr lang="en-US" sz="2000" dirty="0" smtClean="0">
+                <a:latin typeface="Courier New" panose="02070309020205020404" pitchFamily="49" charset="0"/>
+                <a:cs typeface="Courier New" panose="02070309020205020404" pitchFamily="49" charset="0"/>
               </a:rPr>
-              <a:t>.</a:t>
-            </a:r>
-            <a:endParaRPr lang="en-US" sz="2400" cap="none" dirty="0">
-              <a:latin typeface="Calibri" panose="020F0502020204030204" pitchFamily="34" charset="0"/>
-              <a:cs typeface="Calibri" panose="020F0502020204030204" pitchFamily="34" charset="0"/>
+              <a:t> instance = </a:t>
+            </a:r>
+            <a:r>
+              <a:rPr lang="en-US" sz="2000" dirty="0" smtClean="0">
+                <a:solidFill>
+                  <a:srgbClr val="3366FF"/>
+                </a:solidFill>
+                <a:latin typeface="Courier New" panose="02070309020205020404" pitchFamily="49" charset="0"/>
+                <a:cs typeface="Courier New" panose="02070309020205020404" pitchFamily="49" charset="0"/>
+              </a:rPr>
+              <a:t>new</a:t>
+            </a:r>
+            <a:r>
+              <a:rPr lang="en-US" sz="2000" dirty="0" smtClean="0">
+                <a:latin typeface="Courier New" panose="02070309020205020404" pitchFamily="49" charset="0"/>
+                <a:cs typeface="Courier New" panose="02070309020205020404" pitchFamily="49" charset="0"/>
+              </a:rPr>
+              <a:t> </a:t>
+            </a:r>
+            <a:r>
+              <a:rPr lang="en-US" sz="2000" dirty="0" smtClean="0">
+                <a:solidFill>
+                  <a:srgbClr val="F137E8"/>
+                </a:solidFill>
+                <a:latin typeface="Courier New" panose="02070309020205020404" pitchFamily="49" charset="0"/>
+                <a:cs typeface="Courier New" panose="02070309020205020404" pitchFamily="49" charset="0"/>
+              </a:rPr>
+              <a:t>MyClass</a:t>
+            </a:r>
+            <a:r>
+              <a:rPr lang="en-US" sz="2000" dirty="0" smtClean="0">
+                <a:latin typeface="Courier New" panose="02070309020205020404" pitchFamily="49" charset="0"/>
+                <a:cs typeface="Courier New" panose="02070309020205020404" pitchFamily="49" charset="0"/>
+              </a:rPr>
+              <a:t>();</a:t>
+            </a:r>
+            <a:endParaRPr lang="ru-RU" sz="2000" dirty="0">
+              <a:latin typeface="Courier New" panose="02070309020205020404" pitchFamily="49" charset="0"/>
+              <a:cs typeface="Courier New" panose="02070309020205020404" pitchFamily="49" charset="0"/>
             </a:endParaRPr>
           </a:p>
         </p:txBody>
@@ -13672,7 +13592,7 @@
     </p:spTree>
     <p:extLst>
       <p:ext uri="{BB962C8B-B14F-4D97-AF65-F5344CB8AC3E}">
-        <p14:creationId xmlns:p14="http://schemas.microsoft.com/office/powerpoint/2010/main" val="3734784952"/>
+        <p14:creationId xmlns:p14="http://schemas.microsoft.com/office/powerpoint/2010/main" val="923669526"/>
       </p:ext>
     </p:extLst>
   </p:cSld>
@@ -15684,6 +15604,619 @@
 </p:sld>
 </file>
 
+<file path=ppt/slides/slide25.xml><?xml version="1.0" encoding="utf-8"?>
+<p:sld xmlns:a="http://schemas.openxmlformats.org/drawingml/2006/main" xmlns:r="http://schemas.openxmlformats.org/officeDocument/2006/relationships" xmlns:p="http://schemas.openxmlformats.org/presentationml/2006/main">
+  <p:cSld>
+    <p:spTree>
+      <p:nvGrpSpPr>
+        <p:cNvPr id="1" name=""/>
+        <p:cNvGrpSpPr/>
+        <p:nvPr/>
+      </p:nvGrpSpPr>
+      <p:grpSpPr>
+        <a:xfrm>
+          <a:off x="0" y="0"/>
+          <a:ext cx="0" cy="0"/>
+          <a:chOff x="0" y="0"/>
+          <a:chExt cx="0" cy="0"/>
+        </a:xfrm>
+      </p:grpSpPr>
+      <p:sp>
+        <p:nvSpPr>
+          <p:cNvPr id="2" name="Title 1"/>
+          <p:cNvSpPr>
+            <a:spLocks noGrp="1"/>
+          </p:cNvSpPr>
+          <p:nvPr>
+            <p:ph type="title"/>
+          </p:nvPr>
+        </p:nvSpPr>
+        <p:spPr>
+          <a:xfrm>
+            <a:off x="818347" y="596018"/>
+            <a:ext cx="7511473" cy="623182"/>
+          </a:xfrm>
+        </p:spPr>
+        <p:txBody>
+          <a:bodyPr/>
+          <a:lstStyle/>
+          <a:p>
+            <a:r>
+              <a:rPr lang="en-US" dirty="0" smtClean="0"/>
+              <a:t>GC in</a:t>
+            </a:r>
+            <a:r>
+              <a:rPr lang="en-US" dirty="0" smtClean="0"/>
+              <a:t> Python</a:t>
+            </a:r>
+            <a:endParaRPr lang="ru-RU" dirty="0"/>
+          </a:p>
+        </p:txBody>
+      </p:sp>
+      <p:sp>
+        <p:nvSpPr>
+          <p:cNvPr id="3" name="Content Placeholder 2"/>
+          <p:cNvSpPr>
+            <a:spLocks noGrp="1"/>
+          </p:cNvSpPr>
+          <p:nvPr>
+            <p:ph idx="1"/>
+          </p:nvPr>
+        </p:nvSpPr>
+        <p:spPr>
+          <a:xfrm>
+            <a:off x="818348" y="1371600"/>
+            <a:ext cx="7511472" cy="4730460"/>
+          </a:xfrm>
+        </p:spPr>
+        <p:txBody>
+          <a:bodyPr anchor="t">
+            <a:normAutofit/>
+          </a:bodyPr>
+          <a:lstStyle/>
+          <a:p>
+            <a:pPr>
+              <a:buSzPct val="80000"/>
+            </a:pPr>
+            <a:r>
+              <a:rPr lang="en-US" sz="2400" b="1" u="sng" cap="none" dirty="0">
+                <a:latin typeface="Calibri" panose="020F0502020204030204" pitchFamily="34" charset="0"/>
+                <a:cs typeface="Calibri" panose="020F0502020204030204" pitchFamily="34" charset="0"/>
+              </a:rPr>
+              <a:t>Generational Reference </a:t>
+            </a:r>
+            <a:r>
+              <a:rPr lang="en-US" sz="2400" b="1" u="sng" cap="none" dirty="0" smtClean="0">
+                <a:latin typeface="Calibri" panose="020F0502020204030204" pitchFamily="34" charset="0"/>
+                <a:cs typeface="Calibri" panose="020F0502020204030204" pitchFamily="34" charset="0"/>
+              </a:rPr>
+              <a:t>Counting</a:t>
+            </a:r>
+          </a:p>
+          <a:p>
+            <a:pPr>
+              <a:buSzPct val="80000"/>
+            </a:pPr>
+            <a:endParaRPr lang="en-US" sz="2400" b="1" u="sng" cap="none" dirty="0" smtClean="0">
+              <a:latin typeface="Calibri" panose="020F0502020204030204" pitchFamily="34" charset="0"/>
+              <a:cs typeface="Calibri" panose="020F0502020204030204" pitchFamily="34" charset="0"/>
+            </a:endParaRPr>
+          </a:p>
+          <a:p>
+            <a:pPr>
+              <a:buSzPct val="80000"/>
+            </a:pPr>
+            <a:r>
+              <a:rPr lang="en-US" sz="2400" cap="none" dirty="0" smtClean="0">
+                <a:latin typeface="Calibri" panose="020F0502020204030204" pitchFamily="34" charset="0"/>
+                <a:cs typeface="Calibri" panose="020F0502020204030204" pitchFamily="34" charset="0"/>
+              </a:rPr>
+              <a:t>The same as .NET CLR, has </a:t>
+            </a:r>
+            <a:r>
+              <a:rPr lang="en-US" sz="2400" cap="none" dirty="0">
+                <a:latin typeface="Calibri" panose="020F0502020204030204" pitchFamily="34" charset="0"/>
+                <a:cs typeface="Calibri" panose="020F0502020204030204" pitchFamily="34" charset="0"/>
+              </a:rPr>
+              <a:t>3 </a:t>
+            </a:r>
+            <a:r>
+              <a:rPr lang="en-US" sz="2400" cap="none" dirty="0" smtClean="0">
+                <a:latin typeface="Calibri" panose="020F0502020204030204" pitchFamily="34" charset="0"/>
+                <a:cs typeface="Calibri" panose="020F0502020204030204" pitchFamily="34" charset="0"/>
+              </a:rPr>
+              <a:t>generations.</a:t>
+            </a:r>
+          </a:p>
+          <a:p>
+            <a:pPr>
+              <a:buSzPct val="80000"/>
+            </a:pPr>
+            <a:r>
+              <a:rPr lang="en-US" sz="2400" cap="none" dirty="0" smtClean="0">
+                <a:latin typeface="Calibri" panose="020F0502020204030204" pitchFamily="34" charset="0"/>
+                <a:cs typeface="Calibri" panose="020F0502020204030204" pitchFamily="34" charset="0"/>
+              </a:rPr>
+              <a:t>GC can be disabled, and programmer can switch it off.</a:t>
+            </a:r>
+            <a:endParaRPr lang="en-US" sz="2400" cap="none" dirty="0">
+              <a:latin typeface="Calibri" panose="020F0502020204030204" pitchFamily="34" charset="0"/>
+              <a:cs typeface="Calibri" panose="020F0502020204030204" pitchFamily="34" charset="0"/>
+            </a:endParaRPr>
+          </a:p>
+          <a:p>
+            <a:pPr>
+              <a:buSzPct val="80000"/>
+            </a:pPr>
+            <a:r>
+              <a:rPr lang="en-US" sz="2400" cap="none" dirty="0">
+                <a:latin typeface="Calibri" panose="020F0502020204030204" pitchFamily="34" charset="0"/>
+                <a:cs typeface="Calibri" panose="020F0502020204030204" pitchFamily="34" charset="0"/>
+              </a:rPr>
+              <a:t>Using reference counting with specific procedure of cycles handling</a:t>
+            </a:r>
+            <a:r>
+              <a:rPr lang="en-US" sz="2400" cap="none" dirty="0" smtClean="0">
+                <a:latin typeface="Calibri" panose="020F0502020204030204" pitchFamily="34" charset="0"/>
+                <a:cs typeface="Calibri" panose="020F0502020204030204" pitchFamily="34" charset="0"/>
+              </a:rPr>
+              <a:t>.</a:t>
+            </a:r>
+            <a:endParaRPr lang="en-US" sz="2400" cap="none" dirty="0">
+              <a:latin typeface="Calibri" panose="020F0502020204030204" pitchFamily="34" charset="0"/>
+              <a:cs typeface="Calibri" panose="020F0502020204030204" pitchFamily="34" charset="0"/>
+            </a:endParaRPr>
+          </a:p>
+        </p:txBody>
+      </p:sp>
+    </p:spTree>
+    <p:extLst>
+      <p:ext uri="{BB962C8B-B14F-4D97-AF65-F5344CB8AC3E}">
+        <p14:creationId xmlns:p14="http://schemas.microsoft.com/office/powerpoint/2010/main" val="3330863188"/>
+      </p:ext>
+    </p:extLst>
+  </p:cSld>
+  <p:clrMapOvr>
+    <a:masterClrMapping/>
+  </p:clrMapOvr>
+  <p:timing>
+    <p:tnLst>
+      <p:par>
+        <p:cTn id="1" dur="indefinite" restart="never" nodeType="tmRoot"/>
+      </p:par>
+    </p:tnLst>
+  </p:timing>
+</p:sld>
+</file>
+
+<file path=ppt/slides/slide26.xml><?xml version="1.0" encoding="utf-8"?>
+<p:sld xmlns:a="http://schemas.openxmlformats.org/drawingml/2006/main" xmlns:r="http://schemas.openxmlformats.org/officeDocument/2006/relationships" xmlns:p="http://schemas.openxmlformats.org/presentationml/2006/main">
+  <p:cSld>
+    <p:spTree>
+      <p:nvGrpSpPr>
+        <p:cNvPr id="1" name=""/>
+        <p:cNvGrpSpPr/>
+        <p:nvPr/>
+      </p:nvGrpSpPr>
+      <p:grpSpPr>
+        <a:xfrm>
+          <a:off x="0" y="0"/>
+          <a:ext cx="0" cy="0"/>
+          <a:chOff x="0" y="0"/>
+          <a:chExt cx="0" cy="0"/>
+        </a:xfrm>
+      </p:grpSpPr>
+      <p:sp>
+        <p:nvSpPr>
+          <p:cNvPr id="2" name="Title 1"/>
+          <p:cNvSpPr>
+            <a:spLocks noGrp="1"/>
+          </p:cNvSpPr>
+          <p:nvPr>
+            <p:ph type="title"/>
+          </p:nvPr>
+        </p:nvSpPr>
+        <p:spPr>
+          <a:xfrm>
+            <a:off x="818347" y="596018"/>
+            <a:ext cx="7511473" cy="623182"/>
+          </a:xfrm>
+        </p:spPr>
+        <p:txBody>
+          <a:bodyPr/>
+          <a:lstStyle/>
+          <a:p>
+            <a:r>
+              <a:rPr lang="en-US" dirty="0" smtClean="0"/>
+              <a:t>GC in JavaScript (V8 as example)</a:t>
+            </a:r>
+            <a:endParaRPr lang="ru-RU" dirty="0"/>
+          </a:p>
+        </p:txBody>
+      </p:sp>
+      <p:sp>
+        <p:nvSpPr>
+          <p:cNvPr id="3" name="Content Placeholder 2"/>
+          <p:cNvSpPr>
+            <a:spLocks noGrp="1"/>
+          </p:cNvSpPr>
+          <p:nvPr>
+            <p:ph idx="1"/>
+          </p:nvPr>
+        </p:nvSpPr>
+        <p:spPr>
+          <a:xfrm>
+            <a:off x="818348" y="1371600"/>
+            <a:ext cx="7511472" cy="4730460"/>
+          </a:xfrm>
+        </p:spPr>
+        <p:txBody>
+          <a:bodyPr anchor="t">
+            <a:normAutofit/>
+          </a:bodyPr>
+          <a:lstStyle/>
+          <a:p>
+            <a:pPr>
+              <a:buSzPct val="80000"/>
+            </a:pPr>
+            <a:r>
+              <a:rPr lang="en-US" sz="2400" b="1" u="sng" cap="none" dirty="0" smtClean="0">
+                <a:latin typeface="Calibri" panose="020F0502020204030204" pitchFamily="34" charset="0"/>
+                <a:cs typeface="Calibri" panose="020F0502020204030204" pitchFamily="34" charset="0"/>
+              </a:rPr>
+              <a:t>Non-generational Mark and Sweep</a:t>
+            </a:r>
+          </a:p>
+          <a:p>
+            <a:pPr>
+              <a:buSzPct val="80000"/>
+            </a:pPr>
+            <a:endParaRPr lang="en-US" b="1" u="sng" cap="none" dirty="0" smtClean="0">
+              <a:latin typeface="Calibri" panose="020F0502020204030204" pitchFamily="34" charset="0"/>
+              <a:cs typeface="Calibri" panose="020F0502020204030204" pitchFamily="34" charset="0"/>
+            </a:endParaRPr>
+          </a:p>
+          <a:p>
+            <a:pPr>
+              <a:buSzPct val="80000"/>
+            </a:pPr>
+            <a:r>
+              <a:rPr lang="en-US" sz="2400" cap="none" dirty="0" smtClean="0">
+                <a:latin typeface="Calibri" panose="020F0502020204030204" pitchFamily="34" charset="0"/>
+                <a:cs typeface="Calibri" panose="020F0502020204030204" pitchFamily="34" charset="0"/>
+              </a:rPr>
+              <a:t>Every </a:t>
+            </a:r>
+            <a:r>
+              <a:rPr lang="en-US" sz="2400" cap="none" dirty="0">
+                <a:latin typeface="Calibri" panose="020F0502020204030204" pitchFamily="34" charset="0"/>
+                <a:cs typeface="Calibri" panose="020F0502020204030204" pitchFamily="34" charset="0"/>
+              </a:rPr>
+              <a:t>objects in scope is called a "scavenger". GC create a "scav" list of this object.</a:t>
+            </a:r>
+          </a:p>
+          <a:p>
+            <a:pPr>
+              <a:buSzPct val="80000"/>
+            </a:pPr>
+            <a:r>
+              <a:rPr lang="en-US" sz="2400" cap="none" dirty="0" smtClean="0">
+                <a:latin typeface="Calibri" panose="020F0502020204030204" pitchFamily="34" charset="0"/>
+                <a:cs typeface="Calibri" panose="020F0502020204030204" pitchFamily="34" charset="0"/>
+              </a:rPr>
+              <a:t>When </a:t>
+            </a:r>
+            <a:r>
+              <a:rPr lang="en-US" sz="2400" cap="none" dirty="0">
+                <a:latin typeface="Calibri" panose="020F0502020204030204" pitchFamily="34" charset="0"/>
+                <a:cs typeface="Calibri" panose="020F0502020204030204" pitchFamily="34" charset="0"/>
+              </a:rPr>
+              <a:t>GC runs, it mark every object, variable, string, etc.</a:t>
+            </a:r>
+          </a:p>
+          <a:p>
+            <a:pPr>
+              <a:buSzPct val="80000"/>
+            </a:pPr>
+            <a:r>
+              <a:rPr lang="en-US" sz="2400" cap="none" dirty="0" smtClean="0">
+                <a:latin typeface="Calibri" panose="020F0502020204030204" pitchFamily="34" charset="0"/>
+                <a:cs typeface="Calibri" panose="020F0502020204030204" pitchFamily="34" charset="0"/>
+              </a:rPr>
+              <a:t>Then</a:t>
+            </a:r>
+            <a:r>
+              <a:rPr lang="en-US" sz="2400" cap="none" dirty="0">
+                <a:latin typeface="Calibri" panose="020F0502020204030204" pitchFamily="34" charset="0"/>
+                <a:cs typeface="Calibri" panose="020F0502020204030204" pitchFamily="34" charset="0"/>
+              </a:rPr>
+              <a:t>, it clear the mark from objects in "scav" list, and the transitive closures of scavenger references.</a:t>
+            </a:r>
+          </a:p>
+          <a:p>
+            <a:pPr>
+              <a:buSzPct val="80000"/>
+            </a:pPr>
+            <a:r>
+              <a:rPr lang="en-US" sz="2400" cap="none" dirty="0" smtClean="0">
+                <a:latin typeface="Calibri" panose="020F0502020204030204" pitchFamily="34" charset="0"/>
+                <a:cs typeface="Calibri" panose="020F0502020204030204" pitchFamily="34" charset="0"/>
+              </a:rPr>
+              <a:t>At </a:t>
+            </a:r>
+            <a:r>
+              <a:rPr lang="en-US" sz="2400" cap="none" dirty="0">
+                <a:latin typeface="Calibri" panose="020F0502020204030204" pitchFamily="34" charset="0"/>
+                <a:cs typeface="Calibri" panose="020F0502020204030204" pitchFamily="34" charset="0"/>
+              </a:rPr>
+              <a:t>this point we know that all the memory still marked is allocated memory which cannot be reached by any path from any in-scope variable.</a:t>
+            </a:r>
+          </a:p>
+        </p:txBody>
+      </p:sp>
+    </p:spTree>
+    <p:extLst>
+      <p:ext uri="{BB962C8B-B14F-4D97-AF65-F5344CB8AC3E}">
+        <p14:creationId xmlns:p14="http://schemas.microsoft.com/office/powerpoint/2010/main" val="3734784952"/>
+      </p:ext>
+    </p:extLst>
+  </p:cSld>
+  <p:clrMapOvr>
+    <a:masterClrMapping/>
+  </p:clrMapOvr>
+  <p:timing>
+    <p:tnLst>
+      <p:par>
+        <p:cTn id="1" dur="indefinite" restart="never" nodeType="tmRoot"/>
+      </p:par>
+    </p:tnLst>
+  </p:timing>
+</p:sld>
+</file>
+
+<file path=ppt/slides/slide27.xml><?xml version="1.0" encoding="utf-8"?>
+<p:sld xmlns:a="http://schemas.openxmlformats.org/drawingml/2006/main" xmlns:r="http://schemas.openxmlformats.org/officeDocument/2006/relationships" xmlns:p="http://schemas.openxmlformats.org/presentationml/2006/main">
+  <p:cSld>
+    <p:spTree>
+      <p:nvGrpSpPr>
+        <p:cNvPr id="1" name=""/>
+        <p:cNvGrpSpPr/>
+        <p:nvPr/>
+      </p:nvGrpSpPr>
+      <p:grpSpPr>
+        <a:xfrm>
+          <a:off x="0" y="0"/>
+          <a:ext cx="0" cy="0"/>
+          <a:chOff x="0" y="0"/>
+          <a:chExt cx="0" cy="0"/>
+        </a:xfrm>
+      </p:grpSpPr>
+      <p:sp>
+        <p:nvSpPr>
+          <p:cNvPr id="2" name="Title 1"/>
+          <p:cNvSpPr>
+            <a:spLocks noGrp="1"/>
+          </p:cNvSpPr>
+          <p:nvPr>
+            <p:ph type="title"/>
+          </p:nvPr>
+        </p:nvSpPr>
+        <p:spPr>
+          <a:xfrm>
+            <a:off x="818347" y="596018"/>
+            <a:ext cx="7511473" cy="623182"/>
+          </a:xfrm>
+        </p:spPr>
+        <p:txBody>
+          <a:bodyPr/>
+          <a:lstStyle/>
+          <a:p>
+            <a:r>
+              <a:rPr lang="en-US" dirty="0" smtClean="0"/>
+              <a:t>GC in JavaScript (</a:t>
+            </a:r>
+            <a:r>
+              <a:rPr lang="en-US" dirty="0" err="1" smtClean="0"/>
+              <a:t>SpiderMonkey</a:t>
+            </a:r>
+            <a:r>
+              <a:rPr lang="en-US" dirty="0" smtClean="0"/>
+              <a:t>)</a:t>
+            </a:r>
+            <a:endParaRPr lang="ru-RU" dirty="0"/>
+          </a:p>
+        </p:txBody>
+      </p:sp>
+      <p:sp>
+        <p:nvSpPr>
+          <p:cNvPr id="3" name="Content Placeholder 2"/>
+          <p:cNvSpPr>
+            <a:spLocks noGrp="1"/>
+          </p:cNvSpPr>
+          <p:nvPr>
+            <p:ph idx="1"/>
+          </p:nvPr>
+        </p:nvSpPr>
+        <p:spPr>
+          <a:xfrm>
+            <a:off x="818348" y="1371600"/>
+            <a:ext cx="7511472" cy="4730460"/>
+          </a:xfrm>
+        </p:spPr>
+        <p:txBody>
+          <a:bodyPr anchor="t">
+            <a:normAutofit/>
+          </a:bodyPr>
+          <a:lstStyle/>
+          <a:p>
+            <a:pPr>
+              <a:buSzPct val="80000"/>
+            </a:pPr>
+            <a:r>
+              <a:rPr lang="en-US" sz="2400" b="1" u="sng" cap="none" dirty="0" smtClean="0">
+                <a:latin typeface="Calibri" panose="020F0502020204030204" pitchFamily="34" charset="0"/>
+                <a:cs typeface="Calibri" panose="020F0502020204030204" pitchFamily="34" charset="0"/>
+              </a:rPr>
+              <a:t>Incremental (Tracing) Mark and Sweep</a:t>
+            </a:r>
+          </a:p>
+          <a:p>
+            <a:pPr>
+              <a:buSzPct val="80000"/>
+            </a:pPr>
+            <a:endParaRPr lang="en-US" b="1" u="sng" cap="none" dirty="0" smtClean="0">
+              <a:latin typeface="Calibri" panose="020F0502020204030204" pitchFamily="34" charset="0"/>
+              <a:cs typeface="Calibri" panose="020F0502020204030204" pitchFamily="34" charset="0"/>
+            </a:endParaRPr>
+          </a:p>
+          <a:p>
+            <a:pPr>
+              <a:buSzPct val="80000"/>
+            </a:pPr>
+            <a:r>
+              <a:rPr lang="en-US" sz="2400" cap="none" dirty="0">
+                <a:latin typeface="Calibri" panose="020F0502020204030204" pitchFamily="34" charset="0"/>
+                <a:cs typeface="Calibri" panose="020F0502020204030204" pitchFamily="34" charset="0"/>
+              </a:rPr>
+              <a:t>Allows eliminate downtimes during garbage collecting</a:t>
+            </a:r>
+            <a:r>
+              <a:rPr lang="en-US" sz="2400" cap="none" dirty="0" smtClean="0">
+                <a:latin typeface="Calibri" panose="020F0502020204030204" pitchFamily="34" charset="0"/>
+                <a:cs typeface="Calibri" panose="020F0502020204030204" pitchFamily="34" charset="0"/>
+              </a:rPr>
+              <a:t>.</a:t>
+            </a:r>
+            <a:endParaRPr lang="en-US" sz="2400" cap="none" dirty="0">
+              <a:latin typeface="Calibri" panose="020F0502020204030204" pitchFamily="34" charset="0"/>
+              <a:cs typeface="Calibri" panose="020F0502020204030204" pitchFamily="34" charset="0"/>
+            </a:endParaRPr>
+          </a:p>
+          <a:p>
+            <a:pPr>
+              <a:buSzPct val="80000"/>
+            </a:pPr>
+            <a:r>
+              <a:rPr lang="en-US" sz="2400" cap="none" dirty="0">
+                <a:latin typeface="Calibri" panose="020F0502020204030204" pitchFamily="34" charset="0"/>
+                <a:cs typeface="Calibri" panose="020F0502020204030204" pitchFamily="34" charset="0"/>
+              </a:rPr>
+              <a:t>GC usually happen every </a:t>
+            </a:r>
+            <a:r>
+              <a:rPr lang="en-US" sz="2400" cap="none" dirty="0" smtClean="0">
+                <a:latin typeface="Calibri" panose="020F0502020204030204" pitchFamily="34" charset="0"/>
+                <a:cs typeface="Calibri" panose="020F0502020204030204" pitchFamily="34" charset="0"/>
+              </a:rPr>
+              <a:t>5</a:t>
+            </a:r>
+            <a:endParaRPr lang="en-US" sz="2400" cap="none" dirty="0">
+              <a:latin typeface="Calibri" panose="020F0502020204030204" pitchFamily="34" charset="0"/>
+              <a:cs typeface="Calibri" panose="020F0502020204030204" pitchFamily="34" charset="0"/>
+            </a:endParaRPr>
+          </a:p>
+        </p:txBody>
+      </p:sp>
+      <p:sp>
+        <p:nvSpPr>
+          <p:cNvPr id="4" name="Rectangle 3"/>
+          <p:cNvSpPr/>
+          <p:nvPr/>
+        </p:nvSpPr>
+        <p:spPr>
+          <a:xfrm>
+            <a:off x="504165" y="3657600"/>
+            <a:ext cx="8139835" cy="2755726"/>
+          </a:xfrm>
+          <a:prstGeom prst="rect">
+            <a:avLst/>
+          </a:prstGeom>
+          <a:solidFill>
+            <a:schemeClr val="accent1">
+              <a:alpha val="24000"/>
+            </a:schemeClr>
+          </a:solidFill>
+          <a:ln>
+            <a:solidFill>
+              <a:schemeClr val="accent1">
+                <a:lumMod val="60000"/>
+                <a:lumOff val="40000"/>
+              </a:schemeClr>
+            </a:solidFill>
+          </a:ln>
+        </p:spPr>
+        <p:style>
+          <a:lnRef idx="2">
+            <a:schemeClr val="accent1">
+              <a:shade val="50000"/>
+            </a:schemeClr>
+          </a:lnRef>
+          <a:fillRef idx="1">
+            <a:schemeClr val="accent1"/>
+          </a:fillRef>
+          <a:effectRef idx="0">
+            <a:schemeClr val="accent1"/>
+          </a:effectRef>
+          <a:fontRef idx="minor">
+            <a:schemeClr val="lt1"/>
+          </a:fontRef>
+        </p:style>
+        <p:txBody>
+          <a:bodyPr rtlCol="0" anchor="ctr"/>
+          <a:lstStyle/>
+          <a:p>
+            <a:pPr algn="ctr"/>
+            <a:r>
+              <a:rPr lang="en-US" sz="2000" dirty="0"/>
+              <a:t>"Incremental garbage collection fixes the problem by dividing the work of a GC into smaller pieces. Rather than do a 500 millisecond garbage collection, an incremental collector might divide the work into fifty slices, each taking 10ms to complete. In between the slices, Firefox is free to respond to mouse clicks and draw animations</a:t>
+            </a:r>
+            <a:r>
+              <a:rPr lang="en-US" sz="2000" dirty="0" smtClean="0"/>
+              <a:t>.“</a:t>
+            </a:r>
+          </a:p>
+          <a:p>
+            <a:pPr algn="ctr"/>
+            <a:endParaRPr lang="en-US" dirty="0" smtClean="0"/>
+          </a:p>
+          <a:p>
+            <a:pPr algn="r"/>
+            <a:r>
+              <a:rPr lang="en-US" sz="1400" dirty="0">
+                <a:solidFill>
+                  <a:srgbClr val="0070C0"/>
+                </a:solidFill>
+              </a:rPr>
+              <a:t>http://blog.mozilla.org/javascript/2012/08/28/incremental-gc-in-firefox-16/</a:t>
+            </a:r>
+            <a:endParaRPr lang="ru-RU" sz="1400" dirty="0">
+              <a:solidFill>
+                <a:srgbClr val="0070C0"/>
+              </a:solidFill>
+            </a:endParaRPr>
+          </a:p>
+        </p:txBody>
+      </p:sp>
+    </p:spTree>
+    <p:extLst>
+      <p:ext uri="{BB962C8B-B14F-4D97-AF65-F5344CB8AC3E}">
+        <p14:creationId xmlns:p14="http://schemas.microsoft.com/office/powerpoint/2010/main" val="2321323218"/>
+      </p:ext>
+    </p:extLst>
+  </p:cSld>
+  <p:clrMapOvr>
+    <a:masterClrMapping/>
+  </p:clrMapOvr>
+  <p:timing>
+    <p:tnLst>
+      <p:par>
+        <p:cTn id="1" dur="indefinite" restart="never" nodeType="tmRoot"/>
+      </p:par>
+    </p:tnLst>
+  </p:timing>
+</p:sld>
+</file>
+
 <file path=ppt/slides/slide3.xml><?xml version="1.0" encoding="utf-8"?>
 <p:sld xmlns:a="http://schemas.openxmlformats.org/drawingml/2006/main" xmlns:r="http://schemas.openxmlformats.org/officeDocument/2006/relationships" xmlns:p="http://schemas.openxmlformats.org/presentationml/2006/main">
   <p:cSld>

</xml_diff>

<commit_message>
Minor change to Garbage collection presentation
</commit_message>
<xml_diff>
--- a/ppt/Garbage collection in dotnet.pptx
+++ b/ppt/Garbage collection in dotnet.pptx
@@ -370,7 +370,7 @@
           <a:p>
             <a:fld id="{7BD62930-5499-40C2-A9E0-B6F8263316F8}" type="datetimeFigureOut">
               <a:rPr lang="ru-RU" smtClean="0"/>
-              <a:t>05.08.2013</a:t>
+              <a:t>06.08.2013</a:t>
             </a:fld>
             <a:endParaRPr lang="ru-RU"/>
           </a:p>
@@ -661,7 +661,7 @@
           <a:p>
             <a:fld id="{7BD62930-5499-40C2-A9E0-B6F8263316F8}" type="datetimeFigureOut">
               <a:rPr lang="ru-RU" smtClean="0"/>
-              <a:t>05.08.2013</a:t>
+              <a:t>06.08.2013</a:t>
             </a:fld>
             <a:endParaRPr lang="ru-RU"/>
           </a:p>
@@ -925,7 +925,7 @@
           <a:p>
             <a:fld id="{7BD62930-5499-40C2-A9E0-B6F8263316F8}" type="datetimeFigureOut">
               <a:rPr lang="ru-RU" smtClean="0"/>
-              <a:t>05.08.2013</a:t>
+              <a:t>06.08.2013</a:t>
             </a:fld>
             <a:endParaRPr lang="ru-RU"/>
           </a:p>
@@ -1485,7 +1485,7 @@
           <a:p>
             <a:fld id="{7BD62930-5499-40C2-A9E0-B6F8263316F8}" type="datetimeFigureOut">
               <a:rPr lang="ru-RU" smtClean="0"/>
-              <a:t>05.08.2013</a:t>
+              <a:t>06.08.2013</a:t>
             </a:fld>
             <a:endParaRPr lang="ru-RU"/>
           </a:p>
@@ -1744,7 +1744,7 @@
           <a:p>
             <a:fld id="{7BD62930-5499-40C2-A9E0-B6F8263316F8}" type="datetimeFigureOut">
               <a:rPr lang="ru-RU" smtClean="0"/>
-              <a:t>05.08.2013</a:t>
+              <a:t>06.08.2013</a:t>
             </a:fld>
             <a:endParaRPr lang="ru-RU"/>
           </a:p>
@@ -2320,7 +2320,7 @@
           <a:p>
             <a:fld id="{7BD62930-5499-40C2-A9E0-B6F8263316F8}" type="datetimeFigureOut">
               <a:rPr lang="ru-RU" smtClean="0"/>
-              <a:t>05.08.2013</a:t>
+              <a:t>06.08.2013</a:t>
             </a:fld>
             <a:endParaRPr lang="ru-RU"/>
           </a:p>
@@ -2652,7 +2652,7 @@
           <a:p>
             <a:fld id="{7BD62930-5499-40C2-A9E0-B6F8263316F8}" type="datetimeFigureOut">
               <a:rPr lang="ru-RU" smtClean="0"/>
-              <a:t>05.08.2013</a:t>
+              <a:t>06.08.2013</a:t>
             </a:fld>
             <a:endParaRPr lang="ru-RU"/>
           </a:p>
@@ -2827,7 +2827,7 @@
           <a:p>
             <a:fld id="{7BD62930-5499-40C2-A9E0-B6F8263316F8}" type="datetimeFigureOut">
               <a:rPr lang="ru-RU" smtClean="0"/>
-              <a:t>05.08.2013</a:t>
+              <a:t>06.08.2013</a:t>
             </a:fld>
             <a:endParaRPr lang="ru-RU"/>
           </a:p>
@@ -3007,7 +3007,7 @@
           <a:p>
             <a:fld id="{7BD62930-5499-40C2-A9E0-B6F8263316F8}" type="datetimeFigureOut">
               <a:rPr lang="ru-RU" smtClean="0"/>
-              <a:t>05.08.2013</a:t>
+              <a:t>06.08.2013</a:t>
             </a:fld>
             <a:endParaRPr lang="ru-RU"/>
           </a:p>
@@ -3177,7 +3177,7 @@
           <a:p>
             <a:fld id="{7BD62930-5499-40C2-A9E0-B6F8263316F8}" type="datetimeFigureOut">
               <a:rPr lang="ru-RU" smtClean="0"/>
-              <a:t>05.08.2013</a:t>
+              <a:t>06.08.2013</a:t>
             </a:fld>
             <a:endParaRPr lang="ru-RU"/>
           </a:p>
@@ -3436,7 +3436,7 @@
           <a:p>
             <a:fld id="{7BD62930-5499-40C2-A9E0-B6F8263316F8}" type="datetimeFigureOut">
               <a:rPr lang="ru-RU" smtClean="0"/>
-              <a:t>05.08.2013</a:t>
+              <a:t>06.08.2013</a:t>
             </a:fld>
             <a:endParaRPr lang="ru-RU"/>
           </a:p>
@@ -3728,7 +3728,7 @@
           <a:p>
             <a:fld id="{7BD62930-5499-40C2-A9E0-B6F8263316F8}" type="datetimeFigureOut">
               <a:rPr lang="ru-RU" smtClean="0"/>
-              <a:t>05.08.2013</a:t>
+              <a:t>06.08.2013</a:t>
             </a:fld>
             <a:endParaRPr lang="ru-RU"/>
           </a:p>
@@ -4158,7 +4158,7 @@
           <a:p>
             <a:fld id="{7BD62930-5499-40C2-A9E0-B6F8263316F8}" type="datetimeFigureOut">
               <a:rPr lang="ru-RU" smtClean="0"/>
-              <a:t>05.08.2013</a:t>
+              <a:t>06.08.2013</a:t>
             </a:fld>
             <a:endParaRPr lang="ru-RU"/>
           </a:p>
@@ -4282,7 +4282,7 @@
           <a:p>
             <a:fld id="{7BD62930-5499-40C2-A9E0-B6F8263316F8}" type="datetimeFigureOut">
               <a:rPr lang="ru-RU" smtClean="0"/>
-              <a:t>05.08.2013</a:t>
+              <a:t>06.08.2013</a:t>
             </a:fld>
             <a:endParaRPr lang="ru-RU"/>
           </a:p>
@@ -4377,7 +4377,7 @@
           <a:p>
             <a:fld id="{7BD62930-5499-40C2-A9E0-B6F8263316F8}" type="datetimeFigureOut">
               <a:rPr lang="ru-RU" smtClean="0"/>
-              <a:t>05.08.2013</a:t>
+              <a:t>06.08.2013</a:t>
             </a:fld>
             <a:endParaRPr lang="ru-RU"/>
           </a:p>
@@ -4660,7 +4660,7 @@
           <a:p>
             <a:fld id="{7BD62930-5499-40C2-A9E0-B6F8263316F8}" type="datetimeFigureOut">
               <a:rPr lang="ru-RU" smtClean="0"/>
-              <a:t>05.08.2013</a:t>
+              <a:t>06.08.2013</a:t>
             </a:fld>
             <a:endParaRPr lang="ru-RU"/>
           </a:p>
@@ -4951,7 +4951,7 @@
           <a:p>
             <a:fld id="{7BD62930-5499-40C2-A9E0-B6F8263316F8}" type="datetimeFigureOut">
               <a:rPr lang="ru-RU" smtClean="0"/>
-              <a:t>05.08.2013</a:t>
+              <a:t>06.08.2013</a:t>
             </a:fld>
             <a:endParaRPr lang="ru-RU"/>
           </a:p>
@@ -5182,7 +5182,7 @@
           <a:p>
             <a:fld id="{7BD62930-5499-40C2-A9E0-B6F8263316F8}" type="datetimeFigureOut">
               <a:rPr lang="ru-RU" smtClean="0"/>
-              <a:t>05.08.2013</a:t>
+              <a:t>06.08.2013</a:t>
             </a:fld>
             <a:endParaRPr lang="ru-RU"/>
           </a:p>
@@ -6124,14 +6124,7 @@
                 <a:latin typeface="Calibri" panose="020F0502020204030204" pitchFamily="34" charset="0"/>
                 <a:cs typeface="Calibri" panose="020F0502020204030204" pitchFamily="34" charset="0"/>
               </a:rPr>
-              <a:t>Each </a:t>
-            </a:r>
-            <a:r>
-              <a:rPr lang="en-US" sz="2400" cap="none" dirty="0" smtClean="0">
-                <a:latin typeface="Calibri" panose="020F0502020204030204" pitchFamily="34" charset="0"/>
-                <a:cs typeface="Calibri" panose="020F0502020204030204" pitchFamily="34" charset="0"/>
-              </a:rPr>
-              <a:t>object has counter of incoming pointers</a:t>
+              <a:t>Each object has counter of incoming pointers</a:t>
             </a:r>
           </a:p>
           <a:p>
@@ -7148,14 +7141,7 @@
                 <a:latin typeface="Calibri" panose="020F0502020204030204" pitchFamily="34" charset="0"/>
                 <a:cs typeface="Calibri" panose="020F0502020204030204" pitchFamily="34" charset="0"/>
               </a:rPr>
-              <a:t>Each </a:t>
-            </a:r>
-            <a:r>
-              <a:rPr lang="en-US" sz="2400" cap="none" dirty="0" smtClean="0">
-                <a:latin typeface="Calibri" panose="020F0502020204030204" pitchFamily="34" charset="0"/>
-                <a:cs typeface="Calibri" panose="020F0502020204030204" pitchFamily="34" charset="0"/>
-              </a:rPr>
-              <a:t>object has counter of incoming pointers</a:t>
+              <a:t>Each object has counter of incoming pointers</a:t>
             </a:r>
           </a:p>
           <a:p>
@@ -8002,14 +7988,7 @@
                 <a:latin typeface="Calibri" panose="020F0502020204030204" pitchFamily="34" charset="0"/>
                 <a:cs typeface="Calibri" panose="020F0502020204030204" pitchFamily="34" charset="0"/>
               </a:rPr>
-              <a:t>be collected</a:t>
-            </a:r>
-            <a:r>
-              <a:rPr lang="en-US" sz="2200" cap="none" dirty="0" smtClean="0">
-                <a:latin typeface="Calibri" panose="020F0502020204030204" pitchFamily="34" charset="0"/>
-                <a:cs typeface="Calibri" panose="020F0502020204030204" pitchFamily="34" charset="0"/>
-              </a:rPr>
-              <a:t>.</a:t>
+              <a:t>be collected.</a:t>
             </a:r>
           </a:p>
           <a:p>
@@ -9363,10 +9342,6 @@
               </a:rPr>
               <a:t> Does not detect garbage with cyclic references.</a:t>
             </a:r>
-            <a:endParaRPr lang="en-US" sz="2400" cap="none" dirty="0" smtClean="0">
-              <a:latin typeface="Calibri" panose="020F0502020204030204" pitchFamily="34" charset="0"/>
-              <a:cs typeface="Calibri" panose="020F0502020204030204" pitchFamily="34" charset="0"/>
-            </a:endParaRPr>
           </a:p>
         </p:txBody>
       </p:sp>
@@ -9536,10 +9511,6 @@
               </a:rPr>
               <a:t>Reverse roles of the old and new spaces.</a:t>
             </a:r>
-            <a:endParaRPr lang="en-US" sz="2400" cap="none" dirty="0" smtClean="0">
-              <a:latin typeface="Calibri" panose="020F0502020204030204" pitchFamily="34" charset="0"/>
-              <a:cs typeface="Calibri" panose="020F0502020204030204" pitchFamily="34" charset="0"/>
-            </a:endParaRPr>
           </a:p>
         </p:txBody>
       </p:sp>
@@ -10226,10 +10197,6 @@
               </a:rPr>
               <a:t>Reverse roles of the old and new spaces.</a:t>
             </a:r>
-            <a:endParaRPr lang="en-US" sz="2400" cap="none" dirty="0" smtClean="0">
-              <a:latin typeface="Calibri" panose="020F0502020204030204" pitchFamily="34" charset="0"/>
-              <a:cs typeface="Calibri" panose="020F0502020204030204" pitchFamily="34" charset="0"/>
-            </a:endParaRPr>
           </a:p>
         </p:txBody>
       </p:sp>
@@ -10916,10 +10883,6 @@
               </a:rPr>
               <a:t>Reverse roles of the old and new spaces.</a:t>
             </a:r>
-            <a:endParaRPr lang="en-US" sz="2400" cap="none" dirty="0" smtClean="0">
-              <a:latin typeface="Calibri" panose="020F0502020204030204" pitchFamily="34" charset="0"/>
-              <a:cs typeface="Calibri" panose="020F0502020204030204" pitchFamily="34" charset="0"/>
-            </a:endParaRPr>
           </a:p>
         </p:txBody>
       </p:sp>
@@ -11606,10 +11569,6 @@
               </a:rPr>
               <a:t>Reverse roles of the old and new spaces.</a:t>
             </a:r>
-            <a:endParaRPr lang="en-US" sz="2400" cap="none" dirty="0" smtClean="0">
-              <a:latin typeface="Calibri" panose="020F0502020204030204" pitchFamily="34" charset="0"/>
-              <a:cs typeface="Calibri" panose="020F0502020204030204" pitchFamily="34" charset="0"/>
-            </a:endParaRPr>
           </a:p>
         </p:txBody>
       </p:sp>
@@ -12276,10 +12235,6 @@
               </a:rPr>
               <a:t> The program must be halted during garbage collecting.</a:t>
             </a:r>
-            <a:endParaRPr lang="en-US" sz="2400" cap="none" dirty="0" smtClean="0">
-              <a:latin typeface="Calibri" panose="020F0502020204030204" pitchFamily="34" charset="0"/>
-              <a:cs typeface="Calibri" panose="020F0502020204030204" pitchFamily="34" charset="0"/>
-            </a:endParaRPr>
           </a:p>
         </p:txBody>
       </p:sp>
@@ -12358,14 +12313,14 @@
             <p:ph idx="1"/>
             <p:extLst>
               <p:ext uri="{D42A27DB-BD31-4B8C-83A1-F6EECF244321}">
-                <p14:modId xmlns:p14="http://schemas.microsoft.com/office/powerpoint/2010/main" val="196429143"/>
+                <p14:modId xmlns:p14="http://schemas.microsoft.com/office/powerpoint/2010/main" val="1586227767"/>
               </p:ext>
             </p:extLst>
           </p:nvPr>
         </p:nvGraphicFramePr>
         <p:xfrm>
           <a:off x="350729" y="1672269"/>
-          <a:ext cx="8430016" cy="4252908"/>
+          <a:ext cx="8430016" cy="3048632"/>
         </p:xfrm>
         <a:graphic>
           <a:graphicData uri="http://schemas.openxmlformats.org/drawingml/2006/table">
@@ -12664,132 +12619,6 @@
                     <a:p>
                       <a:r>
                         <a:rPr lang="en-US" b="0" dirty="0" smtClean="0"/>
-                        <a:t>Delayed Reclamation</a:t>
-                      </a:r>
-                      <a:endParaRPr lang="ru-RU" b="0" dirty="0"/>
-                    </a:p>
-                  </a:txBody>
-                  <a:tcPr anchor="ctr"/>
-                </a:tc>
-                <a:tc>
-                  <a:txBody>
-                    <a:bodyPr/>
-                    <a:lstStyle/>
-                    <a:p>
-                      <a:pPr algn="ctr"/>
-                      <a:r>
-                        <a:rPr lang="en-US" dirty="0" smtClean="0"/>
-                        <a:t>yes</a:t>
-                      </a:r>
-                      <a:endParaRPr lang="ru-RU" dirty="0"/>
-                    </a:p>
-                  </a:txBody>
-                  <a:tcPr anchor="ctr"/>
-                </a:tc>
-                <a:tc>
-                  <a:txBody>
-                    <a:bodyPr/>
-                    <a:lstStyle/>
-                    <a:p>
-                      <a:pPr algn="ctr"/>
-                      <a:r>
-                        <a:rPr lang="en-US" dirty="0" smtClean="0"/>
-                        <a:t>no</a:t>
-                      </a:r>
-                      <a:endParaRPr lang="ru-RU" dirty="0"/>
-                    </a:p>
-                  </a:txBody>
-                  <a:tcPr anchor="ctr"/>
-                </a:tc>
-                <a:tc>
-                  <a:txBody>
-                    <a:bodyPr/>
-                    <a:lstStyle/>
-                    <a:p>
-                      <a:pPr algn="ctr"/>
-                      <a:r>
-                        <a:rPr lang="en-US" dirty="0" smtClean="0"/>
-                        <a:t>no</a:t>
-                      </a:r>
-                      <a:endParaRPr lang="ru-RU" dirty="0"/>
-                    </a:p>
-                  </a:txBody>
-                  <a:tcPr anchor="ctr"/>
-                </a:tc>
-              </a:tr>
-              <a:tr h="602138">
-                <a:tc>
-                  <a:txBody>
-                    <a:bodyPr/>
-                    <a:lstStyle/>
-                    <a:p>
-                      <a:r>
-                        <a:rPr lang="en-US" b="0" dirty="0" smtClean="0"/>
-                        <a:t>Cost</a:t>
-                      </a:r>
-                      <a:r>
-                        <a:rPr lang="en-US" b="0" baseline="0" dirty="0" smtClean="0"/>
-                        <a:t> per mutation</a:t>
-                      </a:r>
-                      <a:endParaRPr lang="ru-RU" b="0" dirty="0"/>
-                    </a:p>
-                  </a:txBody>
-                  <a:tcPr anchor="ctr"/>
-                </a:tc>
-                <a:tc>
-                  <a:txBody>
-                    <a:bodyPr/>
-                    <a:lstStyle/>
-                    <a:p>
-                      <a:pPr algn="ctr"/>
-                      <a:r>
-                        <a:rPr lang="en-US" dirty="0" smtClean="0"/>
-                        <a:t>none</a:t>
-                      </a:r>
-                      <a:endParaRPr lang="ru-RU" dirty="0"/>
-                    </a:p>
-                  </a:txBody>
-                  <a:tcPr anchor="ctr"/>
-                </a:tc>
-                <a:tc>
-                  <a:txBody>
-                    <a:bodyPr/>
-                    <a:lstStyle/>
-                    <a:p>
-                      <a:pPr algn="ctr"/>
-                      <a:r>
-                        <a:rPr lang="en-US" dirty="0" smtClean="0"/>
-                        <a:t>high</a:t>
-                      </a:r>
-                      <a:endParaRPr lang="ru-RU" dirty="0"/>
-                    </a:p>
-                  </a:txBody>
-                  <a:tcPr anchor="ctr"/>
-                </a:tc>
-                <a:tc>
-                  <a:txBody>
-                    <a:bodyPr/>
-                    <a:lstStyle/>
-                    <a:p>
-                      <a:pPr algn="ctr"/>
-                      <a:r>
-                        <a:rPr lang="en-US" dirty="0" smtClean="0"/>
-                        <a:t>low</a:t>
-                      </a:r>
-                      <a:endParaRPr lang="ru-RU" dirty="0"/>
-                    </a:p>
-                  </a:txBody>
-                  <a:tcPr anchor="ctr"/>
-                </a:tc>
-              </a:tr>
-              <a:tr h="602138">
-                <a:tc>
-                  <a:txBody>
-                    <a:bodyPr/>
-                    <a:lstStyle/>
-                    <a:p>
-                      <a:r>
-                        <a:rPr lang="en-US" b="0" dirty="0" smtClean="0"/>
                         <a:t>Collects cycles</a:t>
                       </a:r>
                       <a:endParaRPr lang="ru-RU" b="0" dirty="0"/>
@@ -12939,19 +12768,17 @@
                 <a:latin typeface="Calibri" panose="020F0502020204030204" pitchFamily="34" charset="0"/>
                 <a:cs typeface="Calibri" panose="020F0502020204030204" pitchFamily="34" charset="0"/>
               </a:rPr>
-              <a:t>Reference counting vs. </a:t>
-            </a:r>
+              <a:t>Reference counting vs. tracing vs. copying collection</a:t>
+            </a:r>
+          </a:p>
+          <a:p>
             <a:r>
               <a:rPr lang="en-US" sz="2400" cap="none" dirty="0" smtClean="0">
                 <a:latin typeface="Calibri" panose="020F0502020204030204" pitchFamily="34" charset="0"/>
                 <a:cs typeface="Calibri" panose="020F0502020204030204" pitchFamily="34" charset="0"/>
               </a:rPr>
-              <a:t>tracing vs. copying collection</a:t>
-            </a:r>
-            <a:endParaRPr lang="en-US" sz="2400" cap="none" dirty="0" smtClean="0">
-              <a:latin typeface="Calibri" panose="020F0502020204030204" pitchFamily="34" charset="0"/>
-              <a:cs typeface="Calibri" panose="020F0502020204030204" pitchFamily="34" charset="0"/>
-            </a:endParaRPr>
+              <a:t>Mark and sweep (and compact) algorithm in CLR</a:t>
+            </a:r>
           </a:p>
           <a:p>
             <a:r>
@@ -12959,59 +12786,25 @@
                 <a:latin typeface="Calibri" panose="020F0502020204030204" pitchFamily="34" charset="0"/>
                 <a:cs typeface="Calibri" panose="020F0502020204030204" pitchFamily="34" charset="0"/>
               </a:rPr>
-              <a:t>Mark </a:t>
-            </a:r>
+              <a:t>Finalization</a:t>
+            </a:r>
+          </a:p>
+          <a:p>
             <a:r>
               <a:rPr lang="en-US" sz="2400" cap="none" dirty="0" smtClean="0">
                 <a:latin typeface="Calibri" panose="020F0502020204030204" pitchFamily="34" charset="0"/>
                 <a:cs typeface="Calibri" panose="020F0502020204030204" pitchFamily="34" charset="0"/>
               </a:rPr>
-              <a:t>and sweep (and compact) </a:t>
-            </a:r>
+              <a:t>Generations</a:t>
+            </a:r>
+          </a:p>
+          <a:p>
             <a:r>
               <a:rPr lang="en-US" sz="2400" cap="none" dirty="0" smtClean="0">
                 <a:latin typeface="Calibri" panose="020F0502020204030204" pitchFamily="34" charset="0"/>
                 <a:cs typeface="Calibri" panose="020F0502020204030204" pitchFamily="34" charset="0"/>
               </a:rPr>
-              <a:t>algorithm in CLR</a:t>
-            </a:r>
-          </a:p>
-          <a:p>
-            <a:r>
-              <a:rPr lang="en-US" sz="2400" cap="none" dirty="0" smtClean="0">
-                <a:latin typeface="Calibri" panose="020F0502020204030204" pitchFamily="34" charset="0"/>
-                <a:cs typeface="Calibri" panose="020F0502020204030204" pitchFamily="34" charset="0"/>
-              </a:rPr>
-              <a:t>Finalization</a:t>
-            </a:r>
-            <a:endParaRPr lang="en-US" sz="2400" cap="none" dirty="0" smtClean="0">
-              <a:latin typeface="Calibri" panose="020F0502020204030204" pitchFamily="34" charset="0"/>
-              <a:cs typeface="Calibri" panose="020F0502020204030204" pitchFamily="34" charset="0"/>
-            </a:endParaRPr>
-          </a:p>
-          <a:p>
-            <a:r>
-              <a:rPr lang="en-US" sz="2400" cap="none" dirty="0" smtClean="0">
-                <a:latin typeface="Calibri" panose="020F0502020204030204" pitchFamily="34" charset="0"/>
-                <a:cs typeface="Calibri" panose="020F0502020204030204" pitchFamily="34" charset="0"/>
-              </a:rPr>
-              <a:t>Generations</a:t>
-            </a:r>
-          </a:p>
-          <a:p>
-            <a:r>
-              <a:rPr lang="en-US" sz="2400" cap="none" dirty="0" smtClean="0">
-                <a:latin typeface="Calibri" panose="020F0502020204030204" pitchFamily="34" charset="0"/>
-                <a:cs typeface="Calibri" panose="020F0502020204030204" pitchFamily="34" charset="0"/>
-              </a:rPr>
-              <a:t>Dispose </a:t>
-            </a:r>
-            <a:r>
-              <a:rPr lang="en-US" sz="2400" cap="none" dirty="0" smtClean="0">
-                <a:latin typeface="Calibri" panose="020F0502020204030204" pitchFamily="34" charset="0"/>
-                <a:cs typeface="Calibri" panose="020F0502020204030204" pitchFamily="34" charset="0"/>
-              </a:rPr>
-              <a:t>pattern</a:t>
+              <a:t>Dispose pattern</a:t>
             </a:r>
           </a:p>
           <a:p>
@@ -13088,11 +12881,7 @@
           <a:p>
             <a:r>
               <a:rPr lang="en-US" dirty="0" smtClean="0"/>
-              <a:t>Mark and </a:t>
-            </a:r>
-            <a:r>
-              <a:rPr lang="en-US" dirty="0" smtClean="0"/>
-              <a:t>Sweep IN CLR</a:t>
+              <a:t>Mark and Sweep IN CLR</a:t>
             </a:r>
             <a:endParaRPr lang="ru-RU" dirty="0"/>
           </a:p>
@@ -14929,11 +14718,7 @@
           <a:p>
             <a:r>
               <a:rPr lang="en-US" dirty="0" smtClean="0"/>
-              <a:t>Mark and </a:t>
-            </a:r>
-            <a:r>
-              <a:rPr lang="en-US" dirty="0" smtClean="0"/>
-              <a:t>Sweep IN CLR</a:t>
+              <a:t>Mark and Sweep IN CLR</a:t>
             </a:r>
             <a:endParaRPr lang="ru-RU" dirty="0"/>
           </a:p>
@@ -16774,11 +16559,7 @@
           <a:p>
             <a:r>
               <a:rPr lang="en-US" dirty="0" smtClean="0"/>
-              <a:t>Mark and </a:t>
-            </a:r>
-            <a:r>
-              <a:rPr lang="en-US" dirty="0" smtClean="0"/>
-              <a:t>Sweep in CLR</a:t>
+              <a:t>Mark and Sweep in CLR</a:t>
             </a:r>
             <a:endParaRPr lang="ru-RU" dirty="0"/>
           </a:p>
@@ -18327,19 +18108,8 @@
                 <a:latin typeface="Calibri" panose="020F0502020204030204" pitchFamily="34" charset="0"/>
                 <a:cs typeface="Calibri" panose="020F0502020204030204" pitchFamily="34" charset="0"/>
               </a:rPr>
-              <a:t>Each type which contains</a:t>
-            </a:r>
-            <a:r>
-              <a:rPr lang="en-US" sz="2400" cap="none" dirty="0" smtClean="0">
-                <a:latin typeface="Calibri" panose="020F0502020204030204" pitchFamily="34" charset="0"/>
-                <a:cs typeface="Calibri" panose="020F0502020204030204" pitchFamily="34" charset="0"/>
-              </a:rPr>
-              <a:t> unmanaged resources, like file, network connection or mutex, should implement finalization.</a:t>
-            </a:r>
-            <a:endParaRPr lang="en-US" sz="2400" cap="none" dirty="0" smtClean="0">
-              <a:latin typeface="Calibri" panose="020F0502020204030204" pitchFamily="34" charset="0"/>
-              <a:cs typeface="Calibri" panose="020F0502020204030204" pitchFamily="34" charset="0"/>
-            </a:endParaRPr>
+              <a:t>Each type which contains unmanaged resources, like file, network connection or mutex, should implement finalization.</a:t>
+            </a:r>
           </a:p>
         </p:txBody>
       </p:sp>
@@ -19137,21 +18907,31 @@
                 <a:latin typeface="Calibri" panose="020F0502020204030204" pitchFamily="34" charset="0"/>
                 <a:cs typeface="Calibri" panose="020F0502020204030204" pitchFamily="34" charset="0"/>
               </a:rPr>
-              <a:t>Explicit call static method </a:t>
-            </a:r>
-            <a:r>
-              <a:rPr lang="en-US" sz="2400" cap="none" dirty="0" err="1" smtClean="0">
+              <a:t>Explicit call static method GC.Collect()</a:t>
+            </a:r>
+          </a:p>
+          <a:p>
+            <a:pPr lvl="1">
+              <a:buSzPct val="80000"/>
+            </a:pPr>
+            <a:r>
+              <a:rPr lang="en-US" sz="2200" cap="none" dirty="0" smtClean="0">
                 <a:latin typeface="Calibri" panose="020F0502020204030204" pitchFamily="34" charset="0"/>
                 <a:cs typeface="Calibri" panose="020F0502020204030204" pitchFamily="34" charset="0"/>
               </a:rPr>
-              <a:t>GC.Collect</a:t>
-            </a:r>
+              <a:t>Although Microsoft does not recommend to do that, sometime it make sense to force collecting.</a:t>
+            </a:r>
+          </a:p>
+          <a:p>
+            <a:pPr>
+              <a:buSzPct val="80000"/>
+            </a:pPr>
             <a:r>
               <a:rPr lang="en-US" sz="2400" cap="none" dirty="0" smtClean="0">
                 <a:latin typeface="Calibri" panose="020F0502020204030204" pitchFamily="34" charset="0"/>
                 <a:cs typeface="Calibri" panose="020F0502020204030204" pitchFamily="34" charset="0"/>
               </a:rPr>
-              <a:t>()</a:t>
+              <a:t>Unload application domain.</a:t>
             </a:r>
           </a:p>
           <a:p>
@@ -19163,12 +18943,8 @@
                 <a:latin typeface="Calibri" panose="020F0502020204030204" pitchFamily="34" charset="0"/>
                 <a:cs typeface="Calibri" panose="020F0502020204030204" pitchFamily="34" charset="0"/>
               </a:rPr>
-              <a:t>Although Microsoft does not recommend to do that, sometime it make sense to force collecting.</a:t>
-            </a:r>
-            <a:endParaRPr lang="en-US" sz="2200" cap="none" dirty="0" smtClean="0">
-              <a:latin typeface="Calibri" panose="020F0502020204030204" pitchFamily="34" charset="0"/>
-              <a:cs typeface="Calibri" panose="020F0502020204030204" pitchFamily="34" charset="0"/>
-            </a:endParaRPr>
+              <a:t>CLR treat that application has no roots anymore.</a:t>
+            </a:r>
           </a:p>
           <a:p>
             <a:pPr>
@@ -19179,7 +18955,7 @@
                 <a:latin typeface="Calibri" panose="020F0502020204030204" pitchFamily="34" charset="0"/>
                 <a:cs typeface="Calibri" panose="020F0502020204030204" pitchFamily="34" charset="0"/>
               </a:rPr>
-              <a:t>Unload application domain.</a:t>
+              <a:t>Closing CLR</a:t>
             </a:r>
           </a:p>
           <a:p>
@@ -19191,36 +18967,8 @@
                 <a:latin typeface="Calibri" panose="020F0502020204030204" pitchFamily="34" charset="0"/>
                 <a:cs typeface="Calibri" panose="020F0502020204030204" pitchFamily="34" charset="0"/>
               </a:rPr>
-              <a:t>CLR treat that application has no roots anymore.</a:t>
-            </a:r>
-          </a:p>
-          <a:p>
-            <a:pPr>
-              <a:buSzPct val="80000"/>
-            </a:pPr>
-            <a:r>
-              <a:rPr lang="en-US" sz="2400" cap="none" dirty="0" smtClean="0">
-                <a:latin typeface="Calibri" panose="020F0502020204030204" pitchFamily="34" charset="0"/>
-                <a:cs typeface="Calibri" panose="020F0502020204030204" pitchFamily="34" charset="0"/>
-              </a:rPr>
-              <a:t>Closing CLR</a:t>
-            </a:r>
-          </a:p>
-          <a:p>
-            <a:pPr lvl="1">
-              <a:buSzPct val="80000"/>
-            </a:pPr>
-            <a:r>
-              <a:rPr lang="en-US" sz="2200" cap="none" dirty="0" smtClean="0">
-                <a:latin typeface="Calibri" panose="020F0502020204030204" pitchFamily="34" charset="0"/>
-                <a:cs typeface="Calibri" panose="020F0502020204030204" pitchFamily="34" charset="0"/>
-              </a:rPr>
               <a:t>CLR tries to call Finalize() for each object in managed heap</a:t>
             </a:r>
-            <a:endParaRPr lang="en-US" sz="2200" cap="none" dirty="0" smtClean="0">
-              <a:latin typeface="Calibri" panose="020F0502020204030204" pitchFamily="34" charset="0"/>
-              <a:cs typeface="Calibri" panose="020F0502020204030204" pitchFamily="34" charset="0"/>
-            </a:endParaRPr>
           </a:p>
         </p:txBody>
       </p:sp>
@@ -24894,14 +24642,7 @@
                 <a:latin typeface="Calibri" panose="020F0502020204030204" pitchFamily="34" charset="0"/>
                 <a:cs typeface="Calibri" panose="020F0502020204030204" pitchFamily="34" charset="0"/>
               </a:rPr>
-              <a:t>Tracing [McCarthy, 1960</a:t>
-            </a:r>
-            <a:r>
-              <a:rPr lang="en-US" sz="2400" cap="none" dirty="0" smtClean="0">
-                <a:latin typeface="Calibri" panose="020F0502020204030204" pitchFamily="34" charset="0"/>
-                <a:cs typeface="Calibri" panose="020F0502020204030204" pitchFamily="34" charset="0"/>
-              </a:rPr>
-              <a:t>]</a:t>
+              <a:t>Tracing [McCarthy, 1960]</a:t>
             </a:r>
           </a:p>
           <a:p>
@@ -24968,14 +24709,7 @@
                 <a:latin typeface="Calibri" panose="020F0502020204030204" pitchFamily="34" charset="0"/>
                 <a:cs typeface="Calibri" panose="020F0502020204030204" pitchFamily="34" charset="0"/>
               </a:rPr>
-              <a:t>Copying Collection [Minsky, 1963</a:t>
-            </a:r>
-            <a:r>
-              <a:rPr lang="en-US" sz="2400" cap="none" dirty="0" smtClean="0">
-                <a:latin typeface="Calibri" panose="020F0502020204030204" pitchFamily="34" charset="0"/>
-                <a:cs typeface="Calibri" panose="020F0502020204030204" pitchFamily="34" charset="0"/>
-              </a:rPr>
-              <a:t>]</a:t>
+              <a:t>Copying Collection [Minsky, 1963]</a:t>
             </a:r>
           </a:p>
           <a:p>
@@ -34461,11 +34195,7 @@
           <a:p>
             <a:r>
               <a:rPr lang="en-US" dirty="0" smtClean="0"/>
-              <a:t>GC in</a:t>
-            </a:r>
-            <a:r>
-              <a:rPr lang="en-US" dirty="0" smtClean="0"/>
-              <a:t> Java</a:t>
+              <a:t>GC in Java</a:t>
             </a:r>
             <a:endParaRPr lang="ru-RU" dirty="0"/>
           </a:p>
@@ -34501,14 +34231,7 @@
                 <a:latin typeface="Calibri" panose="020F0502020204030204" pitchFamily="34" charset="0"/>
                 <a:cs typeface="Calibri" panose="020F0502020204030204" pitchFamily="34" charset="0"/>
               </a:rPr>
-              <a:t>Mark-Sweep-</a:t>
-            </a:r>
-            <a:r>
-              <a:rPr lang="en-US" sz="2400" b="1" u="sng" cap="none" dirty="0" err="1" smtClean="0">
-                <a:latin typeface="Calibri" panose="020F0502020204030204" pitchFamily="34" charset="0"/>
-                <a:cs typeface="Calibri" panose="020F0502020204030204" pitchFamily="34" charset="0"/>
-              </a:rPr>
-              <a:t>Compcat</a:t>
+              <a:t>Mark-Sweep-Compact</a:t>
             </a:r>
             <a:endParaRPr lang="en-US" sz="2400" b="1" u="sng" cap="none" dirty="0" smtClean="0">
               <a:latin typeface="Calibri" panose="020F0502020204030204" pitchFamily="34" charset="0"/>
@@ -34658,11 +34381,7 @@
           <a:p>
             <a:r>
               <a:rPr lang="en-US" dirty="0" smtClean="0"/>
-              <a:t>GC in</a:t>
-            </a:r>
-            <a:r>
-              <a:rPr lang="en-US" dirty="0" smtClean="0"/>
-              <a:t> Python</a:t>
+              <a:t>GC in Python</a:t>
             </a:r>
             <a:endParaRPr lang="ru-RU" dirty="0"/>
           </a:p>
@@ -38103,14 +37822,7 @@
                 <a:latin typeface="Calibri" panose="020F0502020204030204" pitchFamily="34" charset="0"/>
                 <a:cs typeface="Calibri" panose="020F0502020204030204" pitchFamily="34" charset="0"/>
               </a:rPr>
-              <a:t>Each </a:t>
-            </a:r>
-            <a:r>
-              <a:rPr lang="en-US" sz="2400" cap="none" dirty="0" smtClean="0">
-                <a:latin typeface="Calibri" panose="020F0502020204030204" pitchFamily="34" charset="0"/>
-                <a:cs typeface="Calibri" panose="020F0502020204030204" pitchFamily="34" charset="0"/>
-              </a:rPr>
-              <a:t>object has counter of incoming pointers</a:t>
+              <a:t>Each object has counter of incoming pointers</a:t>
             </a:r>
           </a:p>
           <a:p>
@@ -39447,14 +39159,7 @@
                 <a:latin typeface="Calibri" panose="020F0502020204030204" pitchFamily="34" charset="0"/>
                 <a:cs typeface="Calibri" panose="020F0502020204030204" pitchFamily="34" charset="0"/>
               </a:rPr>
-              <a:t>Each </a:t>
-            </a:r>
-            <a:r>
-              <a:rPr lang="en-US" sz="2400" cap="none" dirty="0" smtClean="0">
-                <a:latin typeface="Calibri" panose="020F0502020204030204" pitchFamily="34" charset="0"/>
-                <a:cs typeface="Calibri" panose="020F0502020204030204" pitchFamily="34" charset="0"/>
-              </a:rPr>
-              <a:t>object has counter of incoming pointers</a:t>
+              <a:t>Each object has counter of incoming pointers</a:t>
             </a:r>
           </a:p>
           <a:p>

</xml_diff>

<commit_message>
Final version of Garbage Collection in .NET presentation
</commit_message>
<xml_diff>
--- a/ppt/Garbage collection in dotnet.pptx
+++ b/ppt/Garbage collection in dotnet.pptx
@@ -30289,7 +30289,7 @@
               <a:t> </a:t>
             </a:r>
             <a:r>
-              <a:rPr lang="en-US" dirty="0">
+              <a:rPr lang="en-US" dirty="0" err="1" smtClean="0">
                 <a:solidFill>
                   <a:srgbClr val="4EC9B0"/>
                 </a:solidFill>
@@ -30298,7 +30298,7 @@
                 </a:highlight>
                 <a:latin typeface="Consolas" panose="020B0609020204030204" pitchFamily="49" charset="0"/>
               </a:rPr>
-              <a:t>StreamWriter</a:t>
+              <a:t>TextWriter</a:t>
             </a:r>
             <a:r>
               <a:rPr lang="en-US" dirty="0">
@@ -30557,7 +30557,7 @@
               <a:t> </a:t>
             </a:r>
             <a:r>
-              <a:rPr lang="en-US" dirty="0">
+              <a:rPr lang="en-US" dirty="0" err="1" smtClean="0">
                 <a:solidFill>
                   <a:srgbClr val="4EC9B0"/>
                 </a:solidFill>
@@ -30566,7 +30566,7 @@
                 </a:highlight>
                 <a:latin typeface="Consolas" panose="020B0609020204030204" pitchFamily="49" charset="0"/>
               </a:rPr>
-              <a:t>StreamWriter</a:t>
+              <a:t>TextWriter</a:t>
             </a:r>
             <a:r>
               <a:rPr lang="en-US" dirty="0">
@@ -33947,7 +33947,7 @@
               <a:t> </a:t>
             </a:r>
             <a:r>
-              <a:rPr lang="en-US" dirty="0">
+              <a:rPr lang="en-US" dirty="0" err="1" smtClean="0">
                 <a:solidFill>
                   <a:srgbClr val="4EC9B0"/>
                 </a:solidFill>
@@ -33956,7 +33956,7 @@
                 </a:highlight>
                 <a:latin typeface="Consolas" panose="020B0609020204030204" pitchFamily="49" charset="0"/>
               </a:rPr>
-              <a:t>StreamWriter</a:t>
+              <a:t>TextWriter</a:t>
             </a:r>
             <a:r>
               <a:rPr lang="en-US" dirty="0">
@@ -34233,10 +34233,6 @@
               </a:rPr>
               <a:t>Mark-Sweep-Compact</a:t>
             </a:r>
-            <a:endParaRPr lang="en-US" sz="2400" b="1" u="sng" cap="none" dirty="0" smtClean="0">
-              <a:latin typeface="Calibri" panose="020F0502020204030204" pitchFamily="34" charset="0"/>
-              <a:cs typeface="Calibri" panose="020F0502020204030204" pitchFamily="34" charset="0"/>
-            </a:endParaRPr>
           </a:p>
           <a:p>
             <a:pPr>

</xml_diff>